<commit_message>
-updated the presentation -finished popularityAndSentiment.py and added to presentation -finsihed numOfWordsAndPopularity.py and added to presentation -Added more info to README -Added dayTimeOfCreationAndScore.py to handle the time of day statistics
</commit_message>
<xml_diff>
--- a/presentation.pptx
+++ b/presentation.pptx
@@ -11,12 +11,11 @@
     <p:sldId id="257" r:id="rId5"/>
     <p:sldId id="258" r:id="rId6"/>
     <p:sldId id="259" r:id="rId7"/>
-    <p:sldId id="260" r:id="rId8"/>
-    <p:sldId id="261" r:id="rId9"/>
-    <p:sldId id="262" r:id="rId10"/>
-    <p:sldId id="263" r:id="rId11"/>
-    <p:sldId id="265" r:id="rId12"/>
-    <p:sldId id="264" r:id="rId13"/>
+    <p:sldId id="261" r:id="rId8"/>
+    <p:sldId id="262" r:id="rId9"/>
+    <p:sldId id="263" r:id="rId10"/>
+    <p:sldId id="265" r:id="rId11"/>
+    <p:sldId id="264" r:id="rId12"/>
   </p:sldIdLst>
   <p:sldSz cx="12192000" cy="6858000"/>
   <p:notesSz cx="6858000" cy="9144000"/>
@@ -3916,89 +3915,6 @@
           <p:cNvPr id="2" name="Title 1">
             <a:extLst>
               <a:ext uri="{FF2B5EF4-FFF2-40B4-BE49-F238E27FC236}">
-                <a16:creationId xmlns:a16="http://schemas.microsoft.com/office/drawing/2014/main" id="{7F827039-6E61-C72B-A83A-D830053DAA4A}"/>
-              </a:ext>
-            </a:extLst>
-          </p:cNvPr>
-          <p:cNvSpPr>
-            <a:spLocks noGrp="1"/>
-          </p:cNvSpPr>
-          <p:nvPr>
-            <p:ph type="title"/>
-          </p:nvPr>
-        </p:nvSpPr>
-        <p:spPr/>
-        <p:txBody>
-          <a:bodyPr/>
-          <a:lstStyle/>
-          <a:p>
-            <a:r>
-              <a:rPr lang="en-US" dirty="0"/>
-              <a:t>Conclusions</a:t>
-            </a:r>
-          </a:p>
-        </p:txBody>
-      </p:sp>
-      <p:sp>
-        <p:nvSpPr>
-          <p:cNvPr id="3" name="Content Placeholder 2">
-            <a:extLst>
-              <a:ext uri="{FF2B5EF4-FFF2-40B4-BE49-F238E27FC236}">
-                <a16:creationId xmlns:a16="http://schemas.microsoft.com/office/drawing/2014/main" id="{C6B62D51-3CF9-BCC7-DB8B-E204750FA37E}"/>
-              </a:ext>
-            </a:extLst>
-          </p:cNvPr>
-          <p:cNvSpPr>
-            <a:spLocks noGrp="1"/>
-          </p:cNvSpPr>
-          <p:nvPr>
-            <p:ph idx="1"/>
-          </p:nvPr>
-        </p:nvSpPr>
-        <p:spPr/>
-        <p:txBody>
-          <a:bodyPr/>
-          <a:lstStyle/>
-          <a:p>
-            <a:endParaRPr lang="en-US"/>
-          </a:p>
-        </p:txBody>
-      </p:sp>
-    </p:spTree>
-    <p:extLst>
-      <p:ext uri="{BB962C8B-B14F-4D97-AF65-F5344CB8AC3E}">
-        <p14:creationId xmlns:p14="http://schemas.microsoft.com/office/powerpoint/2010/main" val="3068166918"/>
-      </p:ext>
-    </p:extLst>
-  </p:cSld>
-  <p:clrMapOvr>
-    <a:masterClrMapping/>
-  </p:clrMapOvr>
-</p:sld>
-</file>
-
-<file path=ppt/slides/slide11.xml><?xml version="1.0" encoding="utf-8"?>
-<p:sld xmlns:a="http://schemas.openxmlformats.org/drawingml/2006/main" xmlns:r="http://schemas.openxmlformats.org/officeDocument/2006/relationships" xmlns:p="http://schemas.openxmlformats.org/presentationml/2006/main">
-  <p:cSld>
-    <p:spTree>
-      <p:nvGrpSpPr>
-        <p:cNvPr id="1" name=""/>
-        <p:cNvGrpSpPr/>
-        <p:nvPr/>
-      </p:nvGrpSpPr>
-      <p:grpSpPr>
-        <a:xfrm>
-          <a:off x="0" y="0"/>
-          <a:ext cx="0" cy="0"/>
-          <a:chOff x="0" y="0"/>
-          <a:chExt cx="0" cy="0"/>
-        </a:xfrm>
-      </p:grpSpPr>
-      <p:sp>
-        <p:nvSpPr>
-          <p:cNvPr id="2" name="Title 1">
-            <a:extLst>
-              <a:ext uri="{FF2B5EF4-FFF2-40B4-BE49-F238E27FC236}">
                 <a16:creationId xmlns:a16="http://schemas.microsoft.com/office/drawing/2014/main" id="{DA655732-8E67-A7EE-59C8-624C5983BF9A}"/>
               </a:ext>
             </a:extLst>
@@ -4060,7 +3976,7 @@
 </p:sld>
 </file>
 
-<file path=ppt/slides/slide12.xml><?xml version="1.0" encoding="utf-8"?>
+<file path=ppt/slides/slide11.xml><?xml version="1.0" encoding="utf-8"?>
 <p:sld xmlns:a="http://schemas.openxmlformats.org/drawingml/2006/main" xmlns:r="http://schemas.openxmlformats.org/officeDocument/2006/relationships" xmlns:p="http://schemas.openxmlformats.org/presentationml/2006/main">
   <p:cSld>
     <p:spTree>
@@ -4179,22 +4095,26 @@
             <p:ph idx="1"/>
           </p:nvPr>
         </p:nvSpPr>
-        <p:spPr/>
+        <p:spPr>
+          <a:xfrm>
+            <a:off x="1371600" y="1853515"/>
+            <a:ext cx="9601200" cy="4732636"/>
+          </a:xfrm>
+        </p:spPr>
         <p:txBody>
           <a:bodyPr/>
           <a:lstStyle/>
           <a:p>
             <a:r>
-              <a:rPr lang="en-US"/>
+              <a:rPr lang="en-US" dirty="0"/>
               <a:t>Popularity</a:t>
             </a:r>
-            <a:endParaRPr lang="en-US" dirty="0"/>
           </a:p>
           <a:p>
             <a:pPr lvl="1"/>
             <a:r>
               <a:rPr lang="en-US" dirty="0"/>
-              <a:t>def</a:t>
+              <a:t>In the terms of this study, we will be defining popularity as the number of likes on a particular post. The greater the number of likes the greater the popularity of a post is. </a:t>
             </a:r>
           </a:p>
           <a:p>
@@ -4207,7 +4127,7 @@
             <a:pPr lvl="1"/>
             <a:r>
               <a:rPr lang="en-US" dirty="0"/>
-              <a:t>def</a:t>
+              <a:t>Reddit is a social media platform where users can post texts, images and videos. </a:t>
             </a:r>
           </a:p>
           <a:p>
@@ -4220,7 +4140,7 @@
             <a:pPr lvl="1"/>
             <a:r>
               <a:rPr lang="en-US" dirty="0"/>
-              <a:t>def</a:t>
+              <a:t>Sentiment of a post is the attributed emotional tone or attitude that is expressed by the author in the post. It determines if the post has a positive, neutral, or negative sentiment. </a:t>
             </a:r>
           </a:p>
         </p:txBody>
@@ -4399,13 +4319,13 @@
           <a:p>
             <a:r>
               <a:rPr lang="en-US" dirty="0"/>
-              <a:t>Does the sentiment attached to a comment result in greater popularity?</a:t>
-            </a:r>
-          </a:p>
-          <a:p>
-            <a:r>
-              <a:rPr lang="en-US" dirty="0"/>
-              <a:t>Does the number of words in a comment result in greater popularity?</a:t>
+              <a:t>Does the sentiment of a comment result in greater popularity?</a:t>
+            </a:r>
+          </a:p>
+          <a:p>
+            <a:r>
+              <a:rPr lang="en-US" dirty="0"/>
+              <a:t>Does the number of words in a comment result in greater popularity? </a:t>
             </a:r>
           </a:p>
           <a:p>
@@ -4421,16 +4341,18 @@
             </a:r>
           </a:p>
           <a:p>
-            <a:endParaRPr lang="en-US" dirty="0"/>
-          </a:p>
-          <a:p>
-            <a:r>
-              <a:rPr lang="en-US" dirty="0"/>
-              <a:t>Does the sentiment of a topic change over time consistently? </a:t>
-            </a:r>
-          </a:p>
-          <a:p>
-            <a:endParaRPr lang="en-US" dirty="0"/>
+            <a:pPr lvl="1"/>
+            <a:r>
+              <a:rPr lang="en-US" dirty="0"/>
+              <a:t>Monthly basis</a:t>
+            </a:r>
+          </a:p>
+          <a:p>
+            <a:pPr lvl="1"/>
+            <a:r>
+              <a:rPr lang="en-US" dirty="0"/>
+              <a:t>Daily basis</a:t>
+            </a:r>
           </a:p>
         </p:txBody>
       </p:sp>
@@ -4494,31 +4416,6 @@
       </p:sp>
       <p:sp>
         <p:nvSpPr>
-          <p:cNvPr id="3" name="Picture Placeholder 2">
-            <a:extLst>
-              <a:ext uri="{FF2B5EF4-FFF2-40B4-BE49-F238E27FC236}">
-                <a16:creationId xmlns:a16="http://schemas.microsoft.com/office/drawing/2014/main" id="{AAC666B5-62C1-8E06-E461-D091344B7AA7}"/>
-              </a:ext>
-            </a:extLst>
-          </p:cNvPr>
-          <p:cNvSpPr>
-            <a:spLocks noGrp="1"/>
-          </p:cNvSpPr>
-          <p:nvPr>
-            <p:ph type="pic" idx="1"/>
-          </p:nvPr>
-        </p:nvSpPr>
-        <p:spPr/>
-        <p:txBody>
-          <a:bodyPr/>
-          <a:lstStyle/>
-          <a:p>
-            <a:endParaRPr lang="en-US" dirty="0"/>
-          </a:p>
-        </p:txBody>
-      </p:sp>
-      <p:sp>
-        <p:nvSpPr>
           <p:cNvPr id="4" name="Text Placeholder 3">
             <a:extLst>
               <a:ext uri="{FF2B5EF4-FFF2-40B4-BE49-F238E27FC236}">
@@ -4533,19 +4430,119 @@
             <p:ph type="body" sz="half" idx="2"/>
           </p:nvPr>
         </p:nvSpPr>
-        <p:spPr/>
-        <p:txBody>
-          <a:bodyPr/>
+        <p:spPr>
+          <a:xfrm>
+            <a:off x="723900" y="2855967"/>
+            <a:ext cx="3855720" cy="3677567"/>
+          </a:xfrm>
+        </p:spPr>
+        <p:txBody>
+          <a:bodyPr>
+            <a:normAutofit lnSpcReduction="10000"/>
+          </a:bodyPr>
           <a:lstStyle/>
           <a:p>
             <a:pPr marL="285750" indent="-285750">
               <a:buFont typeface="Arial" panose="020B0604020202020204" pitchFamily="34" charset="0"/>
               <a:buChar char="•"/>
             </a:pPr>
-            <a:endParaRPr lang="en-US" dirty="0"/>
-          </a:p>
-        </p:txBody>
-      </p:sp>
+            <a:r>
+              <a:rPr lang="en-US" dirty="0"/>
+              <a:t>Popularity of a comment and the sentiment attached to it does not have a strong correlation. Contrary to our thesis.</a:t>
+            </a:r>
+          </a:p>
+          <a:p>
+            <a:pPr marL="285750" indent="-285750">
+              <a:buFont typeface="Arial" panose="020B0604020202020204" pitchFamily="34" charset="0"/>
+              <a:buChar char="•"/>
+            </a:pPr>
+            <a:r>
+              <a:rPr lang="en-US" dirty="0"/>
+              <a:t>Graph 1 shows the most popular comments made on a trucker rally subreddit and its sentiment.</a:t>
+            </a:r>
+          </a:p>
+          <a:p>
+            <a:pPr marL="285750" indent="-285750">
+              <a:buFont typeface="Arial" panose="020B0604020202020204" pitchFamily="34" charset="0"/>
+              <a:buChar char="•"/>
+            </a:pPr>
+            <a:r>
+              <a:rPr lang="en-US" dirty="0"/>
+              <a:t>Graph 2 shows the most popular comments made on a bitcoin subreddit and its sentiment. </a:t>
+            </a:r>
+          </a:p>
+          <a:p>
+            <a:pPr marL="285750" indent="-285750">
+              <a:buFont typeface="Arial" panose="020B0604020202020204" pitchFamily="34" charset="0"/>
+              <a:buChar char="•"/>
+            </a:pPr>
+            <a:r>
+              <a:rPr lang="en-US" dirty="0"/>
+              <a:t>Both have 0 correlation coefficients. (KYLE)</a:t>
+            </a:r>
+          </a:p>
+        </p:txBody>
+      </p:sp>
+      <p:pic>
+        <p:nvPicPr>
+          <p:cNvPr id="10" name="Picture 9" descr="A graph with red lines and numbers&#10;&#10;Description automatically generated">
+            <a:extLst>
+              <a:ext uri="{FF2B5EF4-FFF2-40B4-BE49-F238E27FC236}">
+                <a16:creationId xmlns:a16="http://schemas.microsoft.com/office/drawing/2014/main" id="{27222B04-54FF-F965-3820-50A3308CCDD7}"/>
+              </a:ext>
+            </a:extLst>
+          </p:cNvPr>
+          <p:cNvPicPr>
+            <a:picLocks noChangeAspect="1"/>
+          </p:cNvPicPr>
+          <p:nvPr/>
+        </p:nvPicPr>
+        <p:blipFill>
+          <a:blip r:embed="rId2"/>
+          <a:stretch>
+            <a:fillRect/>
+          </a:stretch>
+        </p:blipFill>
+        <p:spPr>
+          <a:xfrm>
+            <a:off x="5611168" y="46474"/>
+            <a:ext cx="6580832" cy="3290416"/>
+          </a:xfrm>
+          <a:prstGeom prst="rect">
+            <a:avLst/>
+          </a:prstGeom>
+        </p:spPr>
+      </p:pic>
+      <p:pic>
+        <p:nvPicPr>
+          <p:cNvPr id="12" name="Picture 11" descr="A graph of a graph with red lines&#10;&#10;Description automatically generated with medium confidence">
+            <a:extLst>
+              <a:ext uri="{FF2B5EF4-FFF2-40B4-BE49-F238E27FC236}">
+                <a16:creationId xmlns:a16="http://schemas.microsoft.com/office/drawing/2014/main" id="{CD77052F-F169-12FC-34CB-5E1908F690AA}"/>
+              </a:ext>
+            </a:extLst>
+          </p:cNvPr>
+          <p:cNvPicPr>
+            <a:picLocks noChangeAspect="1"/>
+          </p:cNvPicPr>
+          <p:nvPr/>
+        </p:nvPicPr>
+        <p:blipFill>
+          <a:blip r:embed="rId3"/>
+          <a:stretch>
+            <a:fillRect/>
+          </a:stretch>
+        </p:blipFill>
+        <p:spPr>
+          <a:xfrm>
+            <a:off x="5611168" y="3429000"/>
+            <a:ext cx="6580832" cy="3290416"/>
+          </a:xfrm>
+          <a:prstGeom prst="rect">
+            <a:avLst/>
+          </a:prstGeom>
+        </p:spPr>
+      </p:pic>
     </p:spTree>
     <p:extLst>
       <p:ext uri="{BB962C8B-B14F-4D97-AF65-F5344CB8AC3E}">
@@ -4599,33 +4596,8 @@
           <a:p>
             <a:r>
               <a:rPr lang="en-US" dirty="0"/>
-              <a:t>Word count and Popularity</a:t>
-            </a:r>
-          </a:p>
-        </p:txBody>
-      </p:sp>
-      <p:sp>
-        <p:nvSpPr>
-          <p:cNvPr id="3" name="Picture Placeholder 2">
-            <a:extLst>
-              <a:ext uri="{FF2B5EF4-FFF2-40B4-BE49-F238E27FC236}">
-                <a16:creationId xmlns:a16="http://schemas.microsoft.com/office/drawing/2014/main" id="{BE0A1128-D130-F5BF-148A-BEDA1EC6F468}"/>
-              </a:ext>
-            </a:extLst>
-          </p:cNvPr>
-          <p:cNvSpPr>
-            <a:spLocks noGrp="1"/>
-          </p:cNvSpPr>
-          <p:nvPr>
-            <p:ph type="pic" idx="1"/>
-          </p:nvPr>
-        </p:nvSpPr>
-        <p:spPr/>
-        <p:txBody>
-          <a:bodyPr/>
-          <a:lstStyle/>
-          <a:p>
-            <a:endParaRPr lang="en-US"/>
+              <a:t>Popularity and Word count</a:t>
+            </a:r>
           </a:p>
         </p:txBody>
       </p:sp>
@@ -4647,13 +4619,112 @@
         </p:nvSpPr>
         <p:spPr/>
         <p:txBody>
-          <a:bodyPr/>
+          <a:bodyPr>
+            <a:normAutofit lnSpcReduction="10000"/>
+          </a:bodyPr>
           <a:lstStyle/>
           <a:p>
-            <a:endParaRPr lang="en-US"/>
-          </a:p>
-        </p:txBody>
-      </p:sp>
+            <a:pPr marL="285750" indent="-285750">
+              <a:buFont typeface="Arial" panose="020B0604020202020204" pitchFamily="34" charset="0"/>
+              <a:buChar char="•"/>
+            </a:pPr>
+            <a:r>
+              <a:rPr lang="en-US" dirty="0"/>
+              <a:t>Popularity of a comment and the number of words in the comment has an interesting trend. The number of words in a comment is generally centralized. The score varies.</a:t>
+            </a:r>
+          </a:p>
+          <a:p>
+            <a:pPr marL="285750" indent="-285750">
+              <a:buFont typeface="Arial" panose="020B0604020202020204" pitchFamily="34" charset="0"/>
+              <a:buChar char="•"/>
+            </a:pPr>
+            <a:r>
+              <a:rPr lang="en-US" dirty="0"/>
+              <a:t>Graph 1 displays the average scores for all the posts from doge</a:t>
+            </a:r>
+          </a:p>
+          <a:p>
+            <a:pPr marL="285750" indent="-285750">
+              <a:buFont typeface="Arial" panose="020B0604020202020204" pitchFamily="34" charset="0"/>
+              <a:buChar char="•"/>
+            </a:pPr>
+            <a:r>
+              <a:rPr lang="en-US" dirty="0"/>
+              <a:t>Graph 2 displays the trucker posts</a:t>
+            </a:r>
+          </a:p>
+          <a:p>
+            <a:pPr marL="285750" indent="-285750">
+              <a:buFont typeface="Arial" panose="020B0604020202020204" pitchFamily="34" charset="0"/>
+              <a:buChar char="•"/>
+            </a:pPr>
+            <a:r>
+              <a:rPr lang="en-US" dirty="0"/>
+              <a:t>Correlation coefficient (KYLE)</a:t>
+            </a:r>
+          </a:p>
+        </p:txBody>
+      </p:sp>
+      <p:pic>
+        <p:nvPicPr>
+          <p:cNvPr id="6" name="Picture 5" descr="A graph with red lines and a point&#10;&#10;Description automatically generated">
+            <a:extLst>
+              <a:ext uri="{FF2B5EF4-FFF2-40B4-BE49-F238E27FC236}">
+                <a16:creationId xmlns:a16="http://schemas.microsoft.com/office/drawing/2014/main" id="{E5C2D1F2-5F7A-3A68-A285-DCB5F60DB1A8}"/>
+              </a:ext>
+            </a:extLst>
+          </p:cNvPr>
+          <p:cNvPicPr>
+            <a:picLocks noChangeAspect="1"/>
+          </p:cNvPicPr>
+          <p:nvPr/>
+        </p:nvPicPr>
+        <p:blipFill>
+          <a:blip r:embed="rId2"/>
+          <a:stretch>
+            <a:fillRect/>
+          </a:stretch>
+        </p:blipFill>
+        <p:spPr>
+          <a:xfrm>
+            <a:off x="6239933" y="0"/>
+            <a:ext cx="5343315" cy="3205989"/>
+          </a:xfrm>
+          <a:prstGeom prst="rect">
+            <a:avLst/>
+          </a:prstGeom>
+        </p:spPr>
+      </p:pic>
+      <p:pic>
+        <p:nvPicPr>
+          <p:cNvPr id="8" name="Picture 7" descr="A graph with red lines&#10;&#10;Description automatically generated">
+            <a:extLst>
+              <a:ext uri="{FF2B5EF4-FFF2-40B4-BE49-F238E27FC236}">
+                <a16:creationId xmlns:a16="http://schemas.microsoft.com/office/drawing/2014/main" id="{551663B7-D39A-63D1-B055-858E54DC7C86}"/>
+              </a:ext>
+            </a:extLst>
+          </p:cNvPr>
+          <p:cNvPicPr>
+            <a:picLocks noChangeAspect="1"/>
+          </p:cNvPicPr>
+          <p:nvPr/>
+        </p:nvPicPr>
+        <p:blipFill>
+          <a:blip r:embed="rId3"/>
+          <a:stretch>
+            <a:fillRect/>
+          </a:stretch>
+        </p:blipFill>
+        <p:spPr>
+          <a:xfrm>
+            <a:off x="6239933" y="3205989"/>
+            <a:ext cx="5343315" cy="3205989"/>
+          </a:xfrm>
+          <a:prstGeom prst="rect">
+            <a:avLst/>
+          </a:prstGeom>
+        </p:spPr>
+      </p:pic>
     </p:spTree>
     <p:extLst>
       <p:ext uri="{BB962C8B-B14F-4D97-AF65-F5344CB8AC3E}">
@@ -4689,7 +4760,7 @@
           <p:cNvPr id="2" name="Title 1">
             <a:extLst>
               <a:ext uri="{FF2B5EF4-FFF2-40B4-BE49-F238E27FC236}">
-                <a16:creationId xmlns:a16="http://schemas.microsoft.com/office/drawing/2014/main" id="{CF978DA4-508F-A1A1-63E1-8DD7AEB9EBA4}"/>
+                <a16:creationId xmlns:a16="http://schemas.microsoft.com/office/drawing/2014/main" id="{FA6AD1CD-A117-08F6-220D-D063E506C182}"/>
               </a:ext>
             </a:extLst>
           </p:cNvPr>
@@ -4702,22 +4773,24 @@
         </p:nvSpPr>
         <p:spPr/>
         <p:txBody>
-          <a:bodyPr/>
+          <a:bodyPr>
+            <a:normAutofit/>
+          </a:bodyPr>
           <a:lstStyle/>
           <a:p>
             <a:r>
               <a:rPr lang="en-US" dirty="0"/>
-              <a:t>Popularity and Engagement</a:t>
-            </a:r>
-          </a:p>
-        </p:txBody>
-      </p:sp>
-      <p:sp>
-        <p:nvSpPr>
-          <p:cNvPr id="3" name="Content Placeholder 2">
+              <a:t>Popularity and Creation Time (trends)</a:t>
+            </a:r>
+          </a:p>
+        </p:txBody>
+      </p:sp>
+      <p:sp>
+        <p:nvSpPr>
+          <p:cNvPr id="4" name="Text Placeholder 3">
             <a:extLst>
               <a:ext uri="{FF2B5EF4-FFF2-40B4-BE49-F238E27FC236}">
-                <a16:creationId xmlns:a16="http://schemas.microsoft.com/office/drawing/2014/main" id="{D12BBB39-3599-AB55-A653-23BD619C164A}"/>
+                <a16:creationId xmlns:a16="http://schemas.microsoft.com/office/drawing/2014/main" id="{6797FB20-DA8D-D1B1-4DBD-954B97FB86FD}"/>
               </a:ext>
             </a:extLst>
           </p:cNvPr>
@@ -4725,7 +4798,7 @@
             <a:spLocks noGrp="1"/>
           </p:cNvSpPr>
           <p:nvPr>
-            <p:ph idx="1"/>
+            <p:ph type="body" sz="half" idx="2"/>
           </p:nvPr>
         </p:nvSpPr>
         <p:spPr/>
@@ -4733,39 +4806,14 @@
           <a:bodyPr/>
           <a:lstStyle/>
           <a:p>
-            <a:endParaRPr lang="en-US"/>
-          </a:p>
-        </p:txBody>
-      </p:sp>
-      <p:sp>
-        <p:nvSpPr>
-          <p:cNvPr id="4" name="Text Placeholder 3">
-            <a:extLst>
-              <a:ext uri="{FF2B5EF4-FFF2-40B4-BE49-F238E27FC236}">
-                <a16:creationId xmlns:a16="http://schemas.microsoft.com/office/drawing/2014/main" id="{0FF4B81E-0DE2-9F11-2B50-516B630D00B1}"/>
-              </a:ext>
-            </a:extLst>
-          </p:cNvPr>
-          <p:cNvSpPr>
-            <a:spLocks noGrp="1"/>
-          </p:cNvSpPr>
-          <p:nvPr>
-            <p:ph type="body" sz="half" idx="2"/>
-          </p:nvPr>
-        </p:nvSpPr>
-        <p:spPr/>
-        <p:txBody>
-          <a:bodyPr/>
-          <a:lstStyle/>
-          <a:p>
-            <a:endParaRPr lang="en-US"/>
+            <a:endParaRPr lang="en-US" dirty="0"/>
           </a:p>
         </p:txBody>
       </p:sp>
     </p:spTree>
     <p:extLst>
       <p:ext uri="{BB962C8B-B14F-4D97-AF65-F5344CB8AC3E}">
-        <p14:creationId xmlns:p14="http://schemas.microsoft.com/office/powerpoint/2010/main" val="603482757"/>
+        <p14:creationId xmlns:p14="http://schemas.microsoft.com/office/powerpoint/2010/main" val="155512845"/>
       </p:ext>
     </p:extLst>
   </p:cSld>
@@ -4797,7 +4845,7 @@
           <p:cNvPr id="2" name="Title 1">
             <a:extLst>
               <a:ext uri="{FF2B5EF4-FFF2-40B4-BE49-F238E27FC236}">
-                <a16:creationId xmlns:a16="http://schemas.microsoft.com/office/drawing/2014/main" id="{FA6AD1CD-A117-08F6-220D-D063E506C182}"/>
+                <a16:creationId xmlns:a16="http://schemas.microsoft.com/office/drawing/2014/main" id="{D7775DF6-0F8B-BB61-9868-31BC576D97F7}"/>
               </a:ext>
             </a:extLst>
           </p:cNvPr>
@@ -4815,17 +4863,17 @@
           <a:p>
             <a:r>
               <a:rPr lang="en-US" dirty="0"/>
-              <a:t>Creation Time and Popularity</a:t>
-            </a:r>
-          </a:p>
-        </p:txBody>
-      </p:sp>
-      <p:sp>
-        <p:nvSpPr>
-          <p:cNvPr id="3" name="Picture Placeholder 2">
+              <a:t>Popularity and Creation Time (daily)</a:t>
+            </a:r>
+          </a:p>
+        </p:txBody>
+      </p:sp>
+      <p:sp>
+        <p:nvSpPr>
+          <p:cNvPr id="4" name="Text Placeholder 3">
             <a:extLst>
               <a:ext uri="{FF2B5EF4-FFF2-40B4-BE49-F238E27FC236}">
-                <a16:creationId xmlns:a16="http://schemas.microsoft.com/office/drawing/2014/main" id="{092B06B9-CC25-1B46-8058-ABE61FEBF2B3}"/>
+                <a16:creationId xmlns:a16="http://schemas.microsoft.com/office/drawing/2014/main" id="{DE0DCA57-400B-3D42-18C0-BA82673C48AF}"/>
               </a:ext>
             </a:extLst>
           </p:cNvPr>
@@ -4833,31 +4881,6 @@
             <a:spLocks noGrp="1"/>
           </p:cNvSpPr>
           <p:nvPr>
-            <p:ph type="pic" idx="1"/>
-          </p:nvPr>
-        </p:nvSpPr>
-        <p:spPr/>
-        <p:txBody>
-          <a:bodyPr/>
-          <a:lstStyle/>
-          <a:p>
-            <a:endParaRPr lang="en-US"/>
-          </a:p>
-        </p:txBody>
-      </p:sp>
-      <p:sp>
-        <p:nvSpPr>
-          <p:cNvPr id="4" name="Text Placeholder 3">
-            <a:extLst>
-              <a:ext uri="{FF2B5EF4-FFF2-40B4-BE49-F238E27FC236}">
-                <a16:creationId xmlns:a16="http://schemas.microsoft.com/office/drawing/2014/main" id="{6797FB20-DA8D-D1B1-4DBD-954B97FB86FD}"/>
-              </a:ext>
-            </a:extLst>
-          </p:cNvPr>
-          <p:cNvSpPr>
-            <a:spLocks noGrp="1"/>
-          </p:cNvSpPr>
-          <p:nvPr>
             <p:ph type="body" sz="half" idx="2"/>
           </p:nvPr>
         </p:nvSpPr>
@@ -4873,7 +4896,7 @@
     </p:spTree>
     <p:extLst>
       <p:ext uri="{BB962C8B-B14F-4D97-AF65-F5344CB8AC3E}">
-        <p14:creationId xmlns:p14="http://schemas.microsoft.com/office/powerpoint/2010/main" val="155512845"/>
+        <p14:creationId xmlns:p14="http://schemas.microsoft.com/office/powerpoint/2010/main" val="2961825029"/>
       </p:ext>
     </p:extLst>
   </p:cSld>
@@ -4905,7 +4928,7 @@
           <p:cNvPr id="2" name="Title 1">
             <a:extLst>
               <a:ext uri="{FF2B5EF4-FFF2-40B4-BE49-F238E27FC236}">
-                <a16:creationId xmlns:a16="http://schemas.microsoft.com/office/drawing/2014/main" id="{D7775DF6-0F8B-BB61-9868-31BC576D97F7}"/>
+                <a16:creationId xmlns:a16="http://schemas.microsoft.com/office/drawing/2014/main" id="{7F827039-6E61-C72B-A83A-D830053DAA4A}"/>
               </a:ext>
             </a:extLst>
           </p:cNvPr>
@@ -4923,7 +4946,7 @@
           <a:p>
             <a:r>
               <a:rPr lang="en-US" dirty="0"/>
-              <a:t>Sentiment Change Over Time</a:t>
+              <a:t>Conclusions</a:t>
             </a:r>
           </a:p>
         </p:txBody>
@@ -4933,7 +4956,7 @@
           <p:cNvPr id="3" name="Content Placeholder 2">
             <a:extLst>
               <a:ext uri="{FF2B5EF4-FFF2-40B4-BE49-F238E27FC236}">
-                <a16:creationId xmlns:a16="http://schemas.microsoft.com/office/drawing/2014/main" id="{FAE61A4E-345E-8B49-4C15-16908781A3D5}"/>
+                <a16:creationId xmlns:a16="http://schemas.microsoft.com/office/drawing/2014/main" id="{C6B62D51-3CF9-BCC7-DB8B-E204750FA37E}"/>
               </a:ext>
             </a:extLst>
           </p:cNvPr>
@@ -4953,35 +4976,10 @@
           </a:p>
         </p:txBody>
       </p:sp>
-      <p:sp>
-        <p:nvSpPr>
-          <p:cNvPr id="4" name="Text Placeholder 3">
-            <a:extLst>
-              <a:ext uri="{FF2B5EF4-FFF2-40B4-BE49-F238E27FC236}">
-                <a16:creationId xmlns:a16="http://schemas.microsoft.com/office/drawing/2014/main" id="{DE0DCA57-400B-3D42-18C0-BA82673C48AF}"/>
-              </a:ext>
-            </a:extLst>
-          </p:cNvPr>
-          <p:cNvSpPr>
-            <a:spLocks noGrp="1"/>
-          </p:cNvSpPr>
-          <p:nvPr>
-            <p:ph type="body" sz="half" idx="2"/>
-          </p:nvPr>
-        </p:nvSpPr>
-        <p:spPr/>
-        <p:txBody>
-          <a:bodyPr/>
-          <a:lstStyle/>
-          <a:p>
-            <a:endParaRPr lang="en-US"/>
-          </a:p>
-        </p:txBody>
-      </p:sp>
     </p:spTree>
     <p:extLst>
       <p:ext uri="{BB962C8B-B14F-4D97-AF65-F5344CB8AC3E}">
-        <p14:creationId xmlns:p14="http://schemas.microsoft.com/office/powerpoint/2010/main" val="2961825029"/>
+        <p14:creationId xmlns:p14="http://schemas.microsoft.com/office/powerpoint/2010/main" val="3068166918"/>
       </p:ext>
     </p:extLst>
   </p:cSld>

</xml_diff>

<commit_message>
-Finished running dayTimeCreationAndScore.py -Added more data to presentation -Added graph files
</commit_message>
<xml_diff>
--- a/presentation.pptx
+++ b/presentation.pptx
@@ -4780,7 +4780,7 @@
           <a:p>
             <a:r>
               <a:rPr lang="en-US" dirty="0"/>
-              <a:t>Popularity and Creation Time (trends)</a:t>
+              <a:t>Popularity and Creation Time (month)</a:t>
             </a:r>
           </a:p>
         </p:txBody>
@@ -4886,13 +4886,150 @@
         </p:nvSpPr>
         <p:spPr/>
         <p:txBody>
-          <a:bodyPr/>
+          <a:bodyPr>
+            <a:normAutofit lnSpcReduction="10000"/>
+          </a:bodyPr>
           <a:lstStyle/>
           <a:p>
-            <a:endParaRPr lang="en-US"/>
-          </a:p>
-        </p:txBody>
-      </p:sp>
+            <a:pPr marL="285750" indent="-285750">
+              <a:buFont typeface="Arial" panose="020B0604020202020204" pitchFamily="34" charset="0"/>
+              <a:buChar char="•"/>
+            </a:pPr>
+            <a:r>
+              <a:rPr lang="en-US" dirty="0"/>
+              <a:t>Popularity of a comment and the time of day in which it is posted has a very similar trend across multiple subreddits. Peak hours all falling around 12 while valleys occur around 8 and 16.</a:t>
+            </a:r>
+          </a:p>
+          <a:p>
+            <a:pPr marL="285750" indent="-285750">
+              <a:buFont typeface="Arial" panose="020B0604020202020204" pitchFamily="34" charset="0"/>
+              <a:buChar char="•"/>
+            </a:pPr>
+            <a:r>
+              <a:rPr lang="en-US" dirty="0"/>
+              <a:t>Graph 1 </a:t>
+            </a:r>
+            <a:r>
+              <a:rPr lang="en-US" dirty="0" err="1"/>
+              <a:t>NoNewNormal</a:t>
+            </a:r>
+            <a:r>
+              <a:rPr lang="en-US" dirty="0"/>
+              <a:t> subreddit</a:t>
+            </a:r>
+          </a:p>
+          <a:p>
+            <a:pPr marL="285750" indent="-285750">
+              <a:buFont typeface="Arial" panose="020B0604020202020204" pitchFamily="34" charset="0"/>
+              <a:buChar char="•"/>
+            </a:pPr>
+            <a:r>
+              <a:rPr lang="en-US" dirty="0"/>
+              <a:t>Graph 2 Doge subreddit</a:t>
+            </a:r>
+          </a:p>
+          <a:p>
+            <a:pPr marL="285750" indent="-285750">
+              <a:buFont typeface="Arial" panose="020B0604020202020204" pitchFamily="34" charset="0"/>
+              <a:buChar char="•"/>
+            </a:pPr>
+            <a:r>
+              <a:rPr lang="en-US" dirty="0"/>
+              <a:t>Graph 3 Trucker subreddit</a:t>
+            </a:r>
+          </a:p>
+        </p:txBody>
+      </p:sp>
+      <p:pic>
+        <p:nvPicPr>
+          <p:cNvPr id="5" name="Picture 4" descr="A graph of a graph&#10;&#10;Description automatically generated with medium confidence">
+            <a:extLst>
+              <a:ext uri="{FF2B5EF4-FFF2-40B4-BE49-F238E27FC236}">
+                <a16:creationId xmlns:a16="http://schemas.microsoft.com/office/drawing/2014/main" id="{72764A14-2A1F-798D-4539-A13430A812A5}"/>
+              </a:ext>
+            </a:extLst>
+          </p:cNvPr>
+          <p:cNvPicPr>
+            <a:picLocks noChangeAspect="1"/>
+          </p:cNvPicPr>
+          <p:nvPr/>
+        </p:nvPicPr>
+        <p:blipFill>
+          <a:blip r:embed="rId2"/>
+          <a:stretch>
+            <a:fillRect/>
+          </a:stretch>
+        </p:blipFill>
+        <p:spPr>
+          <a:xfrm>
+            <a:off x="6501032" y="0"/>
+            <a:ext cx="4579620" cy="2289810"/>
+          </a:xfrm>
+          <a:prstGeom prst="rect">
+            <a:avLst/>
+          </a:prstGeom>
+        </p:spPr>
+      </p:pic>
+      <p:pic>
+        <p:nvPicPr>
+          <p:cNvPr id="9" name="Picture 8" descr="A graph of a graph&#10;&#10;Description automatically generated with medium confidence">
+            <a:extLst>
+              <a:ext uri="{FF2B5EF4-FFF2-40B4-BE49-F238E27FC236}">
+                <a16:creationId xmlns:a16="http://schemas.microsoft.com/office/drawing/2014/main" id="{BA092A26-06CB-1E54-9C85-ABF2A97C8A4E}"/>
+              </a:ext>
+            </a:extLst>
+          </p:cNvPr>
+          <p:cNvPicPr>
+            <a:picLocks noChangeAspect="1"/>
+          </p:cNvPicPr>
+          <p:nvPr/>
+        </p:nvPicPr>
+        <p:blipFill>
+          <a:blip r:embed="rId3"/>
+          <a:stretch>
+            <a:fillRect/>
+          </a:stretch>
+        </p:blipFill>
+        <p:spPr>
+          <a:xfrm>
+            <a:off x="6501032" y="2284094"/>
+            <a:ext cx="4579621" cy="2289811"/>
+          </a:xfrm>
+          <a:prstGeom prst="rect">
+            <a:avLst/>
+          </a:prstGeom>
+        </p:spPr>
+      </p:pic>
+      <p:pic>
+        <p:nvPicPr>
+          <p:cNvPr id="11" name="Picture 10" descr="A graph of a graph&#10;&#10;Description automatically generated with medium confidence">
+            <a:extLst>
+              <a:ext uri="{FF2B5EF4-FFF2-40B4-BE49-F238E27FC236}">
+                <a16:creationId xmlns:a16="http://schemas.microsoft.com/office/drawing/2014/main" id="{1E361C55-23C8-984C-225C-CED2C2EC6DCE}"/>
+              </a:ext>
+            </a:extLst>
+          </p:cNvPr>
+          <p:cNvPicPr>
+            <a:picLocks noChangeAspect="1"/>
+          </p:cNvPicPr>
+          <p:nvPr/>
+        </p:nvPicPr>
+        <p:blipFill>
+          <a:blip r:embed="rId4"/>
+          <a:stretch>
+            <a:fillRect/>
+          </a:stretch>
+        </p:blipFill>
+        <p:spPr>
+          <a:xfrm>
+            <a:off x="6501032" y="4573904"/>
+            <a:ext cx="4579620" cy="2289810"/>
+          </a:xfrm>
+          <a:prstGeom prst="rect">
+            <a:avLst/>
+          </a:prstGeom>
+        </p:spPr>
+      </p:pic>
     </p:spTree>
     <p:extLst>
       <p:ext uri="{BB962C8B-B14F-4D97-AF65-F5344CB8AC3E}">

</xml_diff>

<commit_message>
-Added more data to presentation
</commit_message>
<xml_diff>
--- a/presentation.pptx
+++ b/presentation.pptx
@@ -3867,16 +3867,13 @@
           <a:p>
             <a:r>
               <a:rPr lang="en-US" dirty="0"/>
-              <a:t>By: Kyle </a:t>
+              <a:t>By: Eva Tarr and Kyle </a:t>
             </a:r>
             <a:r>
               <a:rPr lang="en-US" dirty="0" err="1"/>
               <a:t>Krawec</a:t>
             </a:r>
-            <a:r>
-              <a:rPr lang="en-US" dirty="0"/>
-              <a:t> and Eva Tarr</a:t>
-            </a:r>
+            <a:endParaRPr lang="en-US" dirty="0"/>
           </a:p>
         </p:txBody>
       </p:sp>

</xml_diff>

<commit_message>
-Updated presentation and report
</commit_message>
<xml_diff>
--- a/presentation.pptx
+++ b/presentation.pptx
@@ -4,6 +4,9 @@
   <p:sldMasterIdLst>
     <p:sldMasterId id="2147483648" r:id="rId1"/>
   </p:sldMasterIdLst>
+  <p:notesMasterIdLst>
+    <p:notesMasterId r:id="rId14"/>
+  </p:notesMasterIdLst>
   <p:sldIdLst>
     <p:sldId id="256" r:id="rId2"/>
     <p:sldId id="266" r:id="rId3"/>
@@ -13,9 +16,10 @@
     <p:sldId id="259" r:id="rId7"/>
     <p:sldId id="261" r:id="rId8"/>
     <p:sldId id="262" r:id="rId9"/>
-    <p:sldId id="263" r:id="rId10"/>
-    <p:sldId id="265" r:id="rId11"/>
-    <p:sldId id="264" r:id="rId12"/>
+    <p:sldId id="268" r:id="rId10"/>
+    <p:sldId id="263" r:id="rId11"/>
+    <p:sldId id="265" r:id="rId12"/>
+    <p:sldId id="264" r:id="rId13"/>
   </p:sldIdLst>
   <p:sldSz cx="12192000" cy="6858000"/>
   <p:notesSz cx="6858000" cy="9144000"/>
@@ -120,6 +124,523 @@
     </p:ext>
   </p:extLst>
 </p:presentation>
+</file>
+
+<file path=ppt/notesMasters/notesMaster1.xml><?xml version="1.0" encoding="utf-8"?>
+<p:notesMaster xmlns:a="http://schemas.openxmlformats.org/drawingml/2006/main" xmlns:r="http://schemas.openxmlformats.org/officeDocument/2006/relationships" xmlns:p="http://schemas.openxmlformats.org/presentationml/2006/main">
+  <p:cSld>
+    <p:bg>
+      <p:bgRef idx="1001">
+        <a:schemeClr val="bg1"/>
+      </p:bgRef>
+    </p:bg>
+    <p:spTree>
+      <p:nvGrpSpPr>
+        <p:cNvPr id="1" name=""/>
+        <p:cNvGrpSpPr/>
+        <p:nvPr/>
+      </p:nvGrpSpPr>
+      <p:grpSpPr>
+        <a:xfrm>
+          <a:off x="0" y="0"/>
+          <a:ext cx="0" cy="0"/>
+          <a:chOff x="0" y="0"/>
+          <a:chExt cx="0" cy="0"/>
+        </a:xfrm>
+      </p:grpSpPr>
+      <p:sp>
+        <p:nvSpPr>
+          <p:cNvPr id="2" name="Header Placeholder 1"/>
+          <p:cNvSpPr>
+            <a:spLocks noGrp="1"/>
+          </p:cNvSpPr>
+          <p:nvPr>
+            <p:ph type="hdr" sz="quarter"/>
+          </p:nvPr>
+        </p:nvSpPr>
+        <p:spPr>
+          <a:xfrm>
+            <a:off x="0" y="0"/>
+            <a:ext cx="2971800" cy="458788"/>
+          </a:xfrm>
+          <a:prstGeom prst="rect">
+            <a:avLst/>
+          </a:prstGeom>
+        </p:spPr>
+        <p:txBody>
+          <a:bodyPr vert="horz" lIns="91440" tIns="45720" rIns="91440" bIns="45720" rtlCol="0"/>
+          <a:lstStyle>
+            <a:lvl1pPr algn="l">
+              <a:defRPr sz="1200"/>
+            </a:lvl1pPr>
+          </a:lstStyle>
+          <a:p>
+            <a:endParaRPr lang="en-US"/>
+          </a:p>
+        </p:txBody>
+      </p:sp>
+      <p:sp>
+        <p:nvSpPr>
+          <p:cNvPr id="3" name="Date Placeholder 2"/>
+          <p:cNvSpPr>
+            <a:spLocks noGrp="1"/>
+          </p:cNvSpPr>
+          <p:nvPr>
+            <p:ph type="dt" idx="1"/>
+          </p:nvPr>
+        </p:nvSpPr>
+        <p:spPr>
+          <a:xfrm>
+            <a:off x="3884613" y="0"/>
+            <a:ext cx="2971800" cy="458788"/>
+          </a:xfrm>
+          <a:prstGeom prst="rect">
+            <a:avLst/>
+          </a:prstGeom>
+        </p:spPr>
+        <p:txBody>
+          <a:bodyPr vert="horz" lIns="91440" tIns="45720" rIns="91440" bIns="45720" rtlCol="0"/>
+          <a:lstStyle>
+            <a:lvl1pPr algn="r">
+              <a:defRPr sz="1200"/>
+            </a:lvl1pPr>
+          </a:lstStyle>
+          <a:p>
+            <a:fld id="{E739E779-C954-044B-8D8E-BA4197E97735}" type="datetimeFigureOut">
+              <a:rPr lang="en-US" smtClean="0"/>
+              <a:t>11/18/23</a:t>
+            </a:fld>
+            <a:endParaRPr lang="en-US"/>
+          </a:p>
+        </p:txBody>
+      </p:sp>
+      <p:sp>
+        <p:nvSpPr>
+          <p:cNvPr id="4" name="Slide Image Placeholder 3"/>
+          <p:cNvSpPr>
+            <a:spLocks noGrp="1" noRot="1" noChangeAspect="1"/>
+          </p:cNvSpPr>
+          <p:nvPr>
+            <p:ph type="sldImg" idx="2"/>
+          </p:nvPr>
+        </p:nvSpPr>
+        <p:spPr>
+          <a:xfrm>
+            <a:off x="685800" y="1143000"/>
+            <a:ext cx="5486400" cy="3086100"/>
+          </a:xfrm>
+          <a:prstGeom prst="rect">
+            <a:avLst/>
+          </a:prstGeom>
+          <a:noFill/>
+          <a:ln w="12700">
+            <a:solidFill>
+              <a:prstClr val="black"/>
+            </a:solidFill>
+          </a:ln>
+        </p:spPr>
+        <p:txBody>
+          <a:bodyPr vert="horz" lIns="91440" tIns="45720" rIns="91440" bIns="45720" rtlCol="0" anchor="ctr"/>
+          <a:lstStyle/>
+          <a:p>
+            <a:endParaRPr lang="en-US"/>
+          </a:p>
+        </p:txBody>
+      </p:sp>
+      <p:sp>
+        <p:nvSpPr>
+          <p:cNvPr id="5" name="Notes Placeholder 4"/>
+          <p:cNvSpPr>
+            <a:spLocks noGrp="1"/>
+          </p:cNvSpPr>
+          <p:nvPr>
+            <p:ph type="body" sz="quarter" idx="3"/>
+          </p:nvPr>
+        </p:nvSpPr>
+        <p:spPr>
+          <a:xfrm>
+            <a:off x="685800" y="4400550"/>
+            <a:ext cx="5486400" cy="3600450"/>
+          </a:xfrm>
+          <a:prstGeom prst="rect">
+            <a:avLst/>
+          </a:prstGeom>
+        </p:spPr>
+        <p:txBody>
+          <a:bodyPr vert="horz" lIns="91440" tIns="45720" rIns="91440" bIns="45720" rtlCol="0"/>
+          <a:lstStyle/>
+          <a:p>
+            <a:pPr lvl="0"/>
+            <a:r>
+              <a:rPr lang="en-US"/>
+              <a:t>Click to edit Master text styles</a:t>
+            </a:r>
+          </a:p>
+          <a:p>
+            <a:pPr lvl="1"/>
+            <a:r>
+              <a:rPr lang="en-US"/>
+              <a:t>Second level</a:t>
+            </a:r>
+          </a:p>
+          <a:p>
+            <a:pPr lvl="2"/>
+            <a:r>
+              <a:rPr lang="en-US"/>
+              <a:t>Third level</a:t>
+            </a:r>
+          </a:p>
+          <a:p>
+            <a:pPr lvl="3"/>
+            <a:r>
+              <a:rPr lang="en-US"/>
+              <a:t>Fourth level</a:t>
+            </a:r>
+          </a:p>
+          <a:p>
+            <a:pPr lvl="4"/>
+            <a:r>
+              <a:rPr lang="en-US"/>
+              <a:t>Fifth level</a:t>
+            </a:r>
+          </a:p>
+        </p:txBody>
+      </p:sp>
+      <p:sp>
+        <p:nvSpPr>
+          <p:cNvPr id="6" name="Footer Placeholder 5"/>
+          <p:cNvSpPr>
+            <a:spLocks noGrp="1"/>
+          </p:cNvSpPr>
+          <p:nvPr>
+            <p:ph type="ftr" sz="quarter" idx="4"/>
+          </p:nvPr>
+        </p:nvSpPr>
+        <p:spPr>
+          <a:xfrm>
+            <a:off x="0" y="8685213"/>
+            <a:ext cx="2971800" cy="458787"/>
+          </a:xfrm>
+          <a:prstGeom prst="rect">
+            <a:avLst/>
+          </a:prstGeom>
+        </p:spPr>
+        <p:txBody>
+          <a:bodyPr vert="horz" lIns="91440" tIns="45720" rIns="91440" bIns="45720" rtlCol="0" anchor="b"/>
+          <a:lstStyle>
+            <a:lvl1pPr algn="l">
+              <a:defRPr sz="1200"/>
+            </a:lvl1pPr>
+          </a:lstStyle>
+          <a:p>
+            <a:endParaRPr lang="en-US"/>
+          </a:p>
+        </p:txBody>
+      </p:sp>
+      <p:sp>
+        <p:nvSpPr>
+          <p:cNvPr id="7" name="Slide Number Placeholder 6"/>
+          <p:cNvSpPr>
+            <a:spLocks noGrp="1"/>
+          </p:cNvSpPr>
+          <p:nvPr>
+            <p:ph type="sldNum" sz="quarter" idx="5"/>
+          </p:nvPr>
+        </p:nvSpPr>
+        <p:spPr>
+          <a:xfrm>
+            <a:off x="3884613" y="8685213"/>
+            <a:ext cx="2971800" cy="458787"/>
+          </a:xfrm>
+          <a:prstGeom prst="rect">
+            <a:avLst/>
+          </a:prstGeom>
+        </p:spPr>
+        <p:txBody>
+          <a:bodyPr vert="horz" lIns="91440" tIns="45720" rIns="91440" bIns="45720" rtlCol="0" anchor="b"/>
+          <a:lstStyle>
+            <a:lvl1pPr algn="r">
+              <a:defRPr sz="1200"/>
+            </a:lvl1pPr>
+          </a:lstStyle>
+          <a:p>
+            <a:fld id="{AA65BE39-5482-074B-AA8F-346DF8290411}" type="slidenum">
+              <a:rPr lang="en-US" smtClean="0"/>
+              <a:t>‹#›</a:t>
+            </a:fld>
+            <a:endParaRPr lang="en-US"/>
+          </a:p>
+        </p:txBody>
+      </p:sp>
+    </p:spTree>
+    <p:extLst>
+      <p:ext uri="{BB962C8B-B14F-4D97-AF65-F5344CB8AC3E}">
+        <p14:creationId xmlns:p14="http://schemas.microsoft.com/office/powerpoint/2010/main" val="1736983093"/>
+      </p:ext>
+    </p:extLst>
+  </p:cSld>
+  <p:clrMap bg1="lt1" tx1="dk1" bg2="lt2" tx2="dk2" accent1="accent1" accent2="accent2" accent3="accent3" accent4="accent4" accent5="accent5" accent6="accent6" hlink="hlink" folHlink="folHlink"/>
+  <p:notesStyle>
+    <a:lvl1pPr marL="0" algn="l" defTabSz="914400" rtl="0" eaLnBrk="1" latinLnBrk="0" hangingPunct="1">
+      <a:defRPr sz="1200" kern="1200">
+        <a:solidFill>
+          <a:schemeClr val="tx1"/>
+        </a:solidFill>
+        <a:latin typeface="+mn-lt"/>
+        <a:ea typeface="+mn-ea"/>
+        <a:cs typeface="+mn-cs"/>
+      </a:defRPr>
+    </a:lvl1pPr>
+    <a:lvl2pPr marL="457200" algn="l" defTabSz="914400" rtl="0" eaLnBrk="1" latinLnBrk="0" hangingPunct="1">
+      <a:defRPr sz="1200" kern="1200">
+        <a:solidFill>
+          <a:schemeClr val="tx1"/>
+        </a:solidFill>
+        <a:latin typeface="+mn-lt"/>
+        <a:ea typeface="+mn-ea"/>
+        <a:cs typeface="+mn-cs"/>
+      </a:defRPr>
+    </a:lvl2pPr>
+    <a:lvl3pPr marL="914400" algn="l" defTabSz="914400" rtl="0" eaLnBrk="1" latinLnBrk="0" hangingPunct="1">
+      <a:defRPr sz="1200" kern="1200">
+        <a:solidFill>
+          <a:schemeClr val="tx1"/>
+        </a:solidFill>
+        <a:latin typeface="+mn-lt"/>
+        <a:ea typeface="+mn-ea"/>
+        <a:cs typeface="+mn-cs"/>
+      </a:defRPr>
+    </a:lvl3pPr>
+    <a:lvl4pPr marL="1371600" algn="l" defTabSz="914400" rtl="0" eaLnBrk="1" latinLnBrk="0" hangingPunct="1">
+      <a:defRPr sz="1200" kern="1200">
+        <a:solidFill>
+          <a:schemeClr val="tx1"/>
+        </a:solidFill>
+        <a:latin typeface="+mn-lt"/>
+        <a:ea typeface="+mn-ea"/>
+        <a:cs typeface="+mn-cs"/>
+      </a:defRPr>
+    </a:lvl4pPr>
+    <a:lvl5pPr marL="1828800" algn="l" defTabSz="914400" rtl="0" eaLnBrk="1" latinLnBrk="0" hangingPunct="1">
+      <a:defRPr sz="1200" kern="1200">
+        <a:solidFill>
+          <a:schemeClr val="tx1"/>
+        </a:solidFill>
+        <a:latin typeface="+mn-lt"/>
+        <a:ea typeface="+mn-ea"/>
+        <a:cs typeface="+mn-cs"/>
+      </a:defRPr>
+    </a:lvl5pPr>
+    <a:lvl6pPr marL="2286000" algn="l" defTabSz="914400" rtl="0" eaLnBrk="1" latinLnBrk="0" hangingPunct="1">
+      <a:defRPr sz="1200" kern="1200">
+        <a:solidFill>
+          <a:schemeClr val="tx1"/>
+        </a:solidFill>
+        <a:latin typeface="+mn-lt"/>
+        <a:ea typeface="+mn-ea"/>
+        <a:cs typeface="+mn-cs"/>
+      </a:defRPr>
+    </a:lvl6pPr>
+    <a:lvl7pPr marL="2743200" algn="l" defTabSz="914400" rtl="0" eaLnBrk="1" latinLnBrk="0" hangingPunct="1">
+      <a:defRPr sz="1200" kern="1200">
+        <a:solidFill>
+          <a:schemeClr val="tx1"/>
+        </a:solidFill>
+        <a:latin typeface="+mn-lt"/>
+        <a:ea typeface="+mn-ea"/>
+        <a:cs typeface="+mn-cs"/>
+      </a:defRPr>
+    </a:lvl7pPr>
+    <a:lvl8pPr marL="3200400" algn="l" defTabSz="914400" rtl="0" eaLnBrk="1" latinLnBrk="0" hangingPunct="1">
+      <a:defRPr sz="1200" kern="1200">
+        <a:solidFill>
+          <a:schemeClr val="tx1"/>
+        </a:solidFill>
+        <a:latin typeface="+mn-lt"/>
+        <a:ea typeface="+mn-ea"/>
+        <a:cs typeface="+mn-cs"/>
+      </a:defRPr>
+    </a:lvl8pPr>
+    <a:lvl9pPr marL="3657600" algn="l" defTabSz="914400" rtl="0" eaLnBrk="1" latinLnBrk="0" hangingPunct="1">
+      <a:defRPr sz="1200" kern="1200">
+        <a:solidFill>
+          <a:schemeClr val="tx1"/>
+        </a:solidFill>
+        <a:latin typeface="+mn-lt"/>
+        <a:ea typeface="+mn-ea"/>
+        <a:cs typeface="+mn-cs"/>
+      </a:defRPr>
+    </a:lvl9pPr>
+  </p:notesStyle>
+</p:notesMaster>
+</file>
+
+<file path=ppt/notesSlides/notesSlide1.xml><?xml version="1.0" encoding="utf-8"?>
+<p:notes xmlns:a="http://schemas.openxmlformats.org/drawingml/2006/main" xmlns:r="http://schemas.openxmlformats.org/officeDocument/2006/relationships" xmlns:p="http://schemas.openxmlformats.org/presentationml/2006/main">
+  <p:cSld>
+    <p:spTree>
+      <p:nvGrpSpPr>
+        <p:cNvPr id="1" name=""/>
+        <p:cNvGrpSpPr/>
+        <p:nvPr/>
+      </p:nvGrpSpPr>
+      <p:grpSpPr>
+        <a:xfrm>
+          <a:off x="0" y="0"/>
+          <a:ext cx="0" cy="0"/>
+          <a:chOff x="0" y="0"/>
+          <a:chExt cx="0" cy="0"/>
+        </a:xfrm>
+      </p:grpSpPr>
+      <p:sp>
+        <p:nvSpPr>
+          <p:cNvPr id="2" name="Slide Image Placeholder 1"/>
+          <p:cNvSpPr>
+            <a:spLocks noGrp="1" noRot="1" noChangeAspect="1"/>
+          </p:cNvSpPr>
+          <p:nvPr>
+            <p:ph type="sldImg"/>
+          </p:nvPr>
+        </p:nvSpPr>
+        <p:spPr/>
+      </p:sp>
+      <p:sp>
+        <p:nvSpPr>
+          <p:cNvPr id="3" name="Notes Placeholder 2"/>
+          <p:cNvSpPr>
+            <a:spLocks noGrp="1"/>
+          </p:cNvSpPr>
+          <p:nvPr>
+            <p:ph type="body" idx="1"/>
+          </p:nvPr>
+        </p:nvSpPr>
+        <p:spPr/>
+        <p:txBody>
+          <a:bodyPr/>
+          <a:lstStyle/>
+          <a:p>
+            <a:endParaRPr lang="en-US" dirty="0"/>
+          </a:p>
+        </p:txBody>
+      </p:sp>
+      <p:sp>
+        <p:nvSpPr>
+          <p:cNvPr id="4" name="Slide Number Placeholder 3"/>
+          <p:cNvSpPr>
+            <a:spLocks noGrp="1"/>
+          </p:cNvSpPr>
+          <p:nvPr>
+            <p:ph type="sldNum" sz="quarter" idx="5"/>
+          </p:nvPr>
+        </p:nvSpPr>
+        <p:spPr/>
+        <p:txBody>
+          <a:bodyPr/>
+          <a:lstStyle/>
+          <a:p>
+            <a:fld id="{AA65BE39-5482-074B-AA8F-346DF8290411}" type="slidenum">
+              <a:rPr lang="en-US" smtClean="0"/>
+              <a:t>5</a:t>
+            </a:fld>
+            <a:endParaRPr lang="en-US"/>
+          </a:p>
+        </p:txBody>
+      </p:sp>
+    </p:spTree>
+    <p:extLst>
+      <p:ext uri="{BB962C8B-B14F-4D97-AF65-F5344CB8AC3E}">
+        <p14:creationId xmlns:p14="http://schemas.microsoft.com/office/powerpoint/2010/main" val="1401248042"/>
+      </p:ext>
+    </p:extLst>
+  </p:cSld>
+  <p:clrMapOvr>
+    <a:masterClrMapping/>
+  </p:clrMapOvr>
+</p:notes>
+</file>
+
+<file path=ppt/notesSlides/notesSlide2.xml><?xml version="1.0" encoding="utf-8"?>
+<p:notes xmlns:a="http://schemas.openxmlformats.org/drawingml/2006/main" xmlns:r="http://schemas.openxmlformats.org/officeDocument/2006/relationships" xmlns:p="http://schemas.openxmlformats.org/presentationml/2006/main">
+  <p:cSld>
+    <p:spTree>
+      <p:nvGrpSpPr>
+        <p:cNvPr id="1" name=""/>
+        <p:cNvGrpSpPr/>
+        <p:nvPr/>
+      </p:nvGrpSpPr>
+      <p:grpSpPr>
+        <a:xfrm>
+          <a:off x="0" y="0"/>
+          <a:ext cx="0" cy="0"/>
+          <a:chOff x="0" y="0"/>
+          <a:chExt cx="0" cy="0"/>
+        </a:xfrm>
+      </p:grpSpPr>
+      <p:sp>
+        <p:nvSpPr>
+          <p:cNvPr id="2" name="Slide Image Placeholder 1"/>
+          <p:cNvSpPr>
+            <a:spLocks noGrp="1" noRot="1" noChangeAspect="1"/>
+          </p:cNvSpPr>
+          <p:nvPr>
+            <p:ph type="sldImg"/>
+          </p:nvPr>
+        </p:nvSpPr>
+        <p:spPr/>
+      </p:sp>
+      <p:sp>
+        <p:nvSpPr>
+          <p:cNvPr id="3" name="Notes Placeholder 2"/>
+          <p:cNvSpPr>
+            <a:spLocks noGrp="1"/>
+          </p:cNvSpPr>
+          <p:nvPr>
+            <p:ph type="body" idx="1"/>
+          </p:nvPr>
+        </p:nvSpPr>
+        <p:spPr/>
+        <p:txBody>
+          <a:bodyPr/>
+          <a:lstStyle/>
+          <a:p>
+            <a:endParaRPr lang="en-US" dirty="0"/>
+          </a:p>
+        </p:txBody>
+      </p:sp>
+      <p:sp>
+        <p:nvSpPr>
+          <p:cNvPr id="4" name="Slide Number Placeholder 3"/>
+          <p:cNvSpPr>
+            <a:spLocks noGrp="1"/>
+          </p:cNvSpPr>
+          <p:nvPr>
+            <p:ph type="sldNum" sz="quarter" idx="5"/>
+          </p:nvPr>
+        </p:nvSpPr>
+        <p:spPr/>
+        <p:txBody>
+          <a:bodyPr/>
+          <a:lstStyle/>
+          <a:p>
+            <a:fld id="{AA65BE39-5482-074B-AA8F-346DF8290411}" type="slidenum">
+              <a:rPr lang="en-US" smtClean="0"/>
+              <a:t>8</a:t>
+            </a:fld>
+            <a:endParaRPr lang="en-US"/>
+          </a:p>
+        </p:txBody>
+      </p:sp>
+    </p:spTree>
+    <p:extLst>
+      <p:ext uri="{BB962C8B-B14F-4D97-AF65-F5344CB8AC3E}">
+        <p14:creationId xmlns:p14="http://schemas.microsoft.com/office/powerpoint/2010/main" val="3357520369"/>
+      </p:ext>
+    </p:extLst>
+  </p:cSld>
+  <p:clrMapOvr>
+    <a:masterClrMapping/>
+  </p:clrMapOvr>
+</p:notes>
 </file>
 
 <file path=ppt/slideLayouts/slideLayout1.xml><?xml version="1.0" encoding="utf-8"?>
@@ -3824,8 +4345,8 @@
         </p:nvSpPr>
         <p:spPr>
           <a:xfrm>
-            <a:off x="1915126" y="2736595"/>
-            <a:ext cx="8361229" cy="2098226"/>
+            <a:off x="1915385" y="1524000"/>
+            <a:ext cx="8361229" cy="3310821"/>
           </a:xfrm>
         </p:spPr>
         <p:txBody>
@@ -3834,7 +4355,7 @@
           <a:p>
             <a:r>
               <a:rPr lang="en-US" dirty="0"/>
-              <a:t>Analysis of the virality of reddit posts</a:t>
+              <a:t>Analysis of the popularity of reddit posts</a:t>
             </a:r>
           </a:p>
         </p:txBody>
@@ -3912,6 +4433,89 @@
           <p:cNvPr id="2" name="Title 1">
             <a:extLst>
               <a:ext uri="{FF2B5EF4-FFF2-40B4-BE49-F238E27FC236}">
+                <a16:creationId xmlns:a16="http://schemas.microsoft.com/office/drawing/2014/main" id="{7F827039-6E61-C72B-A83A-D830053DAA4A}"/>
+              </a:ext>
+            </a:extLst>
+          </p:cNvPr>
+          <p:cNvSpPr>
+            <a:spLocks noGrp="1"/>
+          </p:cNvSpPr>
+          <p:nvPr>
+            <p:ph type="title"/>
+          </p:nvPr>
+        </p:nvSpPr>
+        <p:spPr/>
+        <p:txBody>
+          <a:bodyPr/>
+          <a:lstStyle/>
+          <a:p>
+            <a:r>
+              <a:rPr lang="en-US" dirty="0"/>
+              <a:t>Conclusions</a:t>
+            </a:r>
+          </a:p>
+        </p:txBody>
+      </p:sp>
+      <p:sp>
+        <p:nvSpPr>
+          <p:cNvPr id="3" name="Content Placeholder 2">
+            <a:extLst>
+              <a:ext uri="{FF2B5EF4-FFF2-40B4-BE49-F238E27FC236}">
+                <a16:creationId xmlns:a16="http://schemas.microsoft.com/office/drawing/2014/main" id="{C6B62D51-3CF9-BCC7-DB8B-E204750FA37E}"/>
+              </a:ext>
+            </a:extLst>
+          </p:cNvPr>
+          <p:cNvSpPr>
+            <a:spLocks noGrp="1"/>
+          </p:cNvSpPr>
+          <p:nvPr>
+            <p:ph idx="1"/>
+          </p:nvPr>
+        </p:nvSpPr>
+        <p:spPr/>
+        <p:txBody>
+          <a:bodyPr/>
+          <a:lstStyle/>
+          <a:p>
+            <a:endParaRPr lang="en-US"/>
+          </a:p>
+        </p:txBody>
+      </p:sp>
+    </p:spTree>
+    <p:extLst>
+      <p:ext uri="{BB962C8B-B14F-4D97-AF65-F5344CB8AC3E}">
+        <p14:creationId xmlns:p14="http://schemas.microsoft.com/office/powerpoint/2010/main" val="3068166918"/>
+      </p:ext>
+    </p:extLst>
+  </p:cSld>
+  <p:clrMapOvr>
+    <a:masterClrMapping/>
+  </p:clrMapOvr>
+</p:sld>
+</file>
+
+<file path=ppt/slides/slide11.xml><?xml version="1.0" encoding="utf-8"?>
+<p:sld xmlns:a="http://schemas.openxmlformats.org/drawingml/2006/main" xmlns:r="http://schemas.openxmlformats.org/officeDocument/2006/relationships" xmlns:p="http://schemas.openxmlformats.org/presentationml/2006/main">
+  <p:cSld>
+    <p:spTree>
+      <p:nvGrpSpPr>
+        <p:cNvPr id="1" name=""/>
+        <p:cNvGrpSpPr/>
+        <p:nvPr/>
+      </p:nvGrpSpPr>
+      <p:grpSpPr>
+        <a:xfrm>
+          <a:off x="0" y="0"/>
+          <a:ext cx="0" cy="0"/>
+          <a:chOff x="0" y="0"/>
+          <a:chExt cx="0" cy="0"/>
+        </a:xfrm>
+      </p:grpSpPr>
+      <p:sp>
+        <p:nvSpPr>
+          <p:cNvPr id="2" name="Title 1">
+            <a:extLst>
+              <a:ext uri="{FF2B5EF4-FFF2-40B4-BE49-F238E27FC236}">
                 <a16:creationId xmlns:a16="http://schemas.microsoft.com/office/drawing/2014/main" id="{DA655732-8E67-A7EE-59C8-624C5983BF9A}"/>
               </a:ext>
             </a:extLst>
@@ -3956,7 +4560,23 @@
           <a:bodyPr/>
           <a:lstStyle/>
           <a:p>
-            <a:endParaRPr lang="en-US" dirty="0"/>
+            <a:r>
+              <a:rPr lang="en-US" dirty="0"/>
+              <a:t>Data sets and their length</a:t>
+            </a:r>
+          </a:p>
+          <a:p>
+            <a:pPr lvl="1"/>
+            <a:r>
+              <a:rPr lang="en-US" dirty="0"/>
+              <a:t>Larger data sets would yield better analysis </a:t>
+            </a:r>
+          </a:p>
+          <a:p>
+            <a:r>
+              <a:rPr lang="en-US" dirty="0"/>
+              <a:t>Tools used and computational resources </a:t>
+            </a:r>
           </a:p>
         </p:txBody>
       </p:sp>
@@ -3973,7 +4593,7 @@
 </p:sld>
 </file>
 
-<file path=ppt/slides/slide11.xml><?xml version="1.0" encoding="utf-8"?>
+<file path=ppt/slides/slide12.xml><?xml version="1.0" encoding="utf-8"?>
 <p:sld xmlns:a="http://schemas.openxmlformats.org/drawingml/2006/main" xmlns:r="http://schemas.openxmlformats.org/officeDocument/2006/relationships" xmlns:p="http://schemas.openxmlformats.org/presentationml/2006/main">
   <p:cSld>
     <p:spTree>
@@ -4094,8 +4714,8 @@
         </p:nvSpPr>
         <p:spPr>
           <a:xfrm>
-            <a:off x="1371600" y="1853515"/>
-            <a:ext cx="9601200" cy="4732636"/>
+            <a:off x="1371600" y="1537252"/>
+            <a:ext cx="9601200" cy="5048899"/>
           </a:xfrm>
         </p:spPr>
         <p:txBody>
@@ -4495,7 +5115,7 @@
           <p:nvPr/>
         </p:nvPicPr>
         <p:blipFill>
-          <a:blip r:embed="rId2"/>
+          <a:blip r:embed="rId3"/>
           <a:stretch>
             <a:fillRect/>
           </a:stretch>
@@ -4525,7 +5145,7 @@
           <p:nvPr/>
         </p:nvPicPr>
         <p:blipFill>
-          <a:blip r:embed="rId3"/>
+          <a:blip r:embed="rId4"/>
           <a:stretch>
             <a:fillRect/>
           </a:stretch>
@@ -4684,8 +5304,8 @@
         </p:blipFill>
         <p:spPr>
           <a:xfrm>
-            <a:off x="6239933" y="0"/>
-            <a:ext cx="5343315" cy="3205989"/>
+            <a:off x="6095999" y="0"/>
+            <a:ext cx="5578685" cy="3347211"/>
           </a:xfrm>
           <a:prstGeom prst="rect">
             <a:avLst/>
@@ -4714,8 +5334,8 @@
         </p:blipFill>
         <p:spPr>
           <a:xfrm>
-            <a:off x="6239933" y="3205989"/>
-            <a:ext cx="5343315" cy="3205989"/>
+            <a:off x="6096000" y="3429000"/>
+            <a:ext cx="5578685" cy="3347211"/>
           </a:xfrm>
           <a:prstGeom prst="rect">
             <a:avLst/>
@@ -4952,7 +5572,7 @@
           <p:nvPr/>
         </p:nvPicPr>
         <p:blipFill>
-          <a:blip r:embed="rId2"/>
+          <a:blip r:embed="rId3"/>
           <a:stretch>
             <a:fillRect/>
           </a:stretch>
@@ -4982,7 +5602,7 @@
           <p:nvPr/>
         </p:nvPicPr>
         <p:blipFill>
-          <a:blip r:embed="rId3"/>
+          <a:blip r:embed="rId4"/>
           <a:stretch>
             <a:fillRect/>
           </a:stretch>
@@ -5012,7 +5632,7 @@
           <p:nvPr/>
         </p:nvPicPr>
         <p:blipFill>
-          <a:blip r:embed="rId4"/>
+          <a:blip r:embed="rId5"/>
           <a:stretch>
             <a:fillRect/>
           </a:stretch>
@@ -5062,7 +5682,7 @@
           <p:cNvPr id="2" name="Title 1">
             <a:extLst>
               <a:ext uri="{FF2B5EF4-FFF2-40B4-BE49-F238E27FC236}">
-                <a16:creationId xmlns:a16="http://schemas.microsoft.com/office/drawing/2014/main" id="{7F827039-6E61-C72B-A83A-D830053DAA4A}"/>
+                <a16:creationId xmlns:a16="http://schemas.microsoft.com/office/drawing/2014/main" id="{329004B7-74A5-F7B7-F0EF-308D2FB8FE56}"/>
               </a:ext>
             </a:extLst>
           </p:cNvPr>
@@ -5080,17 +5700,17 @@
           <a:p>
             <a:r>
               <a:rPr lang="en-US" dirty="0"/>
-              <a:t>Conclusions</a:t>
-            </a:r>
-          </a:p>
-        </p:txBody>
-      </p:sp>
-      <p:sp>
-        <p:nvSpPr>
-          <p:cNvPr id="3" name="Content Placeholder 2">
+              <a:t>Popularity and Connectivity </a:t>
+            </a:r>
+          </a:p>
+        </p:txBody>
+      </p:sp>
+      <p:sp>
+        <p:nvSpPr>
+          <p:cNvPr id="4" name="Text Placeholder 3">
             <a:extLst>
               <a:ext uri="{FF2B5EF4-FFF2-40B4-BE49-F238E27FC236}">
-                <a16:creationId xmlns:a16="http://schemas.microsoft.com/office/drawing/2014/main" id="{C6B62D51-3CF9-BCC7-DB8B-E204750FA37E}"/>
+                <a16:creationId xmlns:a16="http://schemas.microsoft.com/office/drawing/2014/main" id="{665C3151-47DD-36BF-8268-AAE908ED0C2F}"/>
               </a:ext>
             </a:extLst>
           </p:cNvPr>
@@ -5098,7 +5718,7 @@
             <a:spLocks noGrp="1"/>
           </p:cNvSpPr>
           <p:nvPr>
-            <p:ph idx="1"/>
+            <p:ph type="body" sz="half" idx="2"/>
           </p:nvPr>
         </p:nvSpPr>
         <p:spPr/>
@@ -5106,14 +5726,21 @@
           <a:bodyPr/>
           <a:lstStyle/>
           <a:p>
-            <a:endParaRPr lang="en-US"/>
+            <a:pPr marL="285750" indent="-285750">
+              <a:buFont typeface="Arial" panose="020B0604020202020204" pitchFamily="34" charset="0"/>
+              <a:buChar char="•"/>
+            </a:pPr>
+            <a:r>
+              <a:rPr lang="en-US" dirty="0"/>
+              <a:t>Number of likes and the number of comments comparison </a:t>
+            </a:r>
           </a:p>
         </p:txBody>
       </p:sp>
     </p:spTree>
     <p:extLst>
       <p:ext uri="{BB962C8B-B14F-4D97-AF65-F5344CB8AC3E}">
-        <p14:creationId xmlns:p14="http://schemas.microsoft.com/office/powerpoint/2010/main" val="3068166918"/>
+        <p14:creationId xmlns:p14="http://schemas.microsoft.com/office/powerpoint/2010/main" val="1283379653"/>
       </p:ext>
     </p:extLst>
   </p:cSld>
@@ -5379,4 +6006,299 @@
     </a:ext>
   </a:extLst>
 </a:theme>
+</file>
+
+<file path=ppt/theme/theme2.xml><?xml version="1.0" encoding="utf-8"?>
+<a:theme xmlns:a="http://schemas.openxmlformats.org/drawingml/2006/main" name="Office Theme">
+  <a:themeElements>
+    <a:clrScheme name="Office">
+      <a:dk1>
+        <a:sysClr val="windowText" lastClr="000000"/>
+      </a:dk1>
+      <a:lt1>
+        <a:sysClr val="window" lastClr="FFFFFF"/>
+      </a:lt1>
+      <a:dk2>
+        <a:srgbClr val="44546A"/>
+      </a:dk2>
+      <a:lt2>
+        <a:srgbClr val="E7E6E6"/>
+      </a:lt2>
+      <a:accent1>
+        <a:srgbClr val="4472C4"/>
+      </a:accent1>
+      <a:accent2>
+        <a:srgbClr val="ED7D31"/>
+      </a:accent2>
+      <a:accent3>
+        <a:srgbClr val="A5A5A5"/>
+      </a:accent3>
+      <a:accent4>
+        <a:srgbClr val="FFC000"/>
+      </a:accent4>
+      <a:accent5>
+        <a:srgbClr val="5B9BD5"/>
+      </a:accent5>
+      <a:accent6>
+        <a:srgbClr val="70AD47"/>
+      </a:accent6>
+      <a:hlink>
+        <a:srgbClr val="0563C1"/>
+      </a:hlink>
+      <a:folHlink>
+        <a:srgbClr val="954F72"/>
+      </a:folHlink>
+    </a:clrScheme>
+    <a:fontScheme name="Office">
+      <a:majorFont>
+        <a:latin typeface="Calibri Light" panose="020F0302020204030204"/>
+        <a:ea typeface=""/>
+        <a:cs typeface=""/>
+        <a:font script="Jpan" typeface="游ゴシック Light"/>
+        <a:font script="Hang" typeface="맑은 고딕"/>
+        <a:font script="Hans" typeface="等线 Light"/>
+        <a:font script="Hant" typeface="新細明體"/>
+        <a:font script="Arab" typeface="Times New Roman"/>
+        <a:font script="Hebr" typeface="Times New Roman"/>
+        <a:font script="Thai" typeface="Angsana New"/>
+        <a:font script="Ethi" typeface="Nyala"/>
+        <a:font script="Beng" typeface="Vrinda"/>
+        <a:font script="Gujr" typeface="Shruti"/>
+        <a:font script="Khmr" typeface="MoolBoran"/>
+        <a:font script="Knda" typeface="Tunga"/>
+        <a:font script="Guru" typeface="Raavi"/>
+        <a:font script="Cans" typeface="Euphemia"/>
+        <a:font script="Cher" typeface="Plantagenet Cherokee"/>
+        <a:font script="Yiii" typeface="Microsoft Yi Baiti"/>
+        <a:font script="Tibt" typeface="Microsoft Himalaya"/>
+        <a:font script="Thaa" typeface="MV Boli"/>
+        <a:font script="Deva" typeface="Mangal"/>
+        <a:font script="Telu" typeface="Gautami"/>
+        <a:font script="Taml" typeface="Latha"/>
+        <a:font script="Syrc" typeface="Estrangelo Edessa"/>
+        <a:font script="Orya" typeface="Kalinga"/>
+        <a:font script="Mlym" typeface="Kartika"/>
+        <a:font script="Laoo" typeface="DokChampa"/>
+        <a:font script="Sinh" typeface="Iskoola Pota"/>
+        <a:font script="Mong" typeface="Mongolian Baiti"/>
+        <a:font script="Viet" typeface="Times New Roman"/>
+        <a:font script="Uigh" typeface="Microsoft Uighur"/>
+        <a:font script="Geor" typeface="Sylfaen"/>
+        <a:font script="Armn" typeface="Arial"/>
+        <a:font script="Bugi" typeface="Leelawadee UI"/>
+        <a:font script="Bopo" typeface="Microsoft JhengHei"/>
+        <a:font script="Java" typeface="Javanese Text"/>
+        <a:font script="Lisu" typeface="Segoe UI"/>
+        <a:font script="Mymr" typeface="Myanmar Text"/>
+        <a:font script="Nkoo" typeface="Ebrima"/>
+        <a:font script="Olck" typeface="Nirmala UI"/>
+        <a:font script="Osma" typeface="Ebrima"/>
+        <a:font script="Phag" typeface="Phagspa"/>
+        <a:font script="Syrn" typeface="Estrangelo Edessa"/>
+        <a:font script="Syrj" typeface="Estrangelo Edessa"/>
+        <a:font script="Syre" typeface="Estrangelo Edessa"/>
+        <a:font script="Sora" typeface="Nirmala UI"/>
+        <a:font script="Tale" typeface="Microsoft Tai Le"/>
+        <a:font script="Talu" typeface="Microsoft New Tai Lue"/>
+        <a:font script="Tfng" typeface="Ebrima"/>
+      </a:majorFont>
+      <a:minorFont>
+        <a:latin typeface="Calibri" panose="020F0502020204030204"/>
+        <a:ea typeface=""/>
+        <a:cs typeface=""/>
+        <a:font script="Jpan" typeface="游ゴシック"/>
+        <a:font script="Hang" typeface="맑은 고딕"/>
+        <a:font script="Hans" typeface="等线"/>
+        <a:font script="Hant" typeface="新細明體"/>
+        <a:font script="Arab" typeface="Arial"/>
+        <a:font script="Hebr" typeface="Arial"/>
+        <a:font script="Thai" typeface="Cordia New"/>
+        <a:font script="Ethi" typeface="Nyala"/>
+        <a:font script="Beng" typeface="Vrinda"/>
+        <a:font script="Gujr" typeface="Shruti"/>
+        <a:font script="Khmr" typeface="DaunPenh"/>
+        <a:font script="Knda" typeface="Tunga"/>
+        <a:font script="Guru" typeface="Raavi"/>
+        <a:font script="Cans" typeface="Euphemia"/>
+        <a:font script="Cher" typeface="Plantagenet Cherokee"/>
+        <a:font script="Yiii" typeface="Microsoft Yi Baiti"/>
+        <a:font script="Tibt" typeface="Microsoft Himalaya"/>
+        <a:font script="Thaa" typeface="MV Boli"/>
+        <a:font script="Deva" typeface="Mangal"/>
+        <a:font script="Telu" typeface="Gautami"/>
+        <a:font script="Taml" typeface="Latha"/>
+        <a:font script="Syrc" typeface="Estrangelo Edessa"/>
+        <a:font script="Orya" typeface="Kalinga"/>
+        <a:font script="Mlym" typeface="Kartika"/>
+        <a:font script="Laoo" typeface="DokChampa"/>
+        <a:font script="Sinh" typeface="Iskoola Pota"/>
+        <a:font script="Mong" typeface="Mongolian Baiti"/>
+        <a:font script="Viet" typeface="Arial"/>
+        <a:font script="Uigh" typeface="Microsoft Uighur"/>
+        <a:font script="Geor" typeface="Sylfaen"/>
+        <a:font script="Armn" typeface="Arial"/>
+        <a:font script="Bugi" typeface="Leelawadee UI"/>
+        <a:font script="Bopo" typeface="Microsoft JhengHei"/>
+        <a:font script="Java" typeface="Javanese Text"/>
+        <a:font script="Lisu" typeface="Segoe UI"/>
+        <a:font script="Mymr" typeface="Myanmar Text"/>
+        <a:font script="Nkoo" typeface="Ebrima"/>
+        <a:font script="Olck" typeface="Nirmala UI"/>
+        <a:font script="Osma" typeface="Ebrima"/>
+        <a:font script="Phag" typeface="Phagspa"/>
+        <a:font script="Syrn" typeface="Estrangelo Edessa"/>
+        <a:font script="Syrj" typeface="Estrangelo Edessa"/>
+        <a:font script="Syre" typeface="Estrangelo Edessa"/>
+        <a:font script="Sora" typeface="Nirmala UI"/>
+        <a:font script="Tale" typeface="Microsoft Tai Le"/>
+        <a:font script="Talu" typeface="Microsoft New Tai Lue"/>
+        <a:font script="Tfng" typeface="Ebrima"/>
+      </a:minorFont>
+    </a:fontScheme>
+    <a:fmtScheme name="Office">
+      <a:fillStyleLst>
+        <a:solidFill>
+          <a:schemeClr val="phClr"/>
+        </a:solidFill>
+        <a:gradFill rotWithShape="1">
+          <a:gsLst>
+            <a:gs pos="0">
+              <a:schemeClr val="phClr">
+                <a:lumMod val="110000"/>
+                <a:satMod val="105000"/>
+                <a:tint val="67000"/>
+              </a:schemeClr>
+            </a:gs>
+            <a:gs pos="50000">
+              <a:schemeClr val="phClr">
+                <a:lumMod val="105000"/>
+                <a:satMod val="103000"/>
+                <a:tint val="73000"/>
+              </a:schemeClr>
+            </a:gs>
+            <a:gs pos="100000">
+              <a:schemeClr val="phClr">
+                <a:lumMod val="105000"/>
+                <a:satMod val="109000"/>
+                <a:tint val="81000"/>
+              </a:schemeClr>
+            </a:gs>
+          </a:gsLst>
+          <a:lin ang="5400000" scaled="0"/>
+        </a:gradFill>
+        <a:gradFill rotWithShape="1">
+          <a:gsLst>
+            <a:gs pos="0">
+              <a:schemeClr val="phClr">
+                <a:satMod val="103000"/>
+                <a:lumMod val="102000"/>
+                <a:tint val="94000"/>
+              </a:schemeClr>
+            </a:gs>
+            <a:gs pos="50000">
+              <a:schemeClr val="phClr">
+                <a:satMod val="110000"/>
+                <a:lumMod val="100000"/>
+                <a:shade val="100000"/>
+              </a:schemeClr>
+            </a:gs>
+            <a:gs pos="100000">
+              <a:schemeClr val="phClr">
+                <a:lumMod val="99000"/>
+                <a:satMod val="120000"/>
+                <a:shade val="78000"/>
+              </a:schemeClr>
+            </a:gs>
+          </a:gsLst>
+          <a:lin ang="5400000" scaled="0"/>
+        </a:gradFill>
+      </a:fillStyleLst>
+      <a:lnStyleLst>
+        <a:ln w="6350" cap="flat" cmpd="sng" algn="ctr">
+          <a:solidFill>
+            <a:schemeClr val="phClr"/>
+          </a:solidFill>
+          <a:prstDash val="solid"/>
+          <a:miter lim="800000"/>
+        </a:ln>
+        <a:ln w="12700" cap="flat" cmpd="sng" algn="ctr">
+          <a:solidFill>
+            <a:schemeClr val="phClr"/>
+          </a:solidFill>
+          <a:prstDash val="solid"/>
+          <a:miter lim="800000"/>
+        </a:ln>
+        <a:ln w="19050" cap="flat" cmpd="sng" algn="ctr">
+          <a:solidFill>
+            <a:schemeClr val="phClr"/>
+          </a:solidFill>
+          <a:prstDash val="solid"/>
+          <a:miter lim="800000"/>
+        </a:ln>
+      </a:lnStyleLst>
+      <a:effectStyleLst>
+        <a:effectStyle>
+          <a:effectLst/>
+        </a:effectStyle>
+        <a:effectStyle>
+          <a:effectLst/>
+        </a:effectStyle>
+        <a:effectStyle>
+          <a:effectLst>
+            <a:outerShdw blurRad="57150" dist="19050" dir="5400000" algn="ctr" rotWithShape="0">
+              <a:srgbClr val="000000">
+                <a:alpha val="63000"/>
+              </a:srgbClr>
+            </a:outerShdw>
+          </a:effectLst>
+        </a:effectStyle>
+      </a:effectStyleLst>
+      <a:bgFillStyleLst>
+        <a:solidFill>
+          <a:schemeClr val="phClr"/>
+        </a:solidFill>
+        <a:solidFill>
+          <a:schemeClr val="phClr">
+            <a:tint val="95000"/>
+            <a:satMod val="170000"/>
+          </a:schemeClr>
+        </a:solidFill>
+        <a:gradFill rotWithShape="1">
+          <a:gsLst>
+            <a:gs pos="0">
+              <a:schemeClr val="phClr">
+                <a:tint val="93000"/>
+                <a:satMod val="150000"/>
+                <a:shade val="98000"/>
+                <a:lumMod val="102000"/>
+              </a:schemeClr>
+            </a:gs>
+            <a:gs pos="50000">
+              <a:schemeClr val="phClr">
+                <a:tint val="98000"/>
+                <a:satMod val="130000"/>
+                <a:shade val="90000"/>
+                <a:lumMod val="103000"/>
+              </a:schemeClr>
+            </a:gs>
+            <a:gs pos="100000">
+              <a:schemeClr val="phClr">
+                <a:shade val="63000"/>
+                <a:satMod val="120000"/>
+              </a:schemeClr>
+            </a:gs>
+          </a:gsLst>
+          <a:lin ang="5400000" scaled="0"/>
+        </a:gradFill>
+      </a:bgFillStyleLst>
+    </a:fmtScheme>
+  </a:themeElements>
+  <a:objectDefaults/>
+  <a:extraClrSchemeLst/>
+  <a:extLst>
+    <a:ext uri="{05A4C25C-085E-4340-85A3-A5531E510DB2}">
+      <thm15:themeFamily xmlns:thm15="http://schemas.microsoft.com/office/thememl/2012/main" name="Office Theme" id="{62F939B6-93AF-4DB8-9C6B-D6C7DFDC589F}" vid="{4A3C46E8-61CC-4603-A589-7422A47A8E4A}"/>
+    </a:ext>
+  </a:extLst>
+</a:theme>
 </file>
</xml_diff>

<commit_message>
-Updated presentation -Added more graph files
</commit_message>
<xml_diff>
--- a/presentation.pptx
+++ b/presentation.pptx
@@ -208,7 +208,7 @@
           <a:p>
             <a:fld id="{E739E779-C954-044B-8D8E-BA4197E97735}" type="datetimeFigureOut">
               <a:rPr lang="en-US" smtClean="0"/>
-              <a:t>11/18/23</a:t>
+              <a:t>11/19/23</a:t>
             </a:fld>
             <a:endParaRPr lang="en-US"/>
           </a:p>
@@ -519,6 +519,93 @@
           <a:bodyPr/>
           <a:lstStyle/>
           <a:p>
+            <a:r>
+              <a:rPr lang="en-US" dirty="0"/>
+              <a:t>Formatted CVS files that contain reddit information</a:t>
+            </a:r>
+          </a:p>
+        </p:txBody>
+      </p:sp>
+      <p:sp>
+        <p:nvSpPr>
+          <p:cNvPr id="4" name="Slide Number Placeholder 3"/>
+          <p:cNvSpPr>
+            <a:spLocks noGrp="1"/>
+          </p:cNvSpPr>
+          <p:nvPr>
+            <p:ph type="sldNum" sz="quarter" idx="5"/>
+          </p:nvPr>
+        </p:nvSpPr>
+        <p:spPr/>
+        <p:txBody>
+          <a:bodyPr/>
+          <a:lstStyle/>
+          <a:p>
+            <a:fld id="{AA65BE39-5482-074B-AA8F-346DF8290411}" type="slidenum">
+              <a:rPr lang="en-US" smtClean="0"/>
+              <a:t>3</a:t>
+            </a:fld>
+            <a:endParaRPr lang="en-US"/>
+          </a:p>
+        </p:txBody>
+      </p:sp>
+    </p:spTree>
+    <p:extLst>
+      <p:ext uri="{BB962C8B-B14F-4D97-AF65-F5344CB8AC3E}">
+        <p14:creationId xmlns:p14="http://schemas.microsoft.com/office/powerpoint/2010/main" val="2760323549"/>
+      </p:ext>
+    </p:extLst>
+  </p:cSld>
+  <p:clrMapOvr>
+    <a:masterClrMapping/>
+  </p:clrMapOvr>
+</p:notes>
+</file>
+
+<file path=ppt/notesSlides/notesSlide2.xml><?xml version="1.0" encoding="utf-8"?>
+<p:notes xmlns:a="http://schemas.openxmlformats.org/drawingml/2006/main" xmlns:r="http://schemas.openxmlformats.org/officeDocument/2006/relationships" xmlns:p="http://schemas.openxmlformats.org/presentationml/2006/main">
+  <p:cSld>
+    <p:spTree>
+      <p:nvGrpSpPr>
+        <p:cNvPr id="1" name=""/>
+        <p:cNvGrpSpPr/>
+        <p:nvPr/>
+      </p:nvGrpSpPr>
+      <p:grpSpPr>
+        <a:xfrm>
+          <a:off x="0" y="0"/>
+          <a:ext cx="0" cy="0"/>
+          <a:chOff x="0" y="0"/>
+          <a:chExt cx="0" cy="0"/>
+        </a:xfrm>
+      </p:grpSpPr>
+      <p:sp>
+        <p:nvSpPr>
+          <p:cNvPr id="2" name="Slide Image Placeholder 1"/>
+          <p:cNvSpPr>
+            <a:spLocks noGrp="1" noRot="1" noChangeAspect="1"/>
+          </p:cNvSpPr>
+          <p:nvPr>
+            <p:ph type="sldImg"/>
+          </p:nvPr>
+        </p:nvSpPr>
+        <p:spPr/>
+      </p:sp>
+      <p:sp>
+        <p:nvSpPr>
+          <p:cNvPr id="3" name="Notes Placeholder 2"/>
+          <p:cNvSpPr>
+            <a:spLocks noGrp="1"/>
+          </p:cNvSpPr>
+          <p:nvPr>
+            <p:ph type="body" idx="1"/>
+          </p:nvPr>
+        </p:nvSpPr>
+        <p:spPr/>
+        <p:txBody>
+          <a:bodyPr/>
+          <a:lstStyle/>
+          <a:p>
             <a:endParaRPr lang="en-US" dirty="0"/>
           </a:p>
         </p:txBody>
@@ -559,7 +646,7 @@
 </p:notes>
 </file>
 
-<file path=ppt/notesSlides/notesSlide2.xml><?xml version="1.0" encoding="utf-8"?>
+<file path=ppt/notesSlides/notesSlide3.xml><?xml version="1.0" encoding="utf-8"?>
 <p:notes xmlns:a="http://schemas.openxmlformats.org/drawingml/2006/main" xmlns:r="http://schemas.openxmlformats.org/officeDocument/2006/relationships" xmlns:p="http://schemas.openxmlformats.org/presentationml/2006/main">
   <p:cSld>
     <p:spTree>
@@ -813,7 +900,7 @@
             <a:fld id="{87DE6118-2437-4B30-8E3C-4D2BE6020583}" type="datetimeFigureOut">
               <a:rPr lang="en-US" dirty="0"/>
               <a:pPr/>
-              <a:t>11/18/23</a:t>
+              <a:t>11/19/23</a:t>
             </a:fld>
             <a:endParaRPr lang="en-US" dirty="0"/>
           </a:p>
@@ -1139,7 +1226,7 @@
           <a:p>
             <a:fld id="{87DE6118-2437-4B30-8E3C-4D2BE6020583}" type="datetimeFigureOut">
               <a:rPr lang="en-US" dirty="0"/>
-              <a:t>11/18/23</a:t>
+              <a:t>11/19/23</a:t>
             </a:fld>
             <a:endParaRPr lang="en-US" dirty="0"/>
           </a:p>
@@ -1314,7 +1401,7 @@
           <a:p>
             <a:fld id="{87DE6118-2437-4B30-8E3C-4D2BE6020583}" type="datetimeFigureOut">
               <a:rPr lang="en-US" dirty="0"/>
-              <a:t>11/18/23</a:t>
+              <a:t>11/19/23</a:t>
             </a:fld>
             <a:endParaRPr lang="en-US" dirty="0"/>
           </a:p>
@@ -1479,7 +1566,7 @@
           <a:p>
             <a:fld id="{87DE6118-2437-4B30-8E3C-4D2BE6020583}" type="datetimeFigureOut">
               <a:rPr lang="en-US" dirty="0"/>
-              <a:t>11/18/23</a:t>
+              <a:t>11/19/23</a:t>
             </a:fld>
             <a:endParaRPr lang="en-US" dirty="0"/>
           </a:p>
@@ -1752,7 +1839,7 @@
             <a:fld id="{87DE6118-2437-4B30-8E3C-4D2BE6020583}" type="datetimeFigureOut">
               <a:rPr lang="en-US" dirty="0"/>
               <a:pPr/>
-              <a:t>11/18/23</a:t>
+              <a:t>11/19/23</a:t>
             </a:fld>
             <a:endParaRPr lang="en-US" dirty="0"/>
           </a:p>
@@ -2142,7 +2229,7 @@
           <a:p>
             <a:fld id="{87DE6118-2437-4B30-8E3C-4D2BE6020583}" type="datetimeFigureOut">
               <a:rPr lang="en-US" dirty="0"/>
-              <a:t>11/18/23</a:t>
+              <a:t>11/19/23</a:t>
             </a:fld>
             <a:endParaRPr lang="en-US" dirty="0"/>
           </a:p>
@@ -2614,7 +2701,7 @@
           <a:p>
             <a:fld id="{87DE6118-2437-4B30-8E3C-4D2BE6020583}" type="datetimeFigureOut">
               <a:rPr lang="en-US" dirty="0"/>
-              <a:t>11/18/23</a:t>
+              <a:t>11/19/23</a:t>
             </a:fld>
             <a:endParaRPr lang="en-US" dirty="0"/>
           </a:p>
@@ -2727,7 +2814,7 @@
           <a:p>
             <a:fld id="{87DE6118-2437-4B30-8E3C-4D2BE6020583}" type="datetimeFigureOut">
               <a:rPr lang="en-US" dirty="0"/>
-              <a:t>11/18/23</a:t>
+              <a:t>11/19/23</a:t>
             </a:fld>
             <a:endParaRPr lang="en-US" dirty="0"/>
           </a:p>
@@ -2817,7 +2904,7 @@
           <a:p>
             <a:fld id="{87DE6118-2437-4B30-8E3C-4D2BE6020583}" type="datetimeFigureOut">
               <a:rPr lang="en-US" dirty="0"/>
-              <a:t>11/18/23</a:t>
+              <a:t>11/19/23</a:t>
             </a:fld>
             <a:endParaRPr lang="en-US" dirty="0"/>
           </a:p>
@@ -3159,7 +3246,7 @@
             <a:fld id="{87DE6118-2437-4B30-8E3C-4D2BE6020583}" type="datetimeFigureOut">
               <a:rPr lang="en-US" dirty="0"/>
               <a:pPr/>
-              <a:t>11/18/23</a:t>
+              <a:t>11/19/23</a:t>
             </a:fld>
             <a:endParaRPr lang="en-US" dirty="0"/>
           </a:p>
@@ -3544,7 +3631,7 @@
             <a:fld id="{87DE6118-2437-4B30-8E3C-4D2BE6020583}" type="datetimeFigureOut">
               <a:rPr lang="en-US" dirty="0"/>
               <a:pPr/>
-              <a:t>11/18/23</a:t>
+              <a:t>11/19/23</a:t>
             </a:fld>
             <a:endParaRPr lang="en-US" dirty="0"/>
           </a:p>
@@ -3819,7 +3906,7 @@
             <a:fld id="{87DE6118-2437-4B30-8E3C-4D2BE6020583}" type="datetimeFigureOut">
               <a:rPr lang="en-US" dirty="0"/>
               <a:pPr/>
-              <a:t>11/18/23</a:t>
+              <a:t>11/19/23</a:t>
             </a:fld>
             <a:endParaRPr lang="en-US" dirty="0"/>
           </a:p>
@@ -4836,21 +4923,120 @@
             <p:ph idx="1"/>
           </p:nvPr>
         </p:nvSpPr>
-        <p:spPr/>
+        <p:spPr>
+          <a:xfrm>
+            <a:off x="1371600" y="1778696"/>
+            <a:ext cx="9601200" cy="4088704"/>
+          </a:xfrm>
+        </p:spPr>
         <p:txBody>
           <a:bodyPr/>
           <a:lstStyle/>
           <a:p>
             <a:r>
-              <a:rPr lang="en-US" dirty="0"/>
-              <a:t>SocailGrep </a:t>
-            </a:r>
-          </a:p>
-          <a:p>
-            <a:pPr lvl="1"/>
-            <a:r>
-              <a:rPr lang="en-US" dirty="0"/>
-              <a:t>List all data sets used here</a:t>
+              <a:rPr lang="en-US" dirty="0" err="1"/>
+              <a:t>SocailGrep</a:t>
+            </a:r>
+            <a:r>
+              <a:rPr lang="en-US" dirty="0"/>
+              <a:t> (https://</a:t>
+            </a:r>
+            <a:r>
+              <a:rPr lang="en-US" dirty="0" err="1"/>
+              <a:t>socialgrep.com</a:t>
+            </a:r>
+            <a:r>
+              <a:rPr lang="en-US" dirty="0"/>
+              <a:t>/datasets)</a:t>
+            </a:r>
+          </a:p>
+          <a:p>
+            <a:pPr lvl="1">
+              <a:buFont typeface="Wingdings" pitchFamily="2" charset="2"/>
+              <a:buChar char="§"/>
+            </a:pPr>
+            <a:r>
+              <a:rPr lang="en-US" b="1" dirty="0" err="1"/>
+              <a:t>NoNewNormal</a:t>
+            </a:r>
+            <a:r>
+              <a:rPr lang="en-US" b="1" dirty="0"/>
+              <a:t> dataset on Reddit</a:t>
+            </a:r>
+          </a:p>
+          <a:p>
+            <a:pPr lvl="2">
+              <a:buFont typeface="Wingdings" pitchFamily="2" charset="2"/>
+              <a:buChar char="§"/>
+            </a:pPr>
+            <a:r>
+              <a:rPr lang="en-US" dirty="0"/>
+              <a:t>Comments on the now banned subreddit /r/</a:t>
+            </a:r>
+            <a:r>
+              <a:rPr lang="en-US" dirty="0" err="1"/>
+              <a:t>NoNewNormal</a:t>
+            </a:r>
+            <a:endParaRPr lang="en-US" dirty="0"/>
+          </a:p>
+          <a:p>
+            <a:pPr lvl="1">
+              <a:buFont typeface="Wingdings" pitchFamily="2" charset="2"/>
+              <a:buChar char="§"/>
+            </a:pPr>
+            <a:r>
+              <a:rPr lang="en-US" b="1" dirty="0"/>
+              <a:t>One year of Doge on Reddit</a:t>
+            </a:r>
+          </a:p>
+          <a:p>
+            <a:pPr lvl="2">
+              <a:buFont typeface="Wingdings" pitchFamily="2" charset="2"/>
+              <a:buChar char="§"/>
+            </a:pPr>
+            <a:r>
+              <a:rPr lang="en-US" dirty="0"/>
+              <a:t>All varied mentions of the term “Doge” on reddit</a:t>
+            </a:r>
+          </a:p>
+          <a:p>
+            <a:pPr lvl="1">
+              <a:buFont typeface="Wingdings" pitchFamily="2" charset="2"/>
+              <a:buChar char="§"/>
+            </a:pPr>
+            <a:r>
+              <a:rPr lang="en-US" b="1" dirty="0"/>
+              <a:t>June 2022 Bitcoin on Reddit</a:t>
+            </a:r>
+          </a:p>
+          <a:p>
+            <a:pPr lvl="2">
+              <a:buFont typeface="Wingdings" pitchFamily="2" charset="2"/>
+              <a:buChar char="§"/>
+            </a:pPr>
+            <a:r>
+              <a:rPr lang="en-US" dirty="0"/>
+              <a:t>Comments on the /r/Bitcoin subreddit</a:t>
+            </a:r>
+          </a:p>
+          <a:p>
+            <a:pPr lvl="1">
+              <a:buFont typeface="Wingdings" pitchFamily="2" charset="2"/>
+              <a:buChar char="§"/>
+            </a:pPr>
+            <a:r>
+              <a:rPr lang="en-US" b="1" dirty="0"/>
+              <a:t>2022 Freedom Convoy on Reddit </a:t>
+            </a:r>
+          </a:p>
+          <a:p>
+            <a:pPr lvl="2">
+              <a:buFont typeface="Wingdings" pitchFamily="2" charset="2"/>
+              <a:buChar char="§"/>
+            </a:pPr>
+            <a:r>
+              <a:rPr lang="en-US" dirty="0"/>
+              <a:t>Comments on the /r/Ottawa subreddit</a:t>
             </a:r>
           </a:p>
         </p:txBody>
@@ -4929,7 +5115,12 @@
             <p:ph idx="1"/>
           </p:nvPr>
         </p:nvSpPr>
-        <p:spPr/>
+        <p:spPr>
+          <a:xfrm>
+            <a:off x="1371600" y="1660848"/>
+            <a:ext cx="9601200" cy="4206551"/>
+          </a:xfrm>
+        </p:spPr>
         <p:txBody>
           <a:bodyPr/>
           <a:lstStyle/>
@@ -5257,7 +5448,7 @@
             </a:pPr>
             <a:r>
               <a:rPr lang="en-US" dirty="0"/>
-              <a:t>Graph 1 displays the average scores for all the posts from doge</a:t>
+              <a:t>Graph 1 displays the average scores for all the posts from doge comments</a:t>
             </a:r>
           </a:p>
           <a:p>
@@ -5267,7 +5458,7 @@
             </a:pPr>
             <a:r>
               <a:rPr lang="en-US" dirty="0"/>
-              <a:t>Graph 2 displays the trucker posts</a:t>
+              <a:t>Graph 2 displays the trucker comments</a:t>
             </a:r>
           </a:p>
           <a:p>
@@ -5423,10 +5614,97 @@
           <a:bodyPr/>
           <a:lstStyle/>
           <a:p>
-            <a:endParaRPr lang="en-US" dirty="0"/>
-          </a:p>
-        </p:txBody>
-      </p:sp>
+            <a:pPr marL="285750" indent="-285750">
+              <a:buFont typeface="Arial" panose="020B0604020202020204" pitchFamily="34" charset="0"/>
+              <a:buChar char="•"/>
+            </a:pPr>
+            <a:r>
+              <a:rPr lang="en-US" dirty="0"/>
+              <a:t>Popularity of a comments over time shows a trend that follows our hypothesis. The number of average likes in a subreddit tends to decreased overtime. </a:t>
+            </a:r>
+          </a:p>
+          <a:p>
+            <a:pPr marL="285750" indent="-285750">
+              <a:buFont typeface="Arial" panose="020B0604020202020204" pitchFamily="34" charset="0"/>
+              <a:buChar char="•"/>
+            </a:pPr>
+            <a:r>
+              <a:rPr lang="en-US" dirty="0"/>
+              <a:t>Graph 1 doge (1 year data)</a:t>
+            </a:r>
+          </a:p>
+          <a:p>
+            <a:pPr marL="285750" indent="-285750">
+              <a:buFont typeface="Arial" panose="020B0604020202020204" pitchFamily="34" charset="0"/>
+              <a:buChar char="•"/>
+            </a:pPr>
+            <a:r>
+              <a:rPr lang="en-US" dirty="0"/>
+              <a:t>Graph 2 no new normal (14 months)</a:t>
+            </a:r>
+          </a:p>
+        </p:txBody>
+      </p:sp>
+      <p:pic>
+        <p:nvPicPr>
+          <p:cNvPr id="5" name="Picture 4" descr="A graph of a bar graph&#10;&#10;Description automatically generated with medium confidence">
+            <a:extLst>
+              <a:ext uri="{FF2B5EF4-FFF2-40B4-BE49-F238E27FC236}">
+                <a16:creationId xmlns:a16="http://schemas.microsoft.com/office/drawing/2014/main" id="{4CCA6A8E-9030-6D97-3FEA-F7789F18FAD0}"/>
+              </a:ext>
+            </a:extLst>
+          </p:cNvPr>
+          <p:cNvPicPr>
+            <a:picLocks noChangeAspect="1"/>
+          </p:cNvPicPr>
+          <p:nvPr/>
+        </p:nvPicPr>
+        <p:blipFill>
+          <a:blip r:embed="rId2"/>
+          <a:stretch>
+            <a:fillRect/>
+          </a:stretch>
+        </p:blipFill>
+        <p:spPr>
+          <a:xfrm>
+            <a:off x="5540992" y="3429000"/>
+            <a:ext cx="6651008" cy="3325504"/>
+          </a:xfrm>
+          <a:prstGeom prst="rect">
+            <a:avLst/>
+          </a:prstGeom>
+        </p:spPr>
+      </p:pic>
+      <p:pic>
+        <p:nvPicPr>
+          <p:cNvPr id="7" name="Picture 6" descr="A graph of a bar&#10;&#10;Description automatically generated with medium confidence">
+            <a:extLst>
+              <a:ext uri="{FF2B5EF4-FFF2-40B4-BE49-F238E27FC236}">
+                <a16:creationId xmlns:a16="http://schemas.microsoft.com/office/drawing/2014/main" id="{37E418FF-D9F1-FDF1-0C64-F513220953CD}"/>
+              </a:ext>
+            </a:extLst>
+          </p:cNvPr>
+          <p:cNvPicPr>
+            <a:picLocks noChangeAspect="1"/>
+          </p:cNvPicPr>
+          <p:nvPr/>
+        </p:nvPicPr>
+        <p:blipFill>
+          <a:blip r:embed="rId3"/>
+          <a:stretch>
+            <a:fillRect/>
+          </a:stretch>
+        </p:blipFill>
+        <p:spPr>
+          <a:xfrm>
+            <a:off x="5540992" y="103496"/>
+            <a:ext cx="6651008" cy="3325504"/>
+          </a:xfrm>
+          <a:prstGeom prst="rect">
+            <a:avLst/>
+          </a:prstGeom>
+        </p:spPr>
+      </p:pic>
     </p:spTree>
     <p:extLst>
       <p:ext uri="{BB962C8B-B14F-4D97-AF65-F5344CB8AC3E}">

</xml_diff>

<commit_message>
-Added more to the resport and updated some of the presentation
</commit_message>
<xml_diff>
--- a/presentation.pptx
+++ b/presentation.pptx
@@ -208,7 +208,7 @@
           <a:p>
             <a:fld id="{E739E779-C954-044B-8D8E-BA4197E97735}" type="datetimeFigureOut">
               <a:rPr lang="en-US" smtClean="0"/>
-              <a:t>11/19/23</a:t>
+              <a:t>11/20/23</a:t>
             </a:fld>
             <a:endParaRPr lang="en-US"/>
           </a:p>
@@ -900,7 +900,7 @@
             <a:fld id="{87DE6118-2437-4B30-8E3C-4D2BE6020583}" type="datetimeFigureOut">
               <a:rPr lang="en-US" dirty="0"/>
               <a:pPr/>
-              <a:t>11/19/23</a:t>
+              <a:t>11/20/23</a:t>
             </a:fld>
             <a:endParaRPr lang="en-US" dirty="0"/>
           </a:p>
@@ -1226,7 +1226,7 @@
           <a:p>
             <a:fld id="{87DE6118-2437-4B30-8E3C-4D2BE6020583}" type="datetimeFigureOut">
               <a:rPr lang="en-US" dirty="0"/>
-              <a:t>11/19/23</a:t>
+              <a:t>11/20/23</a:t>
             </a:fld>
             <a:endParaRPr lang="en-US" dirty="0"/>
           </a:p>
@@ -1401,7 +1401,7 @@
           <a:p>
             <a:fld id="{87DE6118-2437-4B30-8E3C-4D2BE6020583}" type="datetimeFigureOut">
               <a:rPr lang="en-US" dirty="0"/>
-              <a:t>11/19/23</a:t>
+              <a:t>11/20/23</a:t>
             </a:fld>
             <a:endParaRPr lang="en-US" dirty="0"/>
           </a:p>
@@ -1566,7 +1566,7 @@
           <a:p>
             <a:fld id="{87DE6118-2437-4B30-8E3C-4D2BE6020583}" type="datetimeFigureOut">
               <a:rPr lang="en-US" dirty="0"/>
-              <a:t>11/19/23</a:t>
+              <a:t>11/20/23</a:t>
             </a:fld>
             <a:endParaRPr lang="en-US" dirty="0"/>
           </a:p>
@@ -1839,7 +1839,7 @@
             <a:fld id="{87DE6118-2437-4B30-8E3C-4D2BE6020583}" type="datetimeFigureOut">
               <a:rPr lang="en-US" dirty="0"/>
               <a:pPr/>
-              <a:t>11/19/23</a:t>
+              <a:t>11/20/23</a:t>
             </a:fld>
             <a:endParaRPr lang="en-US" dirty="0"/>
           </a:p>
@@ -2229,7 +2229,7 @@
           <a:p>
             <a:fld id="{87DE6118-2437-4B30-8E3C-4D2BE6020583}" type="datetimeFigureOut">
               <a:rPr lang="en-US" dirty="0"/>
-              <a:t>11/19/23</a:t>
+              <a:t>11/20/23</a:t>
             </a:fld>
             <a:endParaRPr lang="en-US" dirty="0"/>
           </a:p>
@@ -2701,7 +2701,7 @@
           <a:p>
             <a:fld id="{87DE6118-2437-4B30-8E3C-4D2BE6020583}" type="datetimeFigureOut">
               <a:rPr lang="en-US" dirty="0"/>
-              <a:t>11/19/23</a:t>
+              <a:t>11/20/23</a:t>
             </a:fld>
             <a:endParaRPr lang="en-US" dirty="0"/>
           </a:p>
@@ -2814,7 +2814,7 @@
           <a:p>
             <a:fld id="{87DE6118-2437-4B30-8E3C-4D2BE6020583}" type="datetimeFigureOut">
               <a:rPr lang="en-US" dirty="0"/>
-              <a:t>11/19/23</a:t>
+              <a:t>11/20/23</a:t>
             </a:fld>
             <a:endParaRPr lang="en-US" dirty="0"/>
           </a:p>
@@ -2904,7 +2904,7 @@
           <a:p>
             <a:fld id="{87DE6118-2437-4B30-8E3C-4D2BE6020583}" type="datetimeFigureOut">
               <a:rPr lang="en-US" dirty="0"/>
-              <a:t>11/19/23</a:t>
+              <a:t>11/20/23</a:t>
             </a:fld>
             <a:endParaRPr lang="en-US" dirty="0"/>
           </a:p>
@@ -3246,7 +3246,7 @@
             <a:fld id="{87DE6118-2437-4B30-8E3C-4D2BE6020583}" type="datetimeFigureOut">
               <a:rPr lang="en-US" dirty="0"/>
               <a:pPr/>
-              <a:t>11/19/23</a:t>
+              <a:t>11/20/23</a:t>
             </a:fld>
             <a:endParaRPr lang="en-US" dirty="0"/>
           </a:p>
@@ -3631,7 +3631,7 @@
             <a:fld id="{87DE6118-2437-4B30-8E3C-4D2BE6020583}" type="datetimeFigureOut">
               <a:rPr lang="en-US" dirty="0"/>
               <a:pPr/>
-              <a:t>11/19/23</a:t>
+              <a:t>11/20/23</a:t>
             </a:fld>
             <a:endParaRPr lang="en-US" dirty="0"/>
           </a:p>
@@ -3906,7 +3906,7 @@
             <a:fld id="{87DE6118-2437-4B30-8E3C-4D2BE6020583}" type="datetimeFigureOut">
               <a:rPr lang="en-US" dirty="0"/>
               <a:pPr/>
-              <a:t>11/19/23</a:t>
+              <a:t>11/20/23</a:t>
             </a:fld>
             <a:endParaRPr lang="en-US" dirty="0"/>
           </a:p>
@@ -4956,12 +4956,8 @@
               <a:buChar char="§"/>
             </a:pPr>
             <a:r>
-              <a:rPr lang="en-US" b="1" dirty="0" err="1"/>
-              <a:t>NoNewNormal</a:t>
-            </a:r>
-            <a:r>
               <a:rPr lang="en-US" b="1" dirty="0"/>
-              <a:t> dataset on Reddit</a:t>
+              <a:t>NoNewNormal dataset on Reddit</a:t>
             </a:r>
           </a:p>
           <a:p>
@@ -4971,13 +4967,8 @@
             </a:pPr>
             <a:r>
               <a:rPr lang="en-US" dirty="0"/>
-              <a:t>Comments on the now banned subreddit /r/</a:t>
-            </a:r>
-            <a:r>
-              <a:rPr lang="en-US" dirty="0" err="1"/>
-              <a:t>NoNewNormal</a:t>
-            </a:r>
-            <a:endParaRPr lang="en-US" dirty="0"/>
+              <a:t>Comments on the now banned subreddit /r/NoNewNormal</a:t>
+            </a:r>
           </a:p>
           <a:p>
             <a:pPr lvl="1">
@@ -5266,7 +5257,7 @@
             </a:pPr>
             <a:r>
               <a:rPr lang="en-US" dirty="0"/>
-              <a:t>Graph 1 shows the most popular comments made on a trucker rally subreddit and its sentiment.</a:t>
+              <a:t>Graph 1 shows the most popular comments made on a Freedom Convoy subreddit and its sentiment.</a:t>
             </a:r>
           </a:p>
           <a:p>
@@ -5276,7 +5267,7 @@
             </a:pPr>
             <a:r>
               <a:rPr lang="en-US" dirty="0"/>
-              <a:t>Graph 2 shows the most popular comments made on a bitcoin subreddit and its sentiment. </a:t>
+              <a:t>Graph 2 shows the most popular comments made on a Bitcoin subreddit and its sentiment. </a:t>
             </a:r>
           </a:p>
           <a:p>
@@ -5428,7 +5419,7 @@
         <p:spPr/>
         <p:txBody>
           <a:bodyPr>
-            <a:normAutofit lnSpcReduction="10000"/>
+            <a:normAutofit fontScale="92500" lnSpcReduction="10000"/>
           </a:bodyPr>
           <a:lstStyle/>
           <a:p>
@@ -5448,7 +5439,7 @@
             </a:pPr>
             <a:r>
               <a:rPr lang="en-US" dirty="0"/>
-              <a:t>Graph 1 displays the average scores for all the posts from doge comments</a:t>
+              <a:t>Graph 1 displays the average scores for all the posts from Doge comments.</a:t>
             </a:r>
           </a:p>
           <a:p>
@@ -5458,7 +5449,7 @@
             </a:pPr>
             <a:r>
               <a:rPr lang="en-US" dirty="0"/>
-              <a:t>Graph 2 displays the trucker comments</a:t>
+              <a:t>Graph 2 displays the average scores for all posts from Freedom Convoy comments</a:t>
             </a:r>
           </a:p>
           <a:p>
@@ -5630,7 +5621,7 @@
             </a:pPr>
             <a:r>
               <a:rPr lang="en-US" dirty="0"/>
-              <a:t>Graph 1 doge (1 year data)</a:t>
+              <a:t>Graph 1 Doge comments over the span on one year. </a:t>
             </a:r>
           </a:p>
           <a:p>
@@ -5640,7 +5631,7 @@
             </a:pPr>
             <a:r>
               <a:rPr lang="en-US" dirty="0"/>
-              <a:t>Graph 2 no new normal (14 months)</a:t>
+              <a:t>Graph 2 NoNewNormal comments over the span of 15 months.</a:t>
             </a:r>
           </a:p>
         </p:txBody>
@@ -5667,7 +5658,7 @@
         </p:blipFill>
         <p:spPr>
           <a:xfrm>
-            <a:off x="5540992" y="3429000"/>
+            <a:off x="5555060" y="3471204"/>
             <a:ext cx="6651008" cy="3325504"/>
           </a:xfrm>
           <a:prstGeom prst="rect">
@@ -5779,10 +5770,15 @@
             <p:ph type="body" sz="half" idx="2"/>
           </p:nvPr>
         </p:nvSpPr>
-        <p:spPr/>
+        <p:spPr>
+          <a:xfrm>
+            <a:off x="723900" y="2856343"/>
+            <a:ext cx="3855720" cy="3582957"/>
+          </a:xfrm>
+        </p:spPr>
         <p:txBody>
           <a:bodyPr>
-            <a:normAutofit lnSpcReduction="10000"/>
+            <a:normAutofit fontScale="85000" lnSpcReduction="10000"/>
           </a:bodyPr>
           <a:lstStyle/>
           <a:p>
@@ -5802,15 +5798,7 @@
             </a:pPr>
             <a:r>
               <a:rPr lang="en-US" dirty="0"/>
-              <a:t>Graph 1 </a:t>
-            </a:r>
-            <a:r>
-              <a:rPr lang="en-US" dirty="0" err="1"/>
-              <a:t>NoNewNormal</a:t>
-            </a:r>
-            <a:r>
-              <a:rPr lang="en-US" dirty="0"/>
-              <a:t> subreddit</a:t>
+              <a:t>Graph 1 NoNewNormal subreddit and all its comment creation times vs average score.</a:t>
             </a:r>
           </a:p>
           <a:p>
@@ -5820,7 +5808,7 @@
             </a:pPr>
             <a:r>
               <a:rPr lang="en-US" dirty="0"/>
-              <a:t>Graph 2 Doge subreddit</a:t>
+              <a:t>Graph 2 Doge subreddit and all its comment creation times vs average score.</a:t>
             </a:r>
           </a:p>
           <a:p>
@@ -5830,7 +5818,7 @@
             </a:pPr>
             <a:r>
               <a:rPr lang="en-US" dirty="0"/>
-              <a:t>Graph 3 Trucker subreddit</a:t>
+              <a:t>Graph 3 Trucker subreddit and all its comment creation times vs average score.</a:t>
             </a:r>
           </a:p>
         </p:txBody>
@@ -6010,7 +5998,7 @@
             </a:pPr>
             <a:r>
               <a:rPr lang="en-US" dirty="0"/>
-              <a:t>Number of likes and the number of comments comparison </a:t>
+              <a:t>Number of likes and the number of comments comparison.</a:t>
             </a:r>
           </a:p>
         </p:txBody>

</xml_diff>

<commit_message>
-Ran number of comments and added to presentation -Added more to the presentation
</commit_message>
<xml_diff>
--- a/presentation.pptx
+++ b/presentation.pptx
@@ -5,21 +5,22 @@
     <p:sldMasterId id="2147483672" r:id="rId1"/>
   </p:sldMasterIdLst>
   <p:notesMasterIdLst>
-    <p:notesMasterId r:id="rId14"/>
+    <p:notesMasterId r:id="rId15"/>
   </p:notesMasterIdLst>
   <p:sldIdLst>
     <p:sldId id="256" r:id="rId2"/>
     <p:sldId id="266" r:id="rId3"/>
     <p:sldId id="257" r:id="rId4"/>
     <p:sldId id="267" r:id="rId5"/>
-    <p:sldId id="258" r:id="rId6"/>
-    <p:sldId id="259" r:id="rId7"/>
-    <p:sldId id="261" r:id="rId8"/>
-    <p:sldId id="262" r:id="rId9"/>
-    <p:sldId id="268" r:id="rId10"/>
-    <p:sldId id="263" r:id="rId11"/>
-    <p:sldId id="265" r:id="rId12"/>
-    <p:sldId id="264" r:id="rId13"/>
+    <p:sldId id="269" r:id="rId6"/>
+    <p:sldId id="258" r:id="rId7"/>
+    <p:sldId id="259" r:id="rId8"/>
+    <p:sldId id="261" r:id="rId9"/>
+    <p:sldId id="262" r:id="rId10"/>
+    <p:sldId id="268" r:id="rId11"/>
+    <p:sldId id="263" r:id="rId12"/>
+    <p:sldId id="265" r:id="rId13"/>
+    <p:sldId id="264" r:id="rId14"/>
   </p:sldIdLst>
   <p:sldSz cx="12192000" cy="6858000"/>
   <p:notesSz cx="6858000" cy="9144000"/>
@@ -6849,7 +6850,7 @@
           <a:p>
             <a:fld id="{E739E779-C954-044B-8D8E-BA4197E97735}" type="datetimeFigureOut">
               <a:rPr lang="en-US" smtClean="0"/>
-              <a:t>11/21/23</a:t>
+              <a:t>11/22/23</a:t>
             </a:fld>
             <a:endParaRPr lang="en-US"/>
           </a:p>
@@ -7642,7 +7643,7 @@
           <a:p>
             <a:fld id="{AA65BE39-5482-074B-AA8F-346DF8290411}" type="slidenum">
               <a:rPr lang="en-US" smtClean="0"/>
-              <a:t>5</a:t>
+              <a:t>6</a:t>
             </a:fld>
             <a:endParaRPr lang="en-US"/>
           </a:p>
@@ -7756,7 +7757,7 @@
           <a:p>
             <a:fld id="{AA65BE39-5482-074B-AA8F-346DF8290411}" type="slidenum">
               <a:rPr lang="en-US" smtClean="0"/>
-              <a:t>6</a:t>
+              <a:t>7</a:t>
             </a:fld>
             <a:endParaRPr lang="en-US"/>
           </a:p>
@@ -7819,6 +7820,47 @@
           <a:bodyPr/>
           <a:lstStyle/>
           <a:p>
+            <a:r>
+              <a:rPr lang="en-US" dirty="0"/>
+              <a:t>The next set of analysis done as based on the creation time of a post and its popularity. </a:t>
+            </a:r>
+          </a:p>
+          <a:p>
+            <a:r>
+              <a:rPr lang="en-US" dirty="0"/>
+              <a:t>We hypothesized that over time the popularity of a topic would steadily decrease. </a:t>
+            </a:r>
+          </a:p>
+          <a:p>
+            <a:br>
+              <a:rPr lang="en-US" dirty="0"/>
+            </a:br>
+            <a:r>
+              <a:rPr lang="en-US" dirty="0"/>
+              <a:t>Our analysis supports this claim, as we can see based on two different data sets. </a:t>
+            </a:r>
+          </a:p>
+          <a:p>
+            <a:r>
+              <a:rPr lang="en-US" dirty="0"/>
+              <a:t>One containing all comments made that contain the word “Doge” and all the comments on the NoNewNormal subreddit. In both cases we see a downward trend with the average scores </a:t>
+            </a:r>
+            <a:r>
+              <a:rPr lang="en-US" dirty="0" err="1"/>
+              <a:t>ofall</a:t>
+            </a:r>
+            <a:r>
+              <a:rPr lang="en-US" dirty="0"/>
+              <a:t> posts in each month. </a:t>
+            </a:r>
+          </a:p>
+          <a:p>
+            <a:endParaRPr lang="en-US" dirty="0"/>
+          </a:p>
+          <a:p>
+            <a:endParaRPr lang="en-US" dirty="0"/>
+          </a:p>
+          <a:p>
             <a:endParaRPr lang="en-US" dirty="0"/>
           </a:p>
         </p:txBody>
@@ -7849,7 +7891,194 @@
     </p:spTree>
     <p:extLst>
       <p:ext uri="{BB962C8B-B14F-4D97-AF65-F5344CB8AC3E}">
+        <p14:creationId xmlns:p14="http://schemas.microsoft.com/office/powerpoint/2010/main" val="352731850"/>
+      </p:ext>
+    </p:extLst>
+  </p:cSld>
+  <p:clrMapOvr>
+    <a:masterClrMapping/>
+  </p:clrMapOvr>
+</p:notes>
+</file>
+
+<file path=ppt/notesSlides/notesSlide8.xml><?xml version="1.0" encoding="utf-8"?>
+<p:notes xmlns:a="http://schemas.openxmlformats.org/drawingml/2006/main" xmlns:r="http://schemas.openxmlformats.org/officeDocument/2006/relationships" xmlns:p="http://schemas.openxmlformats.org/presentationml/2006/main">
+  <p:cSld>
+    <p:spTree>
+      <p:nvGrpSpPr>
+        <p:cNvPr id="1" name=""/>
+        <p:cNvGrpSpPr/>
+        <p:nvPr/>
+      </p:nvGrpSpPr>
+      <p:grpSpPr>
+        <a:xfrm>
+          <a:off x="0" y="0"/>
+          <a:ext cx="0" cy="0"/>
+          <a:chOff x="0" y="0"/>
+          <a:chExt cx="0" cy="0"/>
+        </a:xfrm>
+      </p:grpSpPr>
+      <p:sp>
+        <p:nvSpPr>
+          <p:cNvPr id="2" name="Slide Image Placeholder 1"/>
+          <p:cNvSpPr>
+            <a:spLocks noGrp="1" noRot="1" noChangeAspect="1"/>
+          </p:cNvSpPr>
+          <p:nvPr>
+            <p:ph type="sldImg"/>
+          </p:nvPr>
+        </p:nvSpPr>
+        <p:spPr/>
+      </p:sp>
+      <p:sp>
+        <p:nvSpPr>
+          <p:cNvPr id="3" name="Notes Placeholder 2"/>
+          <p:cNvSpPr>
+            <a:spLocks noGrp="1"/>
+          </p:cNvSpPr>
+          <p:nvPr>
+            <p:ph type="body" idx="1"/>
+          </p:nvPr>
+        </p:nvSpPr>
+        <p:spPr/>
+        <p:txBody>
+          <a:bodyPr/>
+          <a:lstStyle/>
+          <a:p>
+            <a:r>
+              <a:rPr lang="en-US" dirty="0"/>
+              <a:t>Aside from just the overall change in popularity over time we wanted to see if the time of day a comment was made would affect its popularity. </a:t>
+            </a:r>
+            <a:br>
+              <a:rPr lang="en-US" dirty="0"/>
+            </a:br>
+            <a:r>
+              <a:rPr lang="en-US" dirty="0"/>
+              <a:t>We hypothesized that there would be a trend in which the most popular house would be between work hours, mornings, breaks and after work.</a:t>
+            </a:r>
+          </a:p>
+          <a:p>
+            <a:endParaRPr lang="en-US" dirty="0"/>
+          </a:p>
+          <a:p>
+            <a:r>
+              <a:rPr lang="en-US" dirty="0"/>
+              <a:t>The analysis done on multiple datasets came back to support out hypothesis. As we can see there is an obvious trend with popularity and time of day. We can see that comments made in the early morning, noon, and evenings, on average, do better than those posted during the normal work hours, 8-11 and 1-6.</a:t>
+            </a:r>
+          </a:p>
+        </p:txBody>
+      </p:sp>
+      <p:sp>
+        <p:nvSpPr>
+          <p:cNvPr id="4" name="Slide Number Placeholder 3"/>
+          <p:cNvSpPr>
+            <a:spLocks noGrp="1"/>
+          </p:cNvSpPr>
+          <p:nvPr>
+            <p:ph type="sldNum" sz="quarter" idx="5"/>
+          </p:nvPr>
+        </p:nvSpPr>
+        <p:spPr/>
+        <p:txBody>
+          <a:bodyPr/>
+          <a:lstStyle/>
+          <a:p>
+            <a:fld id="{AA65BE39-5482-074B-AA8F-346DF8290411}" type="slidenum">
+              <a:rPr lang="en-US" smtClean="0"/>
+              <a:t>9</a:t>
+            </a:fld>
+            <a:endParaRPr lang="en-US"/>
+          </a:p>
+        </p:txBody>
+      </p:sp>
+    </p:spTree>
+    <p:extLst>
+      <p:ext uri="{BB962C8B-B14F-4D97-AF65-F5344CB8AC3E}">
         <p14:creationId xmlns:p14="http://schemas.microsoft.com/office/powerpoint/2010/main" val="3357520369"/>
+      </p:ext>
+    </p:extLst>
+  </p:cSld>
+  <p:clrMapOvr>
+    <a:masterClrMapping/>
+  </p:clrMapOvr>
+</p:notes>
+</file>
+
+<file path=ppt/notesSlides/notesSlide9.xml><?xml version="1.0" encoding="utf-8"?>
+<p:notes xmlns:a="http://schemas.openxmlformats.org/drawingml/2006/main" xmlns:r="http://schemas.openxmlformats.org/officeDocument/2006/relationships" xmlns:p="http://schemas.openxmlformats.org/presentationml/2006/main">
+  <p:cSld>
+    <p:spTree>
+      <p:nvGrpSpPr>
+        <p:cNvPr id="1" name=""/>
+        <p:cNvGrpSpPr/>
+        <p:nvPr/>
+      </p:nvGrpSpPr>
+      <p:grpSpPr>
+        <a:xfrm>
+          <a:off x="0" y="0"/>
+          <a:ext cx="0" cy="0"/>
+          <a:chOff x="0" y="0"/>
+          <a:chExt cx="0" cy="0"/>
+        </a:xfrm>
+      </p:grpSpPr>
+      <p:sp>
+        <p:nvSpPr>
+          <p:cNvPr id="2" name="Slide Image Placeholder 1"/>
+          <p:cNvSpPr>
+            <a:spLocks noGrp="1" noRot="1" noChangeAspect="1"/>
+          </p:cNvSpPr>
+          <p:nvPr>
+            <p:ph type="sldImg"/>
+          </p:nvPr>
+        </p:nvSpPr>
+        <p:spPr/>
+      </p:sp>
+      <p:sp>
+        <p:nvSpPr>
+          <p:cNvPr id="3" name="Notes Placeholder 2"/>
+          <p:cNvSpPr>
+            <a:spLocks noGrp="1"/>
+          </p:cNvSpPr>
+          <p:nvPr>
+            <p:ph type="body" idx="1"/>
+          </p:nvPr>
+        </p:nvSpPr>
+        <p:spPr/>
+        <p:txBody>
+          <a:bodyPr/>
+          <a:lstStyle/>
+          <a:p>
+            <a:endParaRPr lang="en-US" dirty="0"/>
+          </a:p>
+        </p:txBody>
+      </p:sp>
+      <p:sp>
+        <p:nvSpPr>
+          <p:cNvPr id="4" name="Slide Number Placeholder 3"/>
+          <p:cNvSpPr>
+            <a:spLocks noGrp="1"/>
+          </p:cNvSpPr>
+          <p:nvPr>
+            <p:ph type="sldNum" sz="quarter" idx="5"/>
+          </p:nvPr>
+        </p:nvSpPr>
+        <p:spPr/>
+        <p:txBody>
+          <a:bodyPr/>
+          <a:lstStyle/>
+          <a:p>
+            <a:fld id="{AA65BE39-5482-074B-AA8F-346DF8290411}" type="slidenum">
+              <a:rPr lang="en-US" smtClean="0"/>
+              <a:t>10</a:t>
+            </a:fld>
+            <a:endParaRPr lang="en-US"/>
+          </a:p>
+        </p:txBody>
+      </p:sp>
+    </p:spTree>
+    <p:extLst>
+      <p:ext uri="{BB962C8B-B14F-4D97-AF65-F5344CB8AC3E}">
+        <p14:creationId xmlns:p14="http://schemas.microsoft.com/office/powerpoint/2010/main" val="2266448430"/>
       </p:ext>
     </p:extLst>
   </p:cSld>
@@ -8029,7 +8258,7 @@
             <a:fld id="{87DE6118-2437-4B30-8E3C-4D2BE6020583}" type="datetimeFigureOut">
               <a:rPr lang="en-US" smtClean="0"/>
               <a:pPr/>
-              <a:t>11/21/23</a:t>
+              <a:t>11/22/23</a:t>
             </a:fld>
             <a:endParaRPr lang="en-US" dirty="0"/>
           </a:p>
@@ -8243,13 +8472,13 @@
   <p:clrMapOvr>
     <a:overrideClrMapping bg1="lt1" tx1="dk1" bg2="lt2" tx2="dk2" accent1="accent1" accent2="accent2" accent3="accent3" accent4="accent4" accent5="accent5" accent6="accent6" hlink="hlink" folHlink="folHlink"/>
   </p:clrMapOvr>
-  <mc:AlternateContent xmlns:mc="http://schemas.openxmlformats.org/markup-compatibility/2006">
-    <mc:Choice xmlns:p14="http://schemas.microsoft.com/office/powerpoint/2010/main" Requires="p14">
+  <mc:AlternateContent xmlns:mc="http://schemas.openxmlformats.org/markup-compatibility/2006" xmlns:p14="http://schemas.microsoft.com/office/powerpoint/2010/main">
+    <mc:Choice Requires="p14">
       <p:transition spd="med" p14:dur="700">
         <p:fade/>
       </p:transition>
     </mc:Choice>
-    <mc:Fallback>
+    <mc:Fallback xmlns="">
       <p:transition spd="med">
         <p:fade/>
       </p:transition>
@@ -8372,7 +8601,7 @@
           <a:p>
             <a:fld id="{87DE6118-2437-4B30-8E3C-4D2BE6020583}" type="datetimeFigureOut">
               <a:rPr lang="en-US" smtClean="0"/>
-              <a:t>11/21/23</a:t>
+              <a:t>11/22/23</a:t>
             </a:fld>
             <a:endParaRPr lang="en-US" dirty="0"/>
           </a:p>
@@ -8430,13 +8659,13 @@
   <p:clrMapOvr>
     <a:masterClrMapping/>
   </p:clrMapOvr>
-  <mc:AlternateContent xmlns:mc="http://schemas.openxmlformats.org/markup-compatibility/2006">
-    <mc:Choice xmlns:p14="http://schemas.microsoft.com/office/powerpoint/2010/main" Requires="p14">
+  <mc:AlternateContent xmlns:mc="http://schemas.openxmlformats.org/markup-compatibility/2006" xmlns:p14="http://schemas.microsoft.com/office/powerpoint/2010/main">
+    <mc:Choice Requires="p14">
       <p:transition spd="med" p14:dur="700">
         <p:fade/>
       </p:transition>
     </mc:Choice>
-    <mc:Fallback>
+    <mc:Fallback xmlns="">
       <p:transition spd="med">
         <p:fade/>
       </p:transition>
@@ -8564,7 +8793,7 @@
           <a:p>
             <a:fld id="{87DE6118-2437-4B30-8E3C-4D2BE6020583}" type="datetimeFigureOut">
               <a:rPr lang="en-US" smtClean="0"/>
-              <a:t>11/21/23</a:t>
+              <a:t>11/22/23</a:t>
             </a:fld>
             <a:endParaRPr lang="en-US" dirty="0"/>
           </a:p>
@@ -8622,13 +8851,13 @@
   <p:clrMapOvr>
     <a:masterClrMapping/>
   </p:clrMapOvr>
-  <mc:AlternateContent xmlns:mc="http://schemas.openxmlformats.org/markup-compatibility/2006">
-    <mc:Choice xmlns:p14="http://schemas.microsoft.com/office/powerpoint/2010/main" Requires="p14">
+  <mc:AlternateContent xmlns:mc="http://schemas.openxmlformats.org/markup-compatibility/2006" xmlns:p14="http://schemas.microsoft.com/office/powerpoint/2010/main">
+    <mc:Choice Requires="p14">
       <p:transition spd="med" p14:dur="700">
         <p:fade/>
       </p:transition>
     </mc:Choice>
-    <mc:Fallback>
+    <mc:Fallback xmlns="">
       <p:transition spd="med">
         <p:fade/>
       </p:transition>
@@ -8746,7 +8975,7 @@
           <a:p>
             <a:fld id="{87DE6118-2437-4B30-8E3C-4D2BE6020583}" type="datetimeFigureOut">
               <a:rPr lang="en-US" smtClean="0"/>
-              <a:t>11/21/23</a:t>
+              <a:t>11/22/23</a:t>
             </a:fld>
             <a:endParaRPr lang="en-US" dirty="0"/>
           </a:p>
@@ -8804,13 +9033,13 @@
   <p:clrMapOvr>
     <a:masterClrMapping/>
   </p:clrMapOvr>
-  <mc:AlternateContent xmlns:mc="http://schemas.openxmlformats.org/markup-compatibility/2006">
-    <mc:Choice xmlns:p14="http://schemas.microsoft.com/office/powerpoint/2010/main" Requires="p14">
+  <mc:AlternateContent xmlns:mc="http://schemas.openxmlformats.org/markup-compatibility/2006" xmlns:p14="http://schemas.microsoft.com/office/powerpoint/2010/main">
+    <mc:Choice Requires="p14">
       <p:transition spd="med" p14:dur="700">
         <p:fade/>
       </p:transition>
     </mc:Choice>
-    <mc:Fallback>
+    <mc:Fallback xmlns="">
       <p:transition spd="med">
         <p:fade/>
       </p:transition>
@@ -9036,7 +9265,7 @@
             <a:fld id="{87DE6118-2437-4B30-8E3C-4D2BE6020583}" type="datetimeFigureOut">
               <a:rPr lang="en-US" smtClean="0"/>
               <a:pPr/>
-              <a:t>11/21/23</a:t>
+              <a:t>11/22/23</a:t>
             </a:fld>
             <a:endParaRPr lang="en-US" dirty="0"/>
           </a:p>
@@ -9177,13 +9406,13 @@
   <p:clrMapOvr>
     <a:overrideClrMapping bg1="dk1" tx1="lt1" bg2="dk2" tx2="lt2" accent1="accent1" accent2="accent2" accent3="accent3" accent4="accent4" accent5="accent5" accent6="accent6" hlink="hlink" folHlink="folHlink"/>
   </p:clrMapOvr>
-  <mc:AlternateContent xmlns:mc="http://schemas.openxmlformats.org/markup-compatibility/2006">
-    <mc:Choice xmlns:p14="http://schemas.microsoft.com/office/powerpoint/2010/main" Requires="p14">
+  <mc:AlternateContent xmlns:mc="http://schemas.openxmlformats.org/markup-compatibility/2006" xmlns:p14="http://schemas.microsoft.com/office/powerpoint/2010/main">
+    <mc:Choice Requires="p14">
       <p:transition spd="med" p14:dur="700">
         <p:fade/>
       </p:transition>
     </mc:Choice>
-    <mc:Fallback>
+    <mc:Fallback xmlns="">
       <p:transition spd="med">
         <p:fade/>
       </p:transition>
@@ -9443,7 +9672,7 @@
           <a:p>
             <a:fld id="{87DE6118-2437-4B30-8E3C-4D2BE6020583}" type="datetimeFigureOut">
               <a:rPr lang="en-US" smtClean="0"/>
-              <a:t>11/21/23</a:t>
+              <a:t>11/22/23</a:t>
             </a:fld>
             <a:endParaRPr lang="en-US" dirty="0"/>
           </a:p>
@@ -9501,13 +9730,13 @@
   <p:clrMapOvr>
     <a:masterClrMapping/>
   </p:clrMapOvr>
-  <mc:AlternateContent xmlns:mc="http://schemas.openxmlformats.org/markup-compatibility/2006">
-    <mc:Choice xmlns:p14="http://schemas.microsoft.com/office/powerpoint/2010/main" Requires="p14">
+  <mc:AlternateContent xmlns:mc="http://schemas.openxmlformats.org/markup-compatibility/2006" xmlns:p14="http://schemas.microsoft.com/office/powerpoint/2010/main">
+    <mc:Choice Requires="p14">
       <p:transition spd="med" p14:dur="700">
         <p:fade/>
       </p:transition>
     </mc:Choice>
-    <mc:Fallback>
+    <mc:Fallback xmlns="">
       <p:transition spd="med">
         <p:fade/>
       </p:transition>
@@ -9932,7 +10161,7 @@
           <a:p>
             <a:fld id="{87DE6118-2437-4B30-8E3C-4D2BE6020583}" type="datetimeFigureOut">
               <a:rPr lang="en-US" smtClean="0"/>
-              <a:t>11/21/23</a:t>
+              <a:t>11/22/23</a:t>
             </a:fld>
             <a:endParaRPr lang="en-US" dirty="0"/>
           </a:p>
@@ -9990,13 +10219,13 @@
   <p:clrMapOvr>
     <a:masterClrMapping/>
   </p:clrMapOvr>
-  <mc:AlternateContent xmlns:mc="http://schemas.openxmlformats.org/markup-compatibility/2006">
-    <mc:Choice xmlns:p14="http://schemas.microsoft.com/office/powerpoint/2010/main" Requires="p14">
+  <mc:AlternateContent xmlns:mc="http://schemas.openxmlformats.org/markup-compatibility/2006" xmlns:p14="http://schemas.microsoft.com/office/powerpoint/2010/main">
+    <mc:Choice Requires="p14">
       <p:transition spd="med" p14:dur="700">
         <p:fade/>
       </p:transition>
     </mc:Choice>
-    <mc:Fallback>
+    <mc:Fallback xmlns="">
       <p:transition spd="med">
         <p:fade/>
       </p:transition>
@@ -10062,7 +10291,7 @@
           <a:p>
             <a:fld id="{87DE6118-2437-4B30-8E3C-4D2BE6020583}" type="datetimeFigureOut">
               <a:rPr lang="en-US" smtClean="0"/>
-              <a:t>11/21/23</a:t>
+              <a:t>11/22/23</a:t>
             </a:fld>
             <a:endParaRPr lang="en-US" dirty="0"/>
           </a:p>
@@ -10120,13 +10349,13 @@
   <p:clrMapOvr>
     <a:masterClrMapping/>
   </p:clrMapOvr>
-  <mc:AlternateContent xmlns:mc="http://schemas.openxmlformats.org/markup-compatibility/2006">
-    <mc:Choice xmlns:p14="http://schemas.microsoft.com/office/powerpoint/2010/main" Requires="p14">
+  <mc:AlternateContent xmlns:mc="http://schemas.openxmlformats.org/markup-compatibility/2006" xmlns:p14="http://schemas.microsoft.com/office/powerpoint/2010/main">
+    <mc:Choice Requires="p14">
       <p:transition spd="med" p14:dur="700">
         <p:fade/>
       </p:transition>
     </mc:Choice>
-    <mc:Fallback>
+    <mc:Fallback xmlns="">
       <p:transition spd="med">
         <p:fade/>
       </p:transition>
@@ -10169,7 +10398,7 @@
           <a:p>
             <a:fld id="{87DE6118-2437-4B30-8E3C-4D2BE6020583}" type="datetimeFigureOut">
               <a:rPr lang="en-US" smtClean="0"/>
-              <a:t>11/21/23</a:t>
+              <a:t>11/22/23</a:t>
             </a:fld>
             <a:endParaRPr lang="en-US" dirty="0"/>
           </a:p>
@@ -10227,13 +10456,13 @@
   <p:clrMapOvr>
     <a:masterClrMapping/>
   </p:clrMapOvr>
-  <mc:AlternateContent xmlns:mc="http://schemas.openxmlformats.org/markup-compatibility/2006">
-    <mc:Choice xmlns:p14="http://schemas.microsoft.com/office/powerpoint/2010/main" Requires="p14">
+  <mc:AlternateContent xmlns:mc="http://schemas.openxmlformats.org/markup-compatibility/2006" xmlns:p14="http://schemas.microsoft.com/office/powerpoint/2010/main">
+    <mc:Choice Requires="p14">
       <p:transition spd="med" p14:dur="700">
         <p:fade/>
       </p:transition>
     </mc:Choice>
-    <mc:Fallback>
+    <mc:Fallback xmlns="">
       <p:transition spd="med">
         <p:fade/>
       </p:transition>
@@ -10528,7 +10757,7 @@
             <a:fld id="{87DE6118-2437-4B30-8E3C-4D2BE6020583}" type="datetimeFigureOut">
               <a:rPr lang="en-US" smtClean="0"/>
               <a:pPr/>
-              <a:t>11/21/23</a:t>
+              <a:t>11/22/23</a:t>
             </a:fld>
             <a:endParaRPr lang="en-US" dirty="0"/>
           </a:p>
@@ -10651,13 +10880,13 @@
   <p:clrMapOvr>
     <a:masterClrMapping/>
   </p:clrMapOvr>
-  <mc:AlternateContent xmlns:mc="http://schemas.openxmlformats.org/markup-compatibility/2006">
-    <mc:Choice xmlns:p14="http://schemas.microsoft.com/office/powerpoint/2010/main" Requires="p14">
+  <mc:AlternateContent xmlns:mc="http://schemas.openxmlformats.org/markup-compatibility/2006" xmlns:p14="http://schemas.microsoft.com/office/powerpoint/2010/main">
+    <mc:Choice Requires="p14">
       <p:transition spd="med" p14:dur="700">
         <p:fade/>
       </p:transition>
     </mc:Choice>
-    <mc:Fallback>
+    <mc:Fallback xmlns="">
       <p:transition spd="med">
         <p:fade/>
       </p:transition>
@@ -10930,7 +11159,7 @@
             <a:fld id="{87DE6118-2437-4B30-8E3C-4D2BE6020583}" type="datetimeFigureOut">
               <a:rPr lang="en-US" smtClean="0"/>
               <a:pPr/>
-              <a:t>11/21/23</a:t>
+              <a:t>11/22/23</a:t>
             </a:fld>
             <a:endParaRPr lang="en-US" dirty="0"/>
           </a:p>
@@ -11053,13 +11282,13 @@
   <p:clrMapOvr>
     <a:masterClrMapping/>
   </p:clrMapOvr>
-  <mc:AlternateContent xmlns:mc="http://schemas.openxmlformats.org/markup-compatibility/2006">
-    <mc:Choice xmlns:p14="http://schemas.microsoft.com/office/powerpoint/2010/main" Requires="p14">
+  <mc:AlternateContent xmlns:mc="http://schemas.openxmlformats.org/markup-compatibility/2006" xmlns:p14="http://schemas.microsoft.com/office/powerpoint/2010/main">
+    <mc:Choice Requires="p14">
       <p:transition spd="med" p14:dur="700">
         <p:fade/>
       </p:transition>
     </mc:Choice>
-    <mc:Fallback>
+    <mc:Fallback xmlns="">
       <p:transition spd="med">
         <p:fade/>
       </p:transition>
@@ -11222,7 +11451,7 @@
             <a:fld id="{87DE6118-2437-4B30-8E3C-4D2BE6020583}" type="datetimeFigureOut">
               <a:rPr lang="en-US" smtClean="0"/>
               <a:pPr/>
-              <a:t>11/21/23</a:t>
+              <a:t>11/22/23</a:t>
             </a:fld>
             <a:endParaRPr lang="en-US" dirty="0"/>
           </a:p>
@@ -11362,13 +11591,13 @@
     <p:sldLayoutId id="2147483682" r:id="rId10"/>
     <p:sldLayoutId id="2147483683" r:id="rId11"/>
   </p:sldLayoutIdLst>
-  <mc:AlternateContent xmlns:mc="http://schemas.openxmlformats.org/markup-compatibility/2006">
-    <mc:Choice xmlns:p14="http://schemas.microsoft.com/office/powerpoint/2010/main" Requires="p14">
+  <mc:AlternateContent xmlns:mc="http://schemas.openxmlformats.org/markup-compatibility/2006" xmlns:p14="http://schemas.microsoft.com/office/powerpoint/2010/main">
+    <mc:Choice Requires="p14">
       <p:transition spd="med" p14:dur="700">
         <p:fade/>
       </p:transition>
     </mc:Choice>
-    <mc:Fallback>
+    <mc:Fallback xmlns="">
       <p:transition spd="med">
         <p:fade/>
       </p:transition>
@@ -11834,11 +12063,11 @@
   <p:clrMapOvr>
     <a:masterClrMapping/>
   </p:clrMapOvr>
-  <mc:AlternateContent xmlns:mc="http://schemas.openxmlformats.org/markup-compatibility/2006">
-    <mc:Choice xmlns:p14="http://schemas.microsoft.com/office/powerpoint/2010/main" Requires="p14">
+  <mc:AlternateContent xmlns:mc="http://schemas.openxmlformats.org/markup-compatibility/2006" xmlns:p14="http://schemas.microsoft.com/office/powerpoint/2010/main">
+    <mc:Choice Requires="p14">
       <p:transition p14:dur="0"/>
     </mc:Choice>
-    <mc:Fallback>
+    <mc:Fallback xmlns="">
       <p:transition/>
     </mc:Fallback>
   </mc:AlternateContent>
@@ -11987,6 +12216,213 @@
 <file path=ppt/slides/slide10.xml><?xml version="1.0" encoding="utf-8"?>
 <p:sld xmlns:a="http://schemas.openxmlformats.org/drawingml/2006/main" xmlns:r="http://schemas.openxmlformats.org/officeDocument/2006/relationships" xmlns:p="http://schemas.openxmlformats.org/presentationml/2006/main">
   <p:cSld>
+    <p:spTree>
+      <p:nvGrpSpPr>
+        <p:cNvPr id="1" name=""/>
+        <p:cNvGrpSpPr/>
+        <p:nvPr/>
+      </p:nvGrpSpPr>
+      <p:grpSpPr>
+        <a:xfrm>
+          <a:off x="0" y="0"/>
+          <a:ext cx="0" cy="0"/>
+          <a:chOff x="0" y="0"/>
+          <a:chExt cx="0" cy="0"/>
+        </a:xfrm>
+      </p:grpSpPr>
+      <p:sp>
+        <p:nvSpPr>
+          <p:cNvPr id="2" name="Title 1">
+            <a:extLst>
+              <a:ext uri="{FF2B5EF4-FFF2-40B4-BE49-F238E27FC236}">
+                <a16:creationId xmlns:a16="http://schemas.microsoft.com/office/drawing/2014/main" id="{329004B7-74A5-F7B7-F0EF-308D2FB8FE56}"/>
+              </a:ext>
+            </a:extLst>
+          </p:cNvPr>
+          <p:cNvSpPr>
+            <a:spLocks noGrp="1"/>
+          </p:cNvSpPr>
+          <p:nvPr>
+            <p:ph type="title"/>
+          </p:nvPr>
+        </p:nvSpPr>
+        <p:spPr/>
+        <p:txBody>
+          <a:bodyPr/>
+          <a:lstStyle/>
+          <a:p>
+            <a:r>
+              <a:rPr lang="en-US" dirty="0"/>
+              <a:t>Popularity and Comments</a:t>
+            </a:r>
+          </a:p>
+        </p:txBody>
+      </p:sp>
+      <p:sp>
+        <p:nvSpPr>
+          <p:cNvPr id="4" name="Text Placeholder 3">
+            <a:extLst>
+              <a:ext uri="{FF2B5EF4-FFF2-40B4-BE49-F238E27FC236}">
+                <a16:creationId xmlns:a16="http://schemas.microsoft.com/office/drawing/2014/main" id="{665C3151-47DD-36BF-8268-AAE908ED0C2F}"/>
+              </a:ext>
+            </a:extLst>
+          </p:cNvPr>
+          <p:cNvSpPr>
+            <a:spLocks noGrp="1"/>
+          </p:cNvSpPr>
+          <p:nvPr>
+            <p:ph type="body" sz="half" idx="2"/>
+          </p:nvPr>
+        </p:nvSpPr>
+        <p:spPr>
+          <a:xfrm>
+            <a:off x="723900" y="2855967"/>
+            <a:ext cx="3855720" cy="3622105"/>
+          </a:xfrm>
+        </p:spPr>
+        <p:txBody>
+          <a:bodyPr>
+            <a:normAutofit fontScale="92500" lnSpcReduction="20000"/>
+          </a:bodyPr>
+          <a:lstStyle/>
+          <a:p>
+            <a:pPr marL="285750" indent="-285750">
+              <a:buFont typeface="Arial" panose="020B0604020202020204" pitchFamily="34" charset="0"/>
+              <a:buChar char="•"/>
+            </a:pPr>
+            <a:r>
+              <a:rPr lang="en-US" dirty="0"/>
+              <a:t>Popularity of a post and the number of comments did not follow what we had initial hypothesized. There was an interesting trend of popularity though that showed up generality of what length is most well liked.</a:t>
+            </a:r>
+          </a:p>
+          <a:p>
+            <a:pPr marL="285750" indent="-285750">
+              <a:buFont typeface="Arial" panose="020B0604020202020204" pitchFamily="34" charset="0"/>
+              <a:buChar char="•"/>
+            </a:pPr>
+            <a:r>
+              <a:rPr lang="en-US" dirty="0"/>
+              <a:t>Graph 1 NoNewNormal posts with their respective comments and the average score.</a:t>
+            </a:r>
+          </a:p>
+          <a:p>
+            <a:pPr marL="285750" indent="-285750">
+              <a:buFont typeface="Arial" panose="020B0604020202020204" pitchFamily="34" charset="0"/>
+              <a:buChar char="•"/>
+            </a:pPr>
+            <a:r>
+              <a:rPr lang="en-US" dirty="0"/>
+              <a:t>Graph 2 </a:t>
+            </a:r>
+            <a:r>
+              <a:rPr lang="en-US" dirty="0" err="1"/>
+              <a:t>BitCoin</a:t>
+            </a:r>
+            <a:r>
+              <a:rPr lang="en-US" dirty="0"/>
+              <a:t> posts with their respective comments and the average score. </a:t>
+            </a:r>
+          </a:p>
+          <a:p>
+            <a:pPr marL="285750" indent="-285750">
+              <a:buFont typeface="Arial" panose="020B0604020202020204" pitchFamily="34" charset="0"/>
+              <a:buChar char="•"/>
+            </a:pPr>
+            <a:r>
+              <a:rPr lang="en-US" dirty="0"/>
+              <a:t>Correlation Coefficient = </a:t>
+            </a:r>
+          </a:p>
+        </p:txBody>
+      </p:sp>
+      <p:pic>
+        <p:nvPicPr>
+          <p:cNvPr id="5" name="Picture 4" descr="A graph with red lines and a line&#10;&#10;Description automatically generated">
+            <a:extLst>
+              <a:ext uri="{FF2B5EF4-FFF2-40B4-BE49-F238E27FC236}">
+                <a16:creationId xmlns:a16="http://schemas.microsoft.com/office/drawing/2014/main" id="{6AFBE5D2-3D58-02BF-825C-7C82F8CFA9DD}"/>
+              </a:ext>
+            </a:extLst>
+          </p:cNvPr>
+          <p:cNvPicPr>
+            <a:picLocks noChangeAspect="1"/>
+          </p:cNvPicPr>
+          <p:nvPr/>
+        </p:nvPicPr>
+        <p:blipFill>
+          <a:blip r:embed="rId3"/>
+          <a:stretch>
+            <a:fillRect/>
+          </a:stretch>
+        </p:blipFill>
+        <p:spPr>
+          <a:xfrm>
+            <a:off x="6096000" y="71956"/>
+            <a:ext cx="5469000" cy="3281400"/>
+          </a:xfrm>
+          <a:prstGeom prst="rect">
+            <a:avLst/>
+          </a:prstGeom>
+        </p:spPr>
+      </p:pic>
+      <p:pic>
+        <p:nvPicPr>
+          <p:cNvPr id="7" name="Picture 6" descr="A graph with red lines&#10;&#10;Description automatically generated">
+            <a:extLst>
+              <a:ext uri="{FF2B5EF4-FFF2-40B4-BE49-F238E27FC236}">
+                <a16:creationId xmlns:a16="http://schemas.microsoft.com/office/drawing/2014/main" id="{194425A2-7486-0ABB-DF55-F6C5B10D2CB7}"/>
+              </a:ext>
+            </a:extLst>
+          </p:cNvPr>
+          <p:cNvPicPr>
+            <a:picLocks noChangeAspect="1"/>
+          </p:cNvPicPr>
+          <p:nvPr/>
+        </p:nvPicPr>
+        <p:blipFill>
+          <a:blip r:embed="rId4"/>
+          <a:stretch>
+            <a:fillRect/>
+          </a:stretch>
+        </p:blipFill>
+        <p:spPr>
+          <a:xfrm>
+            <a:off x="6096000" y="3429000"/>
+            <a:ext cx="5469000" cy="3281400"/>
+          </a:xfrm>
+          <a:prstGeom prst="rect">
+            <a:avLst/>
+          </a:prstGeom>
+        </p:spPr>
+      </p:pic>
+    </p:spTree>
+    <p:extLst>
+      <p:ext uri="{BB962C8B-B14F-4D97-AF65-F5344CB8AC3E}">
+        <p14:creationId xmlns:p14="http://schemas.microsoft.com/office/powerpoint/2010/main" val="1283379653"/>
+      </p:ext>
+    </p:extLst>
+  </p:cSld>
+  <p:clrMapOvr>
+    <a:masterClrMapping/>
+  </p:clrMapOvr>
+  <mc:AlternateContent xmlns:mc="http://schemas.openxmlformats.org/markup-compatibility/2006" xmlns:p14="http://schemas.microsoft.com/office/powerpoint/2010/main">
+    <mc:Choice Requires="p14">
+      <p:transition spd="med" p14:dur="700">
+        <p:fade/>
+      </p:transition>
+    </mc:Choice>
+    <mc:Fallback xmlns="">
+      <p:transition spd="med">
+        <p:fade/>
+      </p:transition>
+    </mc:Fallback>
+  </mc:AlternateContent>
+</p:sld>
+</file>
+
+<file path=ppt/slides/slide11.xml><?xml version="1.0" encoding="utf-8"?>
+<p:sld xmlns:a="http://schemas.openxmlformats.org/drawingml/2006/main" xmlns:r="http://schemas.openxmlformats.org/officeDocument/2006/relationships" xmlns:p="http://schemas.openxmlformats.org/presentationml/2006/main">
+  <p:cSld>
     <p:bg>
       <p:bgPr>
         <a:solidFill>
@@ -12063,7 +12499,7 @@
         <p:spPr>
           <a:xfrm>
             <a:off x="1371599" y="1744133"/>
-            <a:ext cx="6570133" cy="4123267"/>
+            <a:ext cx="6570133" cy="4798335"/>
           </a:xfrm>
         </p:spPr>
         <p:txBody>
@@ -12120,15 +12556,45 @@
             </a:r>
           </a:p>
           <a:p>
+            <a:pPr lvl="1">
+              <a:buFont typeface="Wingdings" pitchFamily="2" charset="2"/>
+              <a:buChar char="§"/>
+            </a:pPr>
+            <a:r>
+              <a:rPr lang="en-US" sz="1600" dirty="0"/>
+              <a:t>Over time the average popularity of a topic has a downward trend.</a:t>
+            </a:r>
+          </a:p>
+          <a:p>
             <a:r>
               <a:rPr lang="en-US" sz="1600" dirty="0"/>
               <a:t>Popularity and Creation Time (Daily)</a:t>
             </a:r>
           </a:p>
           <a:p>
+            <a:pPr lvl="1">
+              <a:buFont typeface="Wingdings" pitchFamily="2" charset="2"/>
+              <a:buChar char="§"/>
+            </a:pPr>
+            <a:r>
+              <a:rPr lang="en-US" sz="1600" dirty="0"/>
+              <a:t>Time of creation remain relatively consistent in what will gain greater popularity. </a:t>
+            </a:r>
+          </a:p>
+          <a:p>
             <a:r>
               <a:rPr lang="en-US" sz="1600" dirty="0"/>
               <a:t>Popularity and Comments </a:t>
+            </a:r>
+          </a:p>
+          <a:p>
+            <a:pPr lvl="1">
+              <a:buFont typeface="Wingdings" pitchFamily="2" charset="2"/>
+              <a:buChar char="§"/>
+            </a:pPr>
+            <a:r>
+              <a:rPr lang="en-US" sz="1600" dirty="0"/>
+              <a:t>Found a trend pertaining to the most liked posts on average are the ones that are “medium” length. </a:t>
             </a:r>
           </a:p>
           <a:p>
@@ -12191,13 +12657,13 @@
   <p:clrMapOvr>
     <a:masterClrMapping/>
   </p:clrMapOvr>
-  <mc:AlternateContent xmlns:mc="http://schemas.openxmlformats.org/markup-compatibility/2006">
-    <mc:Choice xmlns:p14="http://schemas.microsoft.com/office/powerpoint/2010/main" Requires="p14">
+  <mc:AlternateContent xmlns:mc="http://schemas.openxmlformats.org/markup-compatibility/2006" xmlns:p14="http://schemas.microsoft.com/office/powerpoint/2010/main">
+    <mc:Choice Requires="p14">
       <p:transition spd="med" p14:dur="700">
         <p:fade/>
       </p:transition>
     </mc:Choice>
-    <mc:Fallback>
+    <mc:Fallback xmlns="">
       <p:transition spd="med">
         <p:fade/>
       </p:transition>
@@ -12206,7 +12672,7 @@
 </p:sld>
 </file>
 
-<file path=ppt/slides/slide11.xml><?xml version="1.0" encoding="utf-8"?>
+<file path=ppt/slides/slide12.xml><?xml version="1.0" encoding="utf-8"?>
 <p:sld xmlns:a="http://schemas.openxmlformats.org/drawingml/2006/main" xmlns:r="http://schemas.openxmlformats.org/officeDocument/2006/relationships" xmlns:p="http://schemas.openxmlformats.org/presentationml/2006/main">
   <p:cSld>
     <p:spTree>
@@ -12309,13 +12775,13 @@
   <p:clrMapOvr>
     <a:masterClrMapping/>
   </p:clrMapOvr>
-  <mc:AlternateContent xmlns:mc="http://schemas.openxmlformats.org/markup-compatibility/2006">
-    <mc:Choice xmlns:p14="http://schemas.microsoft.com/office/powerpoint/2010/main" Requires="p14">
+  <mc:AlternateContent xmlns:mc="http://schemas.openxmlformats.org/markup-compatibility/2006" xmlns:p14="http://schemas.microsoft.com/office/powerpoint/2010/main">
+    <mc:Choice Requires="p14">
       <p:transition spd="med" p14:dur="700">
         <p:fade/>
       </p:transition>
     </mc:Choice>
-    <mc:Fallback>
+    <mc:Fallback xmlns="">
       <p:transition spd="med">
         <p:fade/>
       </p:transition>
@@ -12324,7 +12790,7 @@
 </p:sld>
 </file>
 
-<file path=ppt/slides/slide12.xml><?xml version="1.0" encoding="utf-8"?>
+<file path=ppt/slides/slide13.xml><?xml version="1.0" encoding="utf-8"?>
 <p:sld xmlns:a="http://schemas.openxmlformats.org/drawingml/2006/main" xmlns:r="http://schemas.openxmlformats.org/officeDocument/2006/relationships" xmlns:p="http://schemas.openxmlformats.org/presentationml/2006/main">
   <p:cSld>
     <p:spTree>
@@ -12379,13 +12845,13 @@
   <p:clrMapOvr>
     <a:masterClrMapping/>
   </p:clrMapOvr>
-  <mc:AlternateContent xmlns:mc="http://schemas.openxmlformats.org/markup-compatibility/2006">
-    <mc:Choice xmlns:p14="http://schemas.microsoft.com/office/powerpoint/2010/main" Requires="p14">
+  <mc:AlternateContent xmlns:mc="http://schemas.openxmlformats.org/markup-compatibility/2006" xmlns:p14="http://schemas.microsoft.com/office/powerpoint/2010/main">
+    <mc:Choice Requires="p14">
       <p:transition spd="med" p14:dur="700">
         <p:fade/>
       </p:transition>
     </mc:Choice>
-    <mc:Fallback>
+    <mc:Fallback xmlns="">
       <p:transition spd="med">
         <p:fade/>
       </p:transition>
@@ -12495,13 +12961,13 @@
   <p:clrMapOvr>
     <a:masterClrMapping/>
   </p:clrMapOvr>
-  <mc:AlternateContent xmlns:mc="http://schemas.openxmlformats.org/markup-compatibility/2006">
-    <mc:Choice xmlns:p14="http://schemas.microsoft.com/office/powerpoint/2010/main" Requires="p14">
+  <mc:AlternateContent xmlns:mc="http://schemas.openxmlformats.org/markup-compatibility/2006" xmlns:p14="http://schemas.microsoft.com/office/powerpoint/2010/main">
+    <mc:Choice Requires="p14">
       <p:transition spd="med" p14:dur="700">
         <p:fade/>
       </p:transition>
     </mc:Choice>
-    <mc:Fallback>
+    <mc:Fallback xmlns="">
       <p:transition spd="med">
         <p:fade/>
       </p:transition>
@@ -12732,13 +13198,13 @@
   <p:clrMapOvr>
     <a:masterClrMapping/>
   </p:clrMapOvr>
-  <mc:AlternateContent xmlns:mc="http://schemas.openxmlformats.org/markup-compatibility/2006">
-    <mc:Choice xmlns:p14="http://schemas.microsoft.com/office/powerpoint/2010/main" Requires="p14">
+  <mc:AlternateContent xmlns:mc="http://schemas.openxmlformats.org/markup-compatibility/2006" xmlns:p14="http://schemas.microsoft.com/office/powerpoint/2010/main">
+    <mc:Choice Requires="p14">
       <p:transition spd="med" p14:dur="700">
         <p:fade/>
       </p:transition>
     </mc:Choice>
-    <mc:Fallback>
+    <mc:Fallback xmlns="">
       <p:transition spd="med">
         <p:fade/>
       </p:transition>
@@ -13109,13 +13575,13 @@
   <p:clrMapOvr>
     <a:masterClrMapping/>
   </p:clrMapOvr>
-  <mc:AlternateContent xmlns:mc="http://schemas.openxmlformats.org/markup-compatibility/2006">
-    <mc:Choice xmlns:p14="http://schemas.microsoft.com/office/powerpoint/2010/main" Requires="p14">
+  <mc:AlternateContent xmlns:mc="http://schemas.openxmlformats.org/markup-compatibility/2006" xmlns:p14="http://schemas.microsoft.com/office/powerpoint/2010/main">
+    <mc:Choice Requires="p14">
       <p:transition spd="med" p14:dur="700">
         <p:fade/>
       </p:transition>
     </mc:Choice>
-    <mc:Fallback>
+    <mc:Fallback xmlns="">
       <p:transition spd="med">
         <p:fade/>
       </p:transition>
@@ -13324,6 +13790,512 @@
           <p:cNvPr id="2" name="Title 1">
             <a:extLst>
               <a:ext uri="{FF2B5EF4-FFF2-40B4-BE49-F238E27FC236}">
+                <a16:creationId xmlns:a16="http://schemas.microsoft.com/office/drawing/2014/main" id="{7ABFA0A7-D13D-690F-B699-06D14A444F48}"/>
+              </a:ext>
+            </a:extLst>
+          </p:cNvPr>
+          <p:cNvSpPr>
+            <a:spLocks noGrp="1"/>
+          </p:cNvSpPr>
+          <p:nvPr>
+            <p:ph type="title"/>
+          </p:nvPr>
+        </p:nvSpPr>
+        <p:spPr/>
+        <p:txBody>
+          <a:bodyPr/>
+          <a:lstStyle/>
+          <a:p>
+            <a:r>
+              <a:rPr lang="en-US" dirty="0"/>
+              <a:t>Methods</a:t>
+            </a:r>
+          </a:p>
+        </p:txBody>
+      </p:sp>
+      <p:sp>
+        <p:nvSpPr>
+          <p:cNvPr id="3" name="Content Placeholder 2">
+            <a:extLst>
+              <a:ext uri="{FF2B5EF4-FFF2-40B4-BE49-F238E27FC236}">
+                <a16:creationId xmlns:a16="http://schemas.microsoft.com/office/drawing/2014/main" id="{4F41F19F-1C48-AC2D-C4E0-02705BFEAC99}"/>
+              </a:ext>
+            </a:extLst>
+          </p:cNvPr>
+          <p:cNvSpPr>
+            <a:spLocks noGrp="1"/>
+          </p:cNvSpPr>
+          <p:nvPr>
+            <p:ph idx="1"/>
+          </p:nvPr>
+        </p:nvSpPr>
+        <p:spPr>
+          <a:xfrm>
+            <a:off x="1371600" y="1650380"/>
+            <a:ext cx="6220691" cy="4217020"/>
+          </a:xfrm>
+        </p:spPr>
+        <p:txBody>
+          <a:bodyPr/>
+          <a:lstStyle/>
+          <a:p>
+            <a:r>
+              <a:rPr lang="en-US" b="1" dirty="0"/>
+              <a:t>Python </a:t>
+            </a:r>
+          </a:p>
+          <a:p>
+            <a:pPr lvl="1">
+              <a:buFont typeface="Wingdings" pitchFamily="2" charset="2"/>
+              <a:buChar char="§"/>
+            </a:pPr>
+            <a:r>
+              <a:rPr lang="en-US" b="1" dirty="0"/>
+              <a:t>pandas</a:t>
+            </a:r>
+          </a:p>
+          <a:p>
+            <a:pPr lvl="2">
+              <a:buFont typeface="Wingdings" pitchFamily="2" charset="2"/>
+              <a:buChar char="§"/>
+            </a:pPr>
+            <a:r>
+              <a:rPr lang="en-US" dirty="0"/>
+              <a:t>Used for file reading and data manipulation</a:t>
+            </a:r>
+          </a:p>
+          <a:p>
+            <a:pPr lvl="1">
+              <a:buFont typeface="Wingdings" pitchFamily="2" charset="2"/>
+              <a:buChar char="§"/>
+            </a:pPr>
+            <a:r>
+              <a:rPr lang="en-US" b="1" dirty="0"/>
+              <a:t>Matplotlib</a:t>
+            </a:r>
+          </a:p>
+          <a:p>
+            <a:pPr lvl="2">
+              <a:buFont typeface="Wingdings" pitchFamily="2" charset="2"/>
+              <a:buChar char="§"/>
+            </a:pPr>
+            <a:r>
+              <a:rPr lang="en-US" dirty="0"/>
+              <a:t>Used for all graphing purposes </a:t>
+            </a:r>
+          </a:p>
+          <a:p>
+            <a:pPr lvl="2">
+              <a:buFont typeface="Wingdings" pitchFamily="2" charset="2"/>
+              <a:buChar char="§"/>
+            </a:pPr>
+            <a:endParaRPr lang="en-US" dirty="0"/>
+          </a:p>
+        </p:txBody>
+      </p:sp>
+      <p:pic>
+        <p:nvPicPr>
+          <p:cNvPr id="4" name="Picture 3">
+            <a:extLst>
+              <a:ext uri="{FF2B5EF4-FFF2-40B4-BE49-F238E27FC236}">
+                <a16:creationId xmlns:a16="http://schemas.microsoft.com/office/drawing/2014/main" id="{BE1613E5-AD8F-C8D9-5535-CA8B734D7B49}"/>
+              </a:ext>
+            </a:extLst>
+          </p:cNvPr>
+          <p:cNvPicPr>
+            <a:picLocks noChangeAspect="1"/>
+          </p:cNvPicPr>
+          <p:nvPr/>
+        </p:nvPicPr>
+        <p:blipFill>
+          <a:blip r:embed="rId2"/>
+          <a:stretch>
+            <a:fillRect/>
+          </a:stretch>
+        </p:blipFill>
+        <p:spPr>
+          <a:xfrm>
+            <a:off x="9047018" y="803585"/>
+            <a:ext cx="1358900" cy="1485900"/>
+          </a:xfrm>
+          <a:prstGeom prst="rect">
+            <a:avLst/>
+          </a:prstGeom>
+        </p:spPr>
+      </p:pic>
+      <p:pic>
+        <p:nvPicPr>
+          <p:cNvPr id="5" name="Picture 4">
+            <a:extLst>
+              <a:ext uri="{FF2B5EF4-FFF2-40B4-BE49-F238E27FC236}">
+                <a16:creationId xmlns:a16="http://schemas.microsoft.com/office/drawing/2014/main" id="{B8778E46-FBE2-5562-D9D4-BF999F519F4B}"/>
+              </a:ext>
+            </a:extLst>
+          </p:cNvPr>
+          <p:cNvPicPr>
+            <a:picLocks noChangeAspect="1"/>
+          </p:cNvPicPr>
+          <p:nvPr/>
+        </p:nvPicPr>
+        <p:blipFill>
+          <a:blip r:embed="rId3"/>
+          <a:stretch>
+            <a:fillRect/>
+          </a:stretch>
+        </p:blipFill>
+        <p:spPr>
+          <a:xfrm>
+            <a:off x="7884788" y="3082616"/>
+            <a:ext cx="3683358" cy="1485900"/>
+          </a:xfrm>
+          <a:prstGeom prst="rect">
+            <a:avLst/>
+          </a:prstGeom>
+        </p:spPr>
+      </p:pic>
+      <p:pic>
+        <p:nvPicPr>
+          <p:cNvPr id="6" name="Picture 5">
+            <a:extLst>
+              <a:ext uri="{FF2B5EF4-FFF2-40B4-BE49-F238E27FC236}">
+                <a16:creationId xmlns:a16="http://schemas.microsoft.com/office/drawing/2014/main" id="{F2465E2D-AE67-67F5-773E-F18E07610D24}"/>
+              </a:ext>
+            </a:extLst>
+          </p:cNvPr>
+          <p:cNvPicPr>
+            <a:picLocks noChangeAspect="1"/>
+          </p:cNvPicPr>
+          <p:nvPr/>
+        </p:nvPicPr>
+        <p:blipFill>
+          <a:blip r:embed="rId4"/>
+          <a:stretch>
+            <a:fillRect/>
+          </a:stretch>
+        </p:blipFill>
+        <p:spPr>
+          <a:xfrm>
+            <a:off x="7837030" y="5114636"/>
+            <a:ext cx="3778875" cy="752764"/>
+          </a:xfrm>
+          <a:prstGeom prst="rect">
+            <a:avLst/>
+          </a:prstGeom>
+        </p:spPr>
+      </p:pic>
+    </p:spTree>
+    <p:extLst>
+      <p:ext uri="{BB962C8B-B14F-4D97-AF65-F5344CB8AC3E}">
+        <p14:creationId xmlns:p14="http://schemas.microsoft.com/office/powerpoint/2010/main" val="965682603"/>
+      </p:ext>
+    </p:extLst>
+  </p:cSld>
+  <p:clrMapOvr>
+    <a:masterClrMapping/>
+  </p:clrMapOvr>
+  <mc:AlternateContent xmlns:mc="http://schemas.openxmlformats.org/markup-compatibility/2006" xmlns:p14="http://schemas.microsoft.com/office/powerpoint/2010/main">
+    <mc:Choice Requires="p14">
+      <p:transition spd="med" p14:dur="700">
+        <p:fade/>
+      </p:transition>
+    </mc:Choice>
+    <mc:Fallback xmlns="">
+      <p:transition spd="med">
+        <p:fade/>
+      </p:transition>
+    </mc:Fallback>
+  </mc:AlternateContent>
+  <p:timing>
+    <p:tnLst>
+      <p:par>
+        <p:cTn id="1" dur="indefinite" restart="never" nodeType="tmRoot">
+          <p:childTnLst>
+            <p:seq concurrent="1" nextAc="seek">
+              <p:cTn id="2" dur="indefinite" nodeType="mainSeq">
+                <p:childTnLst>
+                  <p:par>
+                    <p:cTn id="3" fill="hold">
+                      <p:stCondLst>
+                        <p:cond delay="indefinite"/>
+                        <p:cond evt="onBegin" delay="0">
+                          <p:tn val="2"/>
+                        </p:cond>
+                      </p:stCondLst>
+                      <p:childTnLst>
+                        <p:par>
+                          <p:cTn id="4" fill="hold">
+                            <p:stCondLst>
+                              <p:cond delay="0"/>
+                            </p:stCondLst>
+                            <p:childTnLst>
+                              <p:par>
+                                <p:cTn id="5" presetID="10" presetClass="entr" presetSubtype="0" fill="hold" grpId="0" nodeType="afterEffect">
+                                  <p:stCondLst>
+                                    <p:cond delay="0"/>
+                                  </p:stCondLst>
+                                  <p:childTnLst>
+                                    <p:set>
+                                      <p:cBhvr>
+                                        <p:cTn id="6" dur="1" fill="hold">
+                                          <p:stCondLst>
+                                            <p:cond delay="0"/>
+                                          </p:stCondLst>
+                                        </p:cTn>
+                                        <p:tgtEl>
+                                          <p:spTgt spid="2"/>
+                                        </p:tgtEl>
+                                        <p:attrNameLst>
+                                          <p:attrName>style.visibility</p:attrName>
+                                        </p:attrNameLst>
+                                      </p:cBhvr>
+                                      <p:to>
+                                        <p:strVal val="visible"/>
+                                      </p:to>
+                                    </p:set>
+                                    <p:animEffect transition="in" filter="fade">
+                                      <p:cBhvr>
+                                        <p:cTn id="7" dur="1000"/>
+                                        <p:tgtEl>
+                                          <p:spTgt spid="2"/>
+                                        </p:tgtEl>
+                                      </p:cBhvr>
+                                    </p:animEffect>
+                                  </p:childTnLst>
+                                </p:cTn>
+                              </p:par>
+                            </p:childTnLst>
+                          </p:cTn>
+                        </p:par>
+                        <p:par>
+                          <p:cTn id="8" fill="hold">
+                            <p:stCondLst>
+                              <p:cond delay="1000"/>
+                            </p:stCondLst>
+                            <p:childTnLst>
+                              <p:par>
+                                <p:cTn id="9" presetID="10" presetClass="entr" presetSubtype="0" fill="hold" grpId="0" nodeType="afterEffect">
+                                  <p:stCondLst>
+                                    <p:cond delay="0"/>
+                                  </p:stCondLst>
+                                  <p:childTnLst>
+                                    <p:set>
+                                      <p:cBhvr>
+                                        <p:cTn id="10" dur="1" fill="hold">
+                                          <p:stCondLst>
+                                            <p:cond delay="0"/>
+                                          </p:stCondLst>
+                                        </p:cTn>
+                                        <p:tgtEl>
+                                          <p:spTgt spid="3"/>
+                                        </p:tgtEl>
+                                        <p:attrNameLst>
+                                          <p:attrName>style.visibility</p:attrName>
+                                        </p:attrNameLst>
+                                      </p:cBhvr>
+                                      <p:to>
+                                        <p:strVal val="visible"/>
+                                      </p:to>
+                                    </p:set>
+                                    <p:animEffect transition="in" filter="fade">
+                                      <p:cBhvr>
+                                        <p:cTn id="11" dur="1000"/>
+                                        <p:tgtEl>
+                                          <p:spTgt spid="3"/>
+                                        </p:tgtEl>
+                                      </p:cBhvr>
+                                    </p:animEffect>
+                                  </p:childTnLst>
+                                </p:cTn>
+                              </p:par>
+                            </p:childTnLst>
+                          </p:cTn>
+                        </p:par>
+                        <p:par>
+                          <p:cTn id="12" fill="hold">
+                            <p:stCondLst>
+                              <p:cond delay="2000"/>
+                            </p:stCondLst>
+                            <p:childTnLst>
+                              <p:par>
+                                <p:cTn id="13" presetID="10" presetClass="entr" presetSubtype="0" fill="hold" nodeType="afterEffect">
+                                  <p:stCondLst>
+                                    <p:cond delay="0"/>
+                                  </p:stCondLst>
+                                  <p:childTnLst>
+                                    <p:set>
+                                      <p:cBhvr>
+                                        <p:cTn id="14" dur="1" fill="hold">
+                                          <p:stCondLst>
+                                            <p:cond delay="0"/>
+                                          </p:stCondLst>
+                                        </p:cTn>
+                                        <p:tgtEl>
+                                          <p:spTgt spid="4"/>
+                                        </p:tgtEl>
+                                        <p:attrNameLst>
+                                          <p:attrName>style.visibility</p:attrName>
+                                        </p:attrNameLst>
+                                      </p:cBhvr>
+                                      <p:to>
+                                        <p:strVal val="visible"/>
+                                      </p:to>
+                                    </p:set>
+                                    <p:animEffect transition="in" filter="fade">
+                                      <p:cBhvr>
+                                        <p:cTn id="15" dur="1000"/>
+                                        <p:tgtEl>
+                                          <p:spTgt spid="4"/>
+                                        </p:tgtEl>
+                                      </p:cBhvr>
+                                    </p:animEffect>
+                                  </p:childTnLst>
+                                </p:cTn>
+                              </p:par>
+                            </p:childTnLst>
+                          </p:cTn>
+                        </p:par>
+                        <p:par>
+                          <p:cTn id="16" fill="hold">
+                            <p:stCondLst>
+                              <p:cond delay="3000"/>
+                            </p:stCondLst>
+                            <p:childTnLst>
+                              <p:par>
+                                <p:cTn id="17" presetID="10" presetClass="entr" presetSubtype="0" fill="hold" nodeType="afterEffect">
+                                  <p:stCondLst>
+                                    <p:cond delay="0"/>
+                                  </p:stCondLst>
+                                  <p:childTnLst>
+                                    <p:set>
+                                      <p:cBhvr>
+                                        <p:cTn id="18" dur="1" fill="hold">
+                                          <p:stCondLst>
+                                            <p:cond delay="0"/>
+                                          </p:stCondLst>
+                                        </p:cTn>
+                                        <p:tgtEl>
+                                          <p:spTgt spid="5"/>
+                                        </p:tgtEl>
+                                        <p:attrNameLst>
+                                          <p:attrName>style.visibility</p:attrName>
+                                        </p:attrNameLst>
+                                      </p:cBhvr>
+                                      <p:to>
+                                        <p:strVal val="visible"/>
+                                      </p:to>
+                                    </p:set>
+                                    <p:animEffect transition="in" filter="fade">
+                                      <p:cBhvr>
+                                        <p:cTn id="19" dur="1000"/>
+                                        <p:tgtEl>
+                                          <p:spTgt spid="5"/>
+                                        </p:tgtEl>
+                                      </p:cBhvr>
+                                    </p:animEffect>
+                                  </p:childTnLst>
+                                </p:cTn>
+                              </p:par>
+                            </p:childTnLst>
+                          </p:cTn>
+                        </p:par>
+                        <p:par>
+                          <p:cTn id="20" fill="hold">
+                            <p:stCondLst>
+                              <p:cond delay="4000"/>
+                            </p:stCondLst>
+                            <p:childTnLst>
+                              <p:par>
+                                <p:cTn id="21" presetID="10" presetClass="entr" presetSubtype="0" fill="hold" nodeType="afterEffect">
+                                  <p:stCondLst>
+                                    <p:cond delay="0"/>
+                                  </p:stCondLst>
+                                  <p:childTnLst>
+                                    <p:set>
+                                      <p:cBhvr>
+                                        <p:cTn id="22" dur="1" fill="hold">
+                                          <p:stCondLst>
+                                            <p:cond delay="0"/>
+                                          </p:stCondLst>
+                                        </p:cTn>
+                                        <p:tgtEl>
+                                          <p:spTgt spid="6"/>
+                                        </p:tgtEl>
+                                        <p:attrNameLst>
+                                          <p:attrName>style.visibility</p:attrName>
+                                        </p:attrNameLst>
+                                      </p:cBhvr>
+                                      <p:to>
+                                        <p:strVal val="visible"/>
+                                      </p:to>
+                                    </p:set>
+                                    <p:animEffect transition="in" filter="fade">
+                                      <p:cBhvr>
+                                        <p:cTn id="23" dur="1000"/>
+                                        <p:tgtEl>
+                                          <p:spTgt spid="6"/>
+                                        </p:tgtEl>
+                                      </p:cBhvr>
+                                    </p:animEffect>
+                                  </p:childTnLst>
+                                </p:cTn>
+                              </p:par>
+                            </p:childTnLst>
+                          </p:cTn>
+                        </p:par>
+                      </p:childTnLst>
+                    </p:cTn>
+                  </p:par>
+                </p:childTnLst>
+              </p:cTn>
+              <p:prevCondLst>
+                <p:cond evt="onPrev" delay="0">
+                  <p:tgtEl>
+                    <p:sldTgt/>
+                  </p:tgtEl>
+                </p:cond>
+              </p:prevCondLst>
+              <p:nextCondLst>
+                <p:cond evt="onNext" delay="0">
+                  <p:tgtEl>
+                    <p:sldTgt/>
+                  </p:tgtEl>
+                </p:cond>
+              </p:nextCondLst>
+            </p:seq>
+          </p:childTnLst>
+        </p:cTn>
+      </p:par>
+    </p:tnLst>
+    <p:bldLst>
+      <p:bldP spid="2" grpId="0"/>
+      <p:bldP spid="3" grpId="0"/>
+    </p:bldLst>
+  </p:timing>
+</p:sld>
+</file>
+
+<file path=ppt/slides/slide6.xml><?xml version="1.0" encoding="utf-8"?>
+<p:sld xmlns:a="http://schemas.openxmlformats.org/drawingml/2006/main" xmlns:r="http://schemas.openxmlformats.org/officeDocument/2006/relationships" xmlns:p="http://schemas.openxmlformats.org/presentationml/2006/main">
+  <p:cSld>
+    <p:spTree>
+      <p:nvGrpSpPr>
+        <p:cNvPr id="1" name=""/>
+        <p:cNvGrpSpPr/>
+        <p:nvPr/>
+      </p:nvGrpSpPr>
+      <p:grpSpPr>
+        <a:xfrm>
+          <a:off x="0" y="0"/>
+          <a:ext cx="0" cy="0"/>
+          <a:chOff x="0" y="0"/>
+          <a:chExt cx="0" cy="0"/>
+        </a:xfrm>
+      </p:grpSpPr>
+      <p:sp>
+        <p:nvSpPr>
+          <p:cNvPr id="2" name="Title 1">
+            <a:extLst>
+              <a:ext uri="{FF2B5EF4-FFF2-40B4-BE49-F238E27FC236}">
                 <a16:creationId xmlns:a16="http://schemas.microsoft.com/office/drawing/2014/main" id="{0F90E039-6A04-96C0-9FED-BF589E4E1DD2}"/>
               </a:ext>
             </a:extLst>
@@ -13371,7 +14343,7 @@
         </p:spPr>
         <p:txBody>
           <a:bodyPr>
-            <a:normAutofit lnSpcReduction="10000"/>
+            <a:normAutofit/>
           </a:bodyPr>
           <a:lstStyle/>
           <a:p>
@@ -13411,7 +14383,7 @@
             </a:pPr>
             <a:r>
               <a:rPr lang="en-US" dirty="0"/>
-              <a:t>Both have 0 correlation coefficients. (KYLE)</a:t>
+              <a:t>Correlation coefficient = </a:t>
             </a:r>
           </a:p>
         </p:txBody>
@@ -13486,13 +14458,13 @@
   <p:clrMapOvr>
     <a:masterClrMapping/>
   </p:clrMapOvr>
-  <mc:AlternateContent xmlns:mc="http://schemas.openxmlformats.org/markup-compatibility/2006">
-    <mc:Choice xmlns:p14="http://schemas.microsoft.com/office/powerpoint/2010/main" Requires="p14">
+  <mc:AlternateContent xmlns:mc="http://schemas.openxmlformats.org/markup-compatibility/2006" xmlns:p14="http://schemas.microsoft.com/office/powerpoint/2010/main">
+    <mc:Choice Requires="p14">
       <p:transition spd="med" p14:dur="700">
         <p:fade/>
       </p:transition>
     </mc:Choice>
-    <mc:Fallback>
+    <mc:Fallback xmlns="">
       <p:transition spd="med">
         <p:fade/>
       </p:transition>
@@ -13714,7 +14686,7 @@
 </p:sld>
 </file>
 
-<file path=ppt/slides/slide6.xml><?xml version="1.0" encoding="utf-8"?>
+<file path=ppt/slides/slide7.xml><?xml version="1.0" encoding="utf-8"?>
 <p:sld xmlns:a="http://schemas.openxmlformats.org/drawingml/2006/main" xmlns:r="http://schemas.openxmlformats.org/officeDocument/2006/relationships" xmlns:p="http://schemas.openxmlformats.org/presentationml/2006/main">
   <p:cSld>
     <p:spTree>
@@ -13818,7 +14790,7 @@
             </a:pPr>
             <a:r>
               <a:rPr lang="en-US" dirty="0"/>
-              <a:t>Correlation coefficient (KYLE)</a:t>
+              <a:t>Correlation coefficient = </a:t>
             </a:r>
           </a:p>
         </p:txBody>
@@ -13893,13 +14865,13 @@
   <p:clrMapOvr>
     <a:masterClrMapping/>
   </p:clrMapOvr>
-  <mc:AlternateContent xmlns:mc="http://schemas.openxmlformats.org/markup-compatibility/2006">
-    <mc:Choice xmlns:p14="http://schemas.microsoft.com/office/powerpoint/2010/main" Requires="p14">
+  <mc:AlternateContent xmlns:mc="http://schemas.openxmlformats.org/markup-compatibility/2006" xmlns:p14="http://schemas.microsoft.com/office/powerpoint/2010/main">
+    <mc:Choice Requires="p14">
       <p:transition spd="med" p14:dur="700">
         <p:fade/>
       </p:transition>
     </mc:Choice>
-    <mc:Fallback>
+    <mc:Fallback xmlns="">
       <p:transition spd="med">
         <p:fade/>
       </p:transition>
@@ -14121,7 +15093,7 @@
 </p:sld>
 </file>
 
-<file path=ppt/slides/slide7.xml><?xml version="1.0" encoding="utf-8"?>
+<file path=ppt/slides/slide8.xml><?xml version="1.0" encoding="utf-8"?>
 <p:sld xmlns:a="http://schemas.openxmlformats.org/drawingml/2006/main" xmlns:r="http://schemas.openxmlformats.org/officeDocument/2006/relationships" xmlns:p="http://schemas.openxmlformats.org/presentationml/2006/main">
   <p:cSld>
     <p:spTree>
@@ -14189,9 +15161,16 @@
             <p:ph type="body" sz="half" idx="2"/>
           </p:nvPr>
         </p:nvSpPr>
-        <p:spPr/>
+        <p:spPr>
+          <a:xfrm>
+            <a:off x="723900" y="2855967"/>
+            <a:ext cx="3855720" cy="3467559"/>
+          </a:xfrm>
+        </p:spPr>
         <p:txBody>
-          <a:bodyPr/>
+          <a:bodyPr>
+            <a:normAutofit/>
+          </a:bodyPr>
           <a:lstStyle/>
           <a:p>
             <a:pPr marL="285750" indent="-285750">
@@ -14221,6 +15200,16 @@
             <a:r>
               <a:rPr lang="en-US" dirty="0"/>
               <a:t>Graph 2 NoNewNormal comments over the span of 15 months.</a:t>
+            </a:r>
+          </a:p>
+          <a:p>
+            <a:pPr marL="285750" indent="-285750">
+              <a:buFont typeface="Arial" panose="020B0604020202020204" pitchFamily="34" charset="0"/>
+              <a:buChar char="•"/>
+            </a:pPr>
+            <a:r>
+              <a:rPr lang="en-US" dirty="0"/>
+              <a:t>Correlation Coefficient = </a:t>
             </a:r>
           </a:p>
         </p:txBody>
@@ -14240,7 +15229,7 @@
           <p:nvPr/>
         </p:nvPicPr>
         <p:blipFill>
-          <a:blip r:embed="rId2"/>
+          <a:blip r:embed="rId3"/>
           <a:stretch>
             <a:fillRect/>
           </a:stretch>
@@ -14270,7 +15259,7 @@
           <p:nvPr/>
         </p:nvPicPr>
         <p:blipFill>
-          <a:blip r:embed="rId3"/>
+          <a:blip r:embed="rId4"/>
           <a:stretch>
             <a:fillRect/>
           </a:stretch>
@@ -14295,22 +15284,244 @@
   <p:clrMapOvr>
     <a:masterClrMapping/>
   </p:clrMapOvr>
-  <mc:AlternateContent xmlns:mc="http://schemas.openxmlformats.org/markup-compatibility/2006">
-    <mc:Choice xmlns:p14="http://schemas.microsoft.com/office/powerpoint/2010/main" Requires="p14">
+  <mc:AlternateContent xmlns:mc="http://schemas.openxmlformats.org/markup-compatibility/2006" xmlns:p14="http://schemas.microsoft.com/office/powerpoint/2010/main">
+    <mc:Choice Requires="p14">
       <p:transition spd="med" p14:dur="700">
         <p:fade/>
       </p:transition>
     </mc:Choice>
-    <mc:Fallback>
+    <mc:Fallback xmlns="">
       <p:transition spd="med">
         <p:fade/>
       </p:transition>
     </mc:Fallback>
   </mc:AlternateContent>
+  <p:timing>
+    <p:tnLst>
+      <p:par>
+        <p:cTn id="1" dur="indefinite" restart="never" nodeType="tmRoot">
+          <p:childTnLst>
+            <p:seq concurrent="1" nextAc="seek">
+              <p:cTn id="2" dur="indefinite" nodeType="mainSeq">
+                <p:childTnLst>
+                  <p:par>
+                    <p:cTn id="3" fill="hold">
+                      <p:stCondLst>
+                        <p:cond delay="indefinite"/>
+                        <p:cond evt="onBegin" delay="0">
+                          <p:tn val="2"/>
+                        </p:cond>
+                      </p:stCondLst>
+                      <p:childTnLst>
+                        <p:par>
+                          <p:cTn id="4" fill="hold">
+                            <p:stCondLst>
+                              <p:cond delay="0"/>
+                            </p:stCondLst>
+                            <p:childTnLst>
+                              <p:par>
+                                <p:cTn id="5" presetID="10" presetClass="entr" presetSubtype="0" fill="hold" grpId="0" nodeType="afterEffect">
+                                  <p:stCondLst>
+                                    <p:cond delay="0"/>
+                                  </p:stCondLst>
+                                  <p:childTnLst>
+                                    <p:set>
+                                      <p:cBhvr>
+                                        <p:cTn id="6" dur="1" fill="hold">
+                                          <p:stCondLst>
+                                            <p:cond delay="0"/>
+                                          </p:stCondLst>
+                                        </p:cTn>
+                                        <p:tgtEl>
+                                          <p:spTgt spid="2"/>
+                                        </p:tgtEl>
+                                        <p:attrNameLst>
+                                          <p:attrName>style.visibility</p:attrName>
+                                        </p:attrNameLst>
+                                      </p:cBhvr>
+                                      <p:to>
+                                        <p:strVal val="visible"/>
+                                      </p:to>
+                                    </p:set>
+                                    <p:animEffect transition="in" filter="fade">
+                                      <p:cBhvr>
+                                        <p:cTn id="7" dur="1000"/>
+                                        <p:tgtEl>
+                                          <p:spTgt spid="2"/>
+                                        </p:tgtEl>
+                                      </p:cBhvr>
+                                    </p:animEffect>
+                                  </p:childTnLst>
+                                </p:cTn>
+                              </p:par>
+                            </p:childTnLst>
+                          </p:cTn>
+                        </p:par>
+                        <p:par>
+                          <p:cTn id="8" fill="hold">
+                            <p:stCondLst>
+                              <p:cond delay="1000"/>
+                            </p:stCondLst>
+                            <p:childTnLst>
+                              <p:par>
+                                <p:cTn id="9" presetID="10" presetClass="entr" presetSubtype="0" fill="hold" grpId="0" nodeType="afterEffect">
+                                  <p:stCondLst>
+                                    <p:cond delay="0"/>
+                                  </p:stCondLst>
+                                  <p:childTnLst>
+                                    <p:set>
+                                      <p:cBhvr>
+                                        <p:cTn id="10" dur="1" fill="hold">
+                                          <p:stCondLst>
+                                            <p:cond delay="0"/>
+                                          </p:stCondLst>
+                                        </p:cTn>
+                                        <p:tgtEl>
+                                          <p:spTgt spid="4"/>
+                                        </p:tgtEl>
+                                        <p:attrNameLst>
+                                          <p:attrName>style.visibility</p:attrName>
+                                        </p:attrNameLst>
+                                      </p:cBhvr>
+                                      <p:to>
+                                        <p:strVal val="visible"/>
+                                      </p:to>
+                                    </p:set>
+                                    <p:animEffect transition="in" filter="fade">
+                                      <p:cBhvr>
+                                        <p:cTn id="11" dur="1000"/>
+                                        <p:tgtEl>
+                                          <p:spTgt spid="4"/>
+                                        </p:tgtEl>
+                                      </p:cBhvr>
+                                    </p:animEffect>
+                                  </p:childTnLst>
+                                </p:cTn>
+                              </p:par>
+                            </p:childTnLst>
+                          </p:cTn>
+                        </p:par>
+                        <p:par>
+                          <p:cTn id="12" fill="hold">
+                            <p:stCondLst>
+                              <p:cond delay="2000"/>
+                            </p:stCondLst>
+                            <p:childTnLst>
+                              <p:par>
+                                <p:cTn id="13" presetID="10" presetClass="entr" presetSubtype="0" fill="hold" nodeType="afterEffect">
+                                  <p:stCondLst>
+                                    <p:cond delay="0"/>
+                                  </p:stCondLst>
+                                  <p:childTnLst>
+                                    <p:set>
+                                      <p:cBhvr>
+                                        <p:cTn id="14" dur="1" fill="hold">
+                                          <p:stCondLst>
+                                            <p:cond delay="0"/>
+                                          </p:stCondLst>
+                                        </p:cTn>
+                                        <p:tgtEl>
+                                          <p:spTgt spid="7"/>
+                                        </p:tgtEl>
+                                        <p:attrNameLst>
+                                          <p:attrName>style.visibility</p:attrName>
+                                        </p:attrNameLst>
+                                      </p:cBhvr>
+                                      <p:to>
+                                        <p:strVal val="visible"/>
+                                      </p:to>
+                                    </p:set>
+                                    <p:animEffect transition="in" filter="fade">
+                                      <p:cBhvr>
+                                        <p:cTn id="15" dur="1000"/>
+                                        <p:tgtEl>
+                                          <p:spTgt spid="7"/>
+                                        </p:tgtEl>
+                                      </p:cBhvr>
+                                    </p:animEffect>
+                                  </p:childTnLst>
+                                </p:cTn>
+                              </p:par>
+                            </p:childTnLst>
+                          </p:cTn>
+                        </p:par>
+                        <p:par>
+                          <p:cTn id="16" fill="hold">
+                            <p:stCondLst>
+                              <p:cond delay="3000"/>
+                            </p:stCondLst>
+                            <p:childTnLst>
+                              <p:par>
+                                <p:cTn id="17" presetID="10" presetClass="entr" presetSubtype="0" fill="hold" nodeType="afterEffect">
+                                  <p:stCondLst>
+                                    <p:cond delay="0"/>
+                                  </p:stCondLst>
+                                  <p:childTnLst>
+                                    <p:set>
+                                      <p:cBhvr>
+                                        <p:cTn id="18" dur="1" fill="hold">
+                                          <p:stCondLst>
+                                            <p:cond delay="0"/>
+                                          </p:stCondLst>
+                                        </p:cTn>
+                                        <p:tgtEl>
+                                          <p:spTgt spid="5"/>
+                                        </p:tgtEl>
+                                        <p:attrNameLst>
+                                          <p:attrName>style.visibility</p:attrName>
+                                        </p:attrNameLst>
+                                      </p:cBhvr>
+                                      <p:to>
+                                        <p:strVal val="visible"/>
+                                      </p:to>
+                                    </p:set>
+                                    <p:animEffect transition="in" filter="fade">
+                                      <p:cBhvr>
+                                        <p:cTn id="19" dur="1000"/>
+                                        <p:tgtEl>
+                                          <p:spTgt spid="5"/>
+                                        </p:tgtEl>
+                                      </p:cBhvr>
+                                    </p:animEffect>
+                                  </p:childTnLst>
+                                </p:cTn>
+                              </p:par>
+                            </p:childTnLst>
+                          </p:cTn>
+                        </p:par>
+                      </p:childTnLst>
+                    </p:cTn>
+                  </p:par>
+                </p:childTnLst>
+              </p:cTn>
+              <p:prevCondLst>
+                <p:cond evt="onPrev" delay="0">
+                  <p:tgtEl>
+                    <p:sldTgt/>
+                  </p:tgtEl>
+                </p:cond>
+              </p:prevCondLst>
+              <p:nextCondLst>
+                <p:cond evt="onNext" delay="0">
+                  <p:tgtEl>
+                    <p:sldTgt/>
+                  </p:tgtEl>
+                </p:cond>
+              </p:nextCondLst>
+            </p:seq>
+          </p:childTnLst>
+        </p:cTn>
+      </p:par>
+    </p:tnLst>
+    <p:bldLst>
+      <p:bldP spid="2" grpId="0"/>
+      <p:bldP spid="4" grpId="0" uiExpand="1"/>
+    </p:bldLst>
+  </p:timing>
 </p:sld>
 </file>
 
-<file path=ppt/slides/slide8.xml><?xml version="1.0" encoding="utf-8"?>
+<file path=ppt/slides/slide9.xml><?xml version="1.0" encoding="utf-8"?>
 <p:sld xmlns:a="http://schemas.openxmlformats.org/drawingml/2006/main" xmlns:r="http://schemas.openxmlformats.org/officeDocument/2006/relationships" xmlns:p="http://schemas.openxmlformats.org/presentationml/2006/main">
   <p:cSld>
     <p:spTree>
@@ -14420,6 +15631,16 @@
             <a:r>
               <a:rPr lang="en-US" dirty="0"/>
               <a:t>Graph 3 Trucker subreddit and all its comment creation times vs average score.</a:t>
+            </a:r>
+          </a:p>
+          <a:p>
+            <a:pPr marL="285750" indent="-285750">
+              <a:buFont typeface="Arial" panose="020B0604020202020204" pitchFamily="34" charset="0"/>
+              <a:buChar char="•"/>
+            </a:pPr>
+            <a:r>
+              <a:rPr lang="en-US" dirty="0"/>
+              <a:t>Correlation Coefficient = </a:t>
             </a:r>
           </a:p>
         </p:txBody>
@@ -14524,120 +15745,284 @@
   <p:clrMapOvr>
     <a:masterClrMapping/>
   </p:clrMapOvr>
-  <mc:AlternateContent xmlns:mc="http://schemas.openxmlformats.org/markup-compatibility/2006">
-    <mc:Choice xmlns:p14="http://schemas.microsoft.com/office/powerpoint/2010/main" Requires="p14">
+  <mc:AlternateContent xmlns:mc="http://schemas.openxmlformats.org/markup-compatibility/2006" xmlns:p14="http://schemas.microsoft.com/office/powerpoint/2010/main">
+    <mc:Choice Requires="p14">
       <p:transition spd="med" p14:dur="700">
         <p:fade/>
       </p:transition>
     </mc:Choice>
-    <mc:Fallback>
+    <mc:Fallback xmlns="">
       <p:transition spd="med">
         <p:fade/>
       </p:transition>
     </mc:Fallback>
   </mc:AlternateContent>
-</p:sld>
-</file>
-
-<file path=ppt/slides/slide9.xml><?xml version="1.0" encoding="utf-8"?>
-<p:sld xmlns:a="http://schemas.openxmlformats.org/drawingml/2006/main" xmlns:r="http://schemas.openxmlformats.org/officeDocument/2006/relationships" xmlns:p="http://schemas.openxmlformats.org/presentationml/2006/main">
-  <p:cSld>
-    <p:spTree>
-      <p:nvGrpSpPr>
-        <p:cNvPr id="1" name=""/>
-        <p:cNvGrpSpPr/>
-        <p:nvPr/>
-      </p:nvGrpSpPr>
-      <p:grpSpPr>
-        <a:xfrm>
-          <a:off x="0" y="0"/>
-          <a:ext cx="0" cy="0"/>
-          <a:chOff x="0" y="0"/>
-          <a:chExt cx="0" cy="0"/>
-        </a:xfrm>
-      </p:grpSpPr>
-      <p:sp>
-        <p:nvSpPr>
-          <p:cNvPr id="2" name="Title 1">
-            <a:extLst>
-              <a:ext uri="{FF2B5EF4-FFF2-40B4-BE49-F238E27FC236}">
-                <a16:creationId xmlns:a16="http://schemas.microsoft.com/office/drawing/2014/main" id="{329004B7-74A5-F7B7-F0EF-308D2FB8FE56}"/>
-              </a:ext>
-            </a:extLst>
-          </p:cNvPr>
-          <p:cNvSpPr>
-            <a:spLocks noGrp="1"/>
-          </p:cNvSpPr>
-          <p:nvPr>
-            <p:ph type="title"/>
-          </p:nvPr>
-        </p:nvSpPr>
-        <p:spPr/>
-        <p:txBody>
-          <a:bodyPr/>
-          <a:lstStyle/>
-          <a:p>
-            <a:r>
-              <a:rPr lang="en-US" dirty="0"/>
-              <a:t>Popularity and Comments</a:t>
-            </a:r>
-          </a:p>
-        </p:txBody>
-      </p:sp>
-      <p:sp>
-        <p:nvSpPr>
-          <p:cNvPr id="4" name="Text Placeholder 3">
-            <a:extLst>
-              <a:ext uri="{FF2B5EF4-FFF2-40B4-BE49-F238E27FC236}">
-                <a16:creationId xmlns:a16="http://schemas.microsoft.com/office/drawing/2014/main" id="{665C3151-47DD-36BF-8268-AAE908ED0C2F}"/>
-              </a:ext>
-            </a:extLst>
-          </p:cNvPr>
-          <p:cNvSpPr>
-            <a:spLocks noGrp="1"/>
-          </p:cNvSpPr>
-          <p:nvPr>
-            <p:ph type="body" sz="half" idx="2"/>
-          </p:nvPr>
-        </p:nvSpPr>
-        <p:spPr/>
-        <p:txBody>
-          <a:bodyPr/>
-          <a:lstStyle/>
-          <a:p>
-            <a:pPr marL="285750" indent="-285750">
-              <a:buFont typeface="Arial" panose="020B0604020202020204" pitchFamily="34" charset="0"/>
-              <a:buChar char="•"/>
-            </a:pPr>
-            <a:r>
-              <a:rPr lang="en-US" dirty="0"/>
-              <a:t>Number of likes and the number of comments comparison.</a:t>
-            </a:r>
-          </a:p>
-        </p:txBody>
-      </p:sp>
-    </p:spTree>
-    <p:extLst>
-      <p:ext uri="{BB962C8B-B14F-4D97-AF65-F5344CB8AC3E}">
-        <p14:creationId xmlns:p14="http://schemas.microsoft.com/office/powerpoint/2010/main" val="1283379653"/>
-      </p:ext>
-    </p:extLst>
-  </p:cSld>
-  <p:clrMapOvr>
-    <a:masterClrMapping/>
-  </p:clrMapOvr>
-  <mc:AlternateContent xmlns:mc="http://schemas.openxmlformats.org/markup-compatibility/2006">
-    <mc:Choice xmlns:p14="http://schemas.microsoft.com/office/powerpoint/2010/main" Requires="p14">
-      <p:transition spd="med" p14:dur="700">
-        <p:fade/>
-      </p:transition>
-    </mc:Choice>
-    <mc:Fallback>
-      <p:transition spd="med">
-        <p:fade/>
-      </p:transition>
-    </mc:Fallback>
-  </mc:AlternateContent>
+  <p:timing>
+    <p:tnLst>
+      <p:par>
+        <p:cTn id="1" dur="indefinite" restart="never" nodeType="tmRoot">
+          <p:childTnLst>
+            <p:seq concurrent="1" nextAc="seek">
+              <p:cTn id="2" dur="indefinite" nodeType="mainSeq">
+                <p:childTnLst>
+                  <p:par>
+                    <p:cTn id="3" fill="hold">
+                      <p:stCondLst>
+                        <p:cond delay="indefinite"/>
+                        <p:cond evt="onBegin" delay="0">
+                          <p:tn val="2"/>
+                        </p:cond>
+                      </p:stCondLst>
+                      <p:childTnLst>
+                        <p:par>
+                          <p:cTn id="4" fill="hold">
+                            <p:stCondLst>
+                              <p:cond delay="0"/>
+                            </p:stCondLst>
+                            <p:childTnLst>
+                              <p:par>
+                                <p:cTn id="5" presetID="10" presetClass="entr" presetSubtype="0" fill="hold" grpId="0" nodeType="afterEffect">
+                                  <p:stCondLst>
+                                    <p:cond delay="0"/>
+                                  </p:stCondLst>
+                                  <p:childTnLst>
+                                    <p:set>
+                                      <p:cBhvr>
+                                        <p:cTn id="6" dur="1" fill="hold">
+                                          <p:stCondLst>
+                                            <p:cond delay="0"/>
+                                          </p:stCondLst>
+                                        </p:cTn>
+                                        <p:tgtEl>
+                                          <p:spTgt spid="2"/>
+                                        </p:tgtEl>
+                                        <p:attrNameLst>
+                                          <p:attrName>style.visibility</p:attrName>
+                                        </p:attrNameLst>
+                                      </p:cBhvr>
+                                      <p:to>
+                                        <p:strVal val="visible"/>
+                                      </p:to>
+                                    </p:set>
+                                    <p:animEffect transition="in" filter="fade">
+                                      <p:cBhvr>
+                                        <p:cTn id="7" dur="1000"/>
+                                        <p:tgtEl>
+                                          <p:spTgt spid="2"/>
+                                        </p:tgtEl>
+                                      </p:cBhvr>
+                                    </p:animEffect>
+                                  </p:childTnLst>
+                                </p:cTn>
+                              </p:par>
+                            </p:childTnLst>
+                          </p:cTn>
+                        </p:par>
+                        <p:par>
+                          <p:cTn id="8" fill="hold">
+                            <p:stCondLst>
+                              <p:cond delay="1000"/>
+                            </p:stCondLst>
+                            <p:childTnLst>
+                              <p:par>
+                                <p:cTn id="9" presetID="10" presetClass="entr" presetSubtype="0" fill="hold" grpId="0" nodeType="afterEffect">
+                                  <p:stCondLst>
+                                    <p:cond delay="0"/>
+                                  </p:stCondLst>
+                                  <p:childTnLst>
+                                    <p:set>
+                                      <p:cBhvr>
+                                        <p:cTn id="10" dur="1" fill="hold">
+                                          <p:stCondLst>
+                                            <p:cond delay="0"/>
+                                          </p:stCondLst>
+                                        </p:cTn>
+                                        <p:tgtEl>
+                                          <p:spTgt spid="4"/>
+                                        </p:tgtEl>
+                                        <p:attrNameLst>
+                                          <p:attrName>style.visibility</p:attrName>
+                                        </p:attrNameLst>
+                                      </p:cBhvr>
+                                      <p:to>
+                                        <p:strVal val="visible"/>
+                                      </p:to>
+                                    </p:set>
+                                    <p:animEffect transition="in" filter="fade">
+                                      <p:cBhvr>
+                                        <p:cTn id="11" dur="1000"/>
+                                        <p:tgtEl>
+                                          <p:spTgt spid="4"/>
+                                        </p:tgtEl>
+                                      </p:cBhvr>
+                                    </p:animEffect>
+                                  </p:childTnLst>
+                                </p:cTn>
+                              </p:par>
+                            </p:childTnLst>
+                          </p:cTn>
+                        </p:par>
+                        <p:par>
+                          <p:cTn id="12" fill="hold">
+                            <p:stCondLst>
+                              <p:cond delay="2000"/>
+                            </p:stCondLst>
+                            <p:childTnLst>
+                              <p:par>
+                                <p:cTn id="13" presetID="10" presetClass="entr" presetSubtype="0" fill="hold" nodeType="afterEffect">
+                                  <p:stCondLst>
+                                    <p:cond delay="0"/>
+                                  </p:stCondLst>
+                                  <p:childTnLst>
+                                    <p:set>
+                                      <p:cBhvr>
+                                        <p:cTn id="14" dur="1" fill="hold">
+                                          <p:stCondLst>
+                                            <p:cond delay="0"/>
+                                          </p:stCondLst>
+                                        </p:cTn>
+                                        <p:tgtEl>
+                                          <p:spTgt spid="5"/>
+                                        </p:tgtEl>
+                                        <p:attrNameLst>
+                                          <p:attrName>style.visibility</p:attrName>
+                                        </p:attrNameLst>
+                                      </p:cBhvr>
+                                      <p:to>
+                                        <p:strVal val="visible"/>
+                                      </p:to>
+                                    </p:set>
+                                    <p:animEffect transition="in" filter="fade">
+                                      <p:cBhvr>
+                                        <p:cTn id="15" dur="1000"/>
+                                        <p:tgtEl>
+                                          <p:spTgt spid="5"/>
+                                        </p:tgtEl>
+                                      </p:cBhvr>
+                                    </p:animEffect>
+                                  </p:childTnLst>
+                                </p:cTn>
+                              </p:par>
+                            </p:childTnLst>
+                          </p:cTn>
+                        </p:par>
+                        <p:par>
+                          <p:cTn id="16" fill="hold">
+                            <p:stCondLst>
+                              <p:cond delay="3000"/>
+                            </p:stCondLst>
+                            <p:childTnLst>
+                              <p:par>
+                                <p:cTn id="17" presetID="10" presetClass="entr" presetSubtype="0" fill="hold" nodeType="afterEffect">
+                                  <p:stCondLst>
+                                    <p:cond delay="0"/>
+                                  </p:stCondLst>
+                                  <p:childTnLst>
+                                    <p:set>
+                                      <p:cBhvr>
+                                        <p:cTn id="18" dur="1" fill="hold">
+                                          <p:stCondLst>
+                                            <p:cond delay="0"/>
+                                          </p:stCondLst>
+                                        </p:cTn>
+                                        <p:tgtEl>
+                                          <p:spTgt spid="9"/>
+                                        </p:tgtEl>
+                                        <p:attrNameLst>
+                                          <p:attrName>style.visibility</p:attrName>
+                                        </p:attrNameLst>
+                                      </p:cBhvr>
+                                      <p:to>
+                                        <p:strVal val="visible"/>
+                                      </p:to>
+                                    </p:set>
+                                    <p:animEffect transition="in" filter="fade">
+                                      <p:cBhvr>
+                                        <p:cTn id="19" dur="1000"/>
+                                        <p:tgtEl>
+                                          <p:spTgt spid="9"/>
+                                        </p:tgtEl>
+                                      </p:cBhvr>
+                                    </p:animEffect>
+                                  </p:childTnLst>
+                                </p:cTn>
+                              </p:par>
+                            </p:childTnLst>
+                          </p:cTn>
+                        </p:par>
+                        <p:par>
+                          <p:cTn id="20" fill="hold">
+                            <p:stCondLst>
+                              <p:cond delay="4000"/>
+                            </p:stCondLst>
+                            <p:childTnLst>
+                              <p:par>
+                                <p:cTn id="21" presetID="10" presetClass="entr" presetSubtype="0" fill="hold" nodeType="afterEffect">
+                                  <p:stCondLst>
+                                    <p:cond delay="0"/>
+                                  </p:stCondLst>
+                                  <p:childTnLst>
+                                    <p:set>
+                                      <p:cBhvr>
+                                        <p:cTn id="22" dur="1" fill="hold">
+                                          <p:stCondLst>
+                                            <p:cond delay="0"/>
+                                          </p:stCondLst>
+                                        </p:cTn>
+                                        <p:tgtEl>
+                                          <p:spTgt spid="11"/>
+                                        </p:tgtEl>
+                                        <p:attrNameLst>
+                                          <p:attrName>style.visibility</p:attrName>
+                                        </p:attrNameLst>
+                                      </p:cBhvr>
+                                      <p:to>
+                                        <p:strVal val="visible"/>
+                                      </p:to>
+                                    </p:set>
+                                    <p:animEffect transition="in" filter="fade">
+                                      <p:cBhvr>
+                                        <p:cTn id="23" dur="1000"/>
+                                        <p:tgtEl>
+                                          <p:spTgt spid="11"/>
+                                        </p:tgtEl>
+                                      </p:cBhvr>
+                                    </p:animEffect>
+                                  </p:childTnLst>
+                                </p:cTn>
+                              </p:par>
+                            </p:childTnLst>
+                          </p:cTn>
+                        </p:par>
+                      </p:childTnLst>
+                    </p:cTn>
+                  </p:par>
+                </p:childTnLst>
+              </p:cTn>
+              <p:prevCondLst>
+                <p:cond evt="onPrev" delay="0">
+                  <p:tgtEl>
+                    <p:sldTgt/>
+                  </p:tgtEl>
+                </p:cond>
+              </p:prevCondLst>
+              <p:nextCondLst>
+                <p:cond evt="onNext" delay="0">
+                  <p:tgtEl>
+                    <p:sldTgt/>
+                  </p:tgtEl>
+                </p:cond>
+              </p:nextCondLst>
+            </p:seq>
+          </p:childTnLst>
+        </p:cTn>
+      </p:par>
+    </p:tnLst>
+    <p:bldLst>
+      <p:bldP spid="2" grpId="0"/>
+      <p:bldP spid="4" grpId="0"/>
+    </p:bldLst>
+  </p:timing>
 </p:sld>
 </file>
 

</xml_diff>